<commit_message>
Some formatting changes included in this version
</commit_message>
<xml_diff>
--- a/Heartbeat.pptx
+++ b/Heartbeat.pptx
@@ -1,35 +1,35 @@
 
 <file path=ppt/presentation.xml><?xml version="1.0" encoding="utf-8"?>
-<p:presentation xmlns:a="http://schemas.openxmlformats.org/drawingml/2006/main" xmlns:r="http://schemas.openxmlformats.org/officeDocument/2006/relationships" xmlns:mc="http://schemas.openxmlformats.org/markup-compatibility/2006" xmlns:mv="urn:schemas-microsoft-com:mac:vml" xmlns:p="http://schemas.openxmlformats.org/presentationml/2006/main" xmlns:c="http://schemas.openxmlformats.org/drawingml/2006/chart" xmlns:dgm="http://schemas.openxmlformats.org/drawingml/2006/diagram" xmlns:o="urn:schemas-microsoft-com:office:office" xmlns:v="urn:schemas-microsoft-com:vml" xmlns:pvml="urn:schemas-microsoft-com:office:powerpoint" xmlns:com="http://schemas.openxmlformats.org/drawingml/2006/compatibility" xmlns:p14="http://schemas.microsoft.com/office/powerpoint/2010/main" xmlns:p15="http://schemas.microsoft.com/office/powerpoint/2012/main" autoCompressPictures="0" embedTrueTypeFonts="1" strictFirstAndLastChars="0" saveSubsetFonts="1">
+<p:presentation xmlns:a="http://schemas.openxmlformats.org/drawingml/2006/main" xmlns:r="http://schemas.openxmlformats.org/officeDocument/2006/relationships" xmlns:p="http://schemas.openxmlformats.org/presentationml/2006/main" strictFirstAndLastChars="0" embedTrueTypeFonts="1" saveSubsetFonts="1" autoCompressPictures="0">
   <p:sldMasterIdLst>
-    <p:sldMasterId id="2147483659" r:id="rId4"/>
+    <p:sldMasterId id="2147483659" r:id="rId1"/>
   </p:sldMasterIdLst>
   <p:notesMasterIdLst>
-    <p:notesMasterId r:id="rId5"/>
+    <p:notesMasterId r:id="rId8"/>
   </p:notesMasterIdLst>
   <p:sldIdLst>
-    <p:sldId id="256" r:id="rId6"/>
-    <p:sldId id="257" r:id="rId7"/>
-    <p:sldId id="258" r:id="rId8"/>
-    <p:sldId id="259" r:id="rId9"/>
-    <p:sldId id="260" r:id="rId10"/>
-    <p:sldId id="261" r:id="rId11"/>
+    <p:sldId id="256" r:id="rId2"/>
+    <p:sldId id="257" r:id="rId3"/>
+    <p:sldId id="258" r:id="rId4"/>
+    <p:sldId id="259" r:id="rId5"/>
+    <p:sldId id="260" r:id="rId6"/>
+    <p:sldId id="261" r:id="rId7"/>
   </p:sldIdLst>
-  <p:sldSz cy="5143500" cx="9144000"/>
+  <p:sldSz cx="9144000" cy="5143500" type="screen16x9"/>
   <p:notesSz cx="6858000" cy="9144000"/>
   <p:embeddedFontLst>
     <p:embeddedFont>
-      <p:font typeface="Average"/>
-      <p:regular r:id="rId12"/>
+      <p:font typeface="Average" panose="02000503040000020003" pitchFamily="2" charset="77"/>
+      <p:regular r:id="rId9"/>
     </p:embeddedFont>
     <p:embeddedFont>
-      <p:font typeface="Oswald"/>
-      <p:regular r:id="rId13"/>
-      <p:bold r:id="rId14"/>
+      <p:font typeface="Oswald" pitchFamily="2" charset="77"/>
+      <p:regular r:id="rId10"/>
+      <p:bold r:id="rId11"/>
     </p:embeddedFont>
   </p:embeddedFontLst>
   <p:defaultTextStyle>
-    <a:defPPr lvl="0" marR="0" rtl="0" algn="l">
+    <a:defPPr marR="0" lvl="0" algn="l" rtl="0">
       <a:lnSpc>
         <a:spcPct val="100000"/>
       </a:lnSpc>
@@ -40,7 +40,7 @@
         <a:spcPts val="0"/>
       </a:spcAft>
     </a:defPPr>
-    <a:lvl1pPr lvl="0" marR="0" rtl="0" algn="l">
+    <a:lvl1pPr marR="0" lvl="0" algn="l" rtl="0">
       <a:lnSpc>
         <a:spcPct val="100000"/>
       </a:lnSpc>
@@ -54,7 +54,7 @@
         <a:srgbClr val="000000"/>
       </a:buClr>
       <a:buFont typeface="Arial"/>
-      <a:defRPr b="0" i="0" sz="1400" u="none" cap="none" strike="noStrike">
+      <a:defRPr sz="1400" b="0" i="0" u="none" strike="noStrike" cap="none">
         <a:solidFill>
           <a:srgbClr val="000000"/>
         </a:solidFill>
@@ -64,7 +64,7 @@
         <a:sym typeface="Arial"/>
       </a:defRPr>
     </a:lvl1pPr>
-    <a:lvl2pPr lvl="1" marR="0" rtl="0" algn="l">
+    <a:lvl2pPr marR="0" lvl="1" algn="l" rtl="0">
       <a:lnSpc>
         <a:spcPct val="100000"/>
       </a:lnSpc>
@@ -78,7 +78,7 @@
         <a:srgbClr val="000000"/>
       </a:buClr>
       <a:buFont typeface="Arial"/>
-      <a:defRPr b="0" i="0" sz="1400" u="none" cap="none" strike="noStrike">
+      <a:defRPr sz="1400" b="0" i="0" u="none" strike="noStrike" cap="none">
         <a:solidFill>
           <a:srgbClr val="000000"/>
         </a:solidFill>
@@ -88,7 +88,7 @@
         <a:sym typeface="Arial"/>
       </a:defRPr>
     </a:lvl2pPr>
-    <a:lvl3pPr lvl="2" marR="0" rtl="0" algn="l">
+    <a:lvl3pPr marR="0" lvl="2" algn="l" rtl="0">
       <a:lnSpc>
         <a:spcPct val="100000"/>
       </a:lnSpc>
@@ -102,7 +102,7 @@
         <a:srgbClr val="000000"/>
       </a:buClr>
       <a:buFont typeface="Arial"/>
-      <a:defRPr b="0" i="0" sz="1400" u="none" cap="none" strike="noStrike">
+      <a:defRPr sz="1400" b="0" i="0" u="none" strike="noStrike" cap="none">
         <a:solidFill>
           <a:srgbClr val="000000"/>
         </a:solidFill>
@@ -112,7 +112,7 @@
         <a:sym typeface="Arial"/>
       </a:defRPr>
     </a:lvl3pPr>
-    <a:lvl4pPr lvl="3" marR="0" rtl="0" algn="l">
+    <a:lvl4pPr marR="0" lvl="3" algn="l" rtl="0">
       <a:lnSpc>
         <a:spcPct val="100000"/>
       </a:lnSpc>
@@ -126,7 +126,7 @@
         <a:srgbClr val="000000"/>
       </a:buClr>
       <a:buFont typeface="Arial"/>
-      <a:defRPr b="0" i="0" sz="1400" u="none" cap="none" strike="noStrike">
+      <a:defRPr sz="1400" b="0" i="0" u="none" strike="noStrike" cap="none">
         <a:solidFill>
           <a:srgbClr val="000000"/>
         </a:solidFill>
@@ -136,7 +136,7 @@
         <a:sym typeface="Arial"/>
       </a:defRPr>
     </a:lvl4pPr>
-    <a:lvl5pPr lvl="4" marR="0" rtl="0" algn="l">
+    <a:lvl5pPr marR="0" lvl="4" algn="l" rtl="0">
       <a:lnSpc>
         <a:spcPct val="100000"/>
       </a:lnSpc>
@@ -150,7 +150,7 @@
         <a:srgbClr val="000000"/>
       </a:buClr>
       <a:buFont typeface="Arial"/>
-      <a:defRPr b="0" i="0" sz="1400" u="none" cap="none" strike="noStrike">
+      <a:defRPr sz="1400" b="0" i="0" u="none" strike="noStrike" cap="none">
         <a:solidFill>
           <a:srgbClr val="000000"/>
         </a:solidFill>
@@ -160,7 +160,7 @@
         <a:sym typeface="Arial"/>
       </a:defRPr>
     </a:lvl5pPr>
-    <a:lvl6pPr lvl="5" marR="0" rtl="0" algn="l">
+    <a:lvl6pPr marR="0" lvl="5" algn="l" rtl="0">
       <a:lnSpc>
         <a:spcPct val="100000"/>
       </a:lnSpc>
@@ -174,7 +174,7 @@
         <a:srgbClr val="000000"/>
       </a:buClr>
       <a:buFont typeface="Arial"/>
-      <a:defRPr b="0" i="0" sz="1400" u="none" cap="none" strike="noStrike">
+      <a:defRPr sz="1400" b="0" i="0" u="none" strike="noStrike" cap="none">
         <a:solidFill>
           <a:srgbClr val="000000"/>
         </a:solidFill>
@@ -184,7 +184,7 @@
         <a:sym typeface="Arial"/>
       </a:defRPr>
     </a:lvl6pPr>
-    <a:lvl7pPr lvl="6" marR="0" rtl="0" algn="l">
+    <a:lvl7pPr marR="0" lvl="6" algn="l" rtl="0">
       <a:lnSpc>
         <a:spcPct val="100000"/>
       </a:lnSpc>
@@ -198,7 +198,7 @@
         <a:srgbClr val="000000"/>
       </a:buClr>
       <a:buFont typeface="Arial"/>
-      <a:defRPr b="0" i="0" sz="1400" u="none" cap="none" strike="noStrike">
+      <a:defRPr sz="1400" b="0" i="0" u="none" strike="noStrike" cap="none">
         <a:solidFill>
           <a:srgbClr val="000000"/>
         </a:solidFill>
@@ -208,7 +208,7 @@
         <a:sym typeface="Arial"/>
       </a:defRPr>
     </a:lvl7pPr>
-    <a:lvl8pPr lvl="7" marR="0" rtl="0" algn="l">
+    <a:lvl8pPr marR="0" lvl="7" algn="l" rtl="0">
       <a:lnSpc>
         <a:spcPct val="100000"/>
       </a:lnSpc>
@@ -222,7 +222,7 @@
         <a:srgbClr val="000000"/>
       </a:buClr>
       <a:buFont typeface="Arial"/>
-      <a:defRPr b="0" i="0" sz="1400" u="none" cap="none" strike="noStrike">
+      <a:defRPr sz="1400" b="0" i="0" u="none" strike="noStrike" cap="none">
         <a:solidFill>
           <a:srgbClr val="000000"/>
         </a:solidFill>
@@ -232,7 +232,7 @@
         <a:sym typeface="Arial"/>
       </a:defRPr>
     </a:lvl8pPr>
-    <a:lvl9pPr lvl="8" marR="0" rtl="0" algn="l">
+    <a:lvl9pPr marR="0" lvl="8" algn="l" rtl="0">
       <a:lnSpc>
         <a:spcPct val="100000"/>
       </a:lnSpc>
@@ -246,7 +246,7 @@
         <a:srgbClr val="000000"/>
       </a:buClr>
       <a:buFont typeface="Arial"/>
-      <a:defRPr b="0" i="0" sz="1400" u="none" cap="none" strike="noStrike">
+      <a:defRPr sz="1400" b="0" i="0" u="none" strike="noStrike" cap="none">
         <a:solidFill>
           <a:srgbClr val="000000"/>
         </a:solidFill>
@@ -259,7 +259,7 @@
   </p:defaultTextStyle>
   <p:extLst>
     <p:ext uri="{EFAFB233-063F-42B5-8137-9DF3F51BA10A}">
-      <p15:sldGuideLst>
+      <p15:sldGuideLst xmlns:p15="http://schemas.microsoft.com/office/powerpoint/2012/main">
         <p15:guide id="1" orient="horz" pos="1620">
           <p15:clr>
             <a:srgbClr val="A4A3A4"/>
@@ -277,11 +277,16 @@
 </file>
 
 <file path=ppt/notesMasters/notesMaster1.xml><?xml version="1.0" encoding="utf-8"?>
-<p:notesMaster xmlns:a="http://schemas.openxmlformats.org/drawingml/2006/main" xmlns:r="http://schemas.openxmlformats.org/officeDocument/2006/relationships" xmlns:mc="http://schemas.openxmlformats.org/markup-compatibility/2006" xmlns:mv="urn:schemas-microsoft-com:mac:vml" xmlns:p="http://schemas.openxmlformats.org/presentationml/2006/main" xmlns:c="http://schemas.openxmlformats.org/drawingml/2006/chart" xmlns:dgm="http://schemas.openxmlformats.org/drawingml/2006/diagram" xmlns:o="urn:schemas-microsoft-com:office:office" xmlns:v="urn:schemas-microsoft-com:vml" xmlns:pvml="urn:schemas-microsoft-com:office:powerpoint" xmlns:com="http://schemas.openxmlformats.org/drawingml/2006/compatibility" xmlns:p14="http://schemas.microsoft.com/office/powerpoint/2010/main" xmlns:p15="http://schemas.microsoft.com/office/powerpoint/2012/main">
+<p:notesMaster xmlns:a="http://schemas.openxmlformats.org/drawingml/2006/main" xmlns:r="http://schemas.openxmlformats.org/officeDocument/2006/relationships" xmlns:p="http://schemas.openxmlformats.org/presentationml/2006/main">
   <p:cSld>
+    <p:bg>
+      <p:bgRef idx="1001">
+        <a:schemeClr val="bg1"/>
+      </p:bgRef>
+    </p:bg>
     <p:spTree>
       <p:nvGrpSpPr>
-        <p:cNvPr id="2" name="Shape 2"/>
+        <p:cNvPr id="1" name="Shape 2"/>
         <p:cNvGrpSpPr/>
         <p:nvPr/>
       </p:nvGrpSpPr>
@@ -296,9 +301,11 @@
       <p:sp>
         <p:nvSpPr>
           <p:cNvPr id="3" name="Google Shape;3;n"/>
-          <p:cNvSpPr/>
+          <p:cNvSpPr>
+            <a:spLocks noGrp="1" noRot="1" noChangeAspect="1"/>
+          </p:cNvSpPr>
           <p:nvPr>
-            <p:ph idx="2" type="sldImg"/>
+            <p:ph type="sldImg" idx="2"/>
           </p:nvPr>
         </p:nvSpPr>
         <p:spPr>
@@ -307,9 +314,13 @@
             <a:ext cx="6096075" cy="3429000"/>
           </a:xfrm>
           <a:custGeom>
-            <a:rect b="b" l="l" r="r" t="t"/>
+            <a:avLst/>
+            <a:gdLst/>
+            <a:ahLst/>
+            <a:cxnLst/>
+            <a:rect l="l" t="t" r="r" b="b"/>
             <a:pathLst>
-              <a:path extrusionOk="0" h="120000" w="120000">
+              <a:path w="120000" h="120000" extrusionOk="0">
                 <a:moveTo>
                   <a:pt x="0" y="0"/>
                 </a:moveTo>
@@ -327,23 +338,25 @@
             </a:pathLst>
           </a:custGeom>
           <a:noFill/>
-          <a:ln cap="flat" cmpd="sng" w="9525">
+          <a:ln w="9525" cap="flat" cmpd="sng">
             <a:solidFill>
               <a:srgbClr val="000000"/>
             </a:solidFill>
             <a:prstDash val="solid"/>
             <a:round/>
-            <a:headEnd len="sm" w="sm" type="none"/>
-            <a:tailEnd len="sm" w="sm" type="none"/>
+            <a:headEnd type="none" w="sm" len="sm"/>
+            <a:tailEnd type="none" w="sm" len="sm"/>
           </a:ln>
         </p:spPr>
       </p:sp>
       <p:sp>
         <p:nvSpPr>
           <p:cNvPr id="4" name="Google Shape;4;n"/>
-          <p:cNvSpPr txBox="1"/>
+          <p:cNvSpPr txBox="1">
+            <a:spLocks noGrp="1"/>
+          </p:cNvSpPr>
           <p:nvPr>
-            <p:ph idx="1" type="body"/>
+            <p:ph type="body" idx="1"/>
           </p:nvPr>
         </p:nvSpPr>
         <p:spPr>
@@ -360,11 +373,11 @@
           </a:ln>
         </p:spPr>
         <p:txBody>
-          <a:bodyPr anchorCtr="0" anchor="t" bIns="91425" lIns="91425" spcFirstLastPara="1" rIns="91425" wrap="square" tIns="91425">
+          <a:bodyPr spcFirstLastPara="1" wrap="square" lIns="91425" tIns="91425" rIns="91425" bIns="91425" anchor="t" anchorCtr="0">
             <a:noAutofit/>
           </a:bodyPr>
           <a:lstStyle>
-            <a:lvl1pPr indent="-298450" lvl="0" marL="457200">
+            <a:lvl1pPr marL="457200" lvl="0" indent="-298450">
               <a:spcBef>
                 <a:spcPts val="0"/>
               </a:spcBef>
@@ -375,7 +388,7 @@
               <a:buChar char="●"/>
               <a:defRPr sz="1100"/>
             </a:lvl1pPr>
-            <a:lvl2pPr indent="-298450" lvl="1" marL="914400">
+            <a:lvl2pPr marL="914400" lvl="1" indent="-298450">
               <a:spcBef>
                 <a:spcPts val="0"/>
               </a:spcBef>
@@ -386,7 +399,7 @@
               <a:buChar char="○"/>
               <a:defRPr sz="1100"/>
             </a:lvl2pPr>
-            <a:lvl3pPr indent="-298450" lvl="2" marL="1371600">
+            <a:lvl3pPr marL="1371600" lvl="2" indent="-298450">
               <a:spcBef>
                 <a:spcPts val="0"/>
               </a:spcBef>
@@ -397,7 +410,7 @@
               <a:buChar char="■"/>
               <a:defRPr sz="1100"/>
             </a:lvl3pPr>
-            <a:lvl4pPr indent="-298450" lvl="3" marL="1828800">
+            <a:lvl4pPr marL="1828800" lvl="3" indent="-298450">
               <a:spcBef>
                 <a:spcPts val="0"/>
               </a:spcBef>
@@ -408,7 +421,7 @@
               <a:buChar char="●"/>
               <a:defRPr sz="1100"/>
             </a:lvl4pPr>
-            <a:lvl5pPr indent="-298450" lvl="4" marL="2286000">
+            <a:lvl5pPr marL="2286000" lvl="4" indent="-298450">
               <a:spcBef>
                 <a:spcPts val="0"/>
               </a:spcBef>
@@ -419,7 +432,7 @@
               <a:buChar char="○"/>
               <a:defRPr sz="1100"/>
             </a:lvl5pPr>
-            <a:lvl6pPr indent="-298450" lvl="5" marL="2743200">
+            <a:lvl6pPr marL="2743200" lvl="5" indent="-298450">
               <a:spcBef>
                 <a:spcPts val="0"/>
               </a:spcBef>
@@ -430,7 +443,7 @@
               <a:buChar char="■"/>
               <a:defRPr sz="1100"/>
             </a:lvl6pPr>
-            <a:lvl7pPr indent="-298450" lvl="6" marL="3200400">
+            <a:lvl7pPr marL="3200400" lvl="6" indent="-298450">
               <a:spcBef>
                 <a:spcPts val="0"/>
               </a:spcBef>
@@ -441,7 +454,7 @@
               <a:buChar char="●"/>
               <a:defRPr sz="1100"/>
             </a:lvl7pPr>
-            <a:lvl8pPr indent="-298450" lvl="7" marL="3657600">
+            <a:lvl8pPr marL="3657600" lvl="7" indent="-298450">
               <a:spcBef>
                 <a:spcPts val="0"/>
               </a:spcBef>
@@ -452,7 +465,7 @@
               <a:buChar char="○"/>
               <a:defRPr sz="1100"/>
             </a:lvl8pPr>
-            <a:lvl9pPr indent="-298450" lvl="8" marL="4114800">
+            <a:lvl9pPr marL="4114800" lvl="8" indent="-298450">
               <a:spcBef>
                 <a:spcPts val="0"/>
               </a:spcBef>
@@ -464,14 +477,16 @@
               <a:defRPr sz="1100"/>
             </a:lvl9pPr>
           </a:lstStyle>
-          <a:p/>
+          <a:p>
+            <a:endParaRPr/>
+          </a:p>
         </p:txBody>
       </p:sp>
     </p:spTree>
   </p:cSld>
-  <p:clrMap accent1="accent1" accent2="accent2" accent3="accent3" accent4="accent4" accent5="accent5" accent6="accent6" bg1="lt1" bg2="dk2" tx1="dk1" tx2="lt2" folHlink="folHlink" hlink="hlink"/>
+  <p:clrMap bg1="lt1" tx1="dk1" bg2="dk2" tx2="lt2" accent1="accent1" accent2="accent2" accent3="accent3" accent4="accent4" accent5="accent5" accent6="accent6" hlink="hlink" folHlink="folHlink"/>
   <p:notesStyle>
-    <a:defPPr lvl="0" marR="0" rtl="0" algn="l">
+    <a:defPPr marR="0" lvl="0" algn="l" rtl="0">
       <a:lnSpc>
         <a:spcPct val="100000"/>
       </a:lnSpc>
@@ -482,7 +497,7 @@
         <a:spcPts val="0"/>
       </a:spcAft>
     </a:defPPr>
-    <a:lvl1pPr lvl="0" marR="0" rtl="0" algn="l">
+    <a:lvl1pPr marR="0" lvl="0" algn="l" rtl="0">
       <a:lnSpc>
         <a:spcPct val="100000"/>
       </a:lnSpc>
@@ -496,7 +511,7 @@
         <a:srgbClr val="000000"/>
       </a:buClr>
       <a:buFont typeface="Arial"/>
-      <a:defRPr b="0" i="0" sz="1400" u="none" cap="none" strike="noStrike">
+      <a:defRPr sz="1400" b="0" i="0" u="none" strike="noStrike" cap="none">
         <a:solidFill>
           <a:srgbClr val="000000"/>
         </a:solidFill>
@@ -506,7 +521,7 @@
         <a:sym typeface="Arial"/>
       </a:defRPr>
     </a:lvl1pPr>
-    <a:lvl2pPr lvl="1" marR="0" rtl="0" algn="l">
+    <a:lvl2pPr marR="0" lvl="1" algn="l" rtl="0">
       <a:lnSpc>
         <a:spcPct val="100000"/>
       </a:lnSpc>
@@ -520,7 +535,7 @@
         <a:srgbClr val="000000"/>
       </a:buClr>
       <a:buFont typeface="Arial"/>
-      <a:defRPr b="0" i="0" sz="1400" u="none" cap="none" strike="noStrike">
+      <a:defRPr sz="1400" b="0" i="0" u="none" strike="noStrike" cap="none">
         <a:solidFill>
           <a:srgbClr val="000000"/>
         </a:solidFill>
@@ -530,7 +545,7 @@
         <a:sym typeface="Arial"/>
       </a:defRPr>
     </a:lvl2pPr>
-    <a:lvl3pPr lvl="2" marR="0" rtl="0" algn="l">
+    <a:lvl3pPr marR="0" lvl="2" algn="l" rtl="0">
       <a:lnSpc>
         <a:spcPct val="100000"/>
       </a:lnSpc>
@@ -544,7 +559,7 @@
         <a:srgbClr val="000000"/>
       </a:buClr>
       <a:buFont typeface="Arial"/>
-      <a:defRPr b="0" i="0" sz="1400" u="none" cap="none" strike="noStrike">
+      <a:defRPr sz="1400" b="0" i="0" u="none" strike="noStrike" cap="none">
         <a:solidFill>
           <a:srgbClr val="000000"/>
         </a:solidFill>
@@ -554,7 +569,7 @@
         <a:sym typeface="Arial"/>
       </a:defRPr>
     </a:lvl3pPr>
-    <a:lvl4pPr lvl="3" marR="0" rtl="0" algn="l">
+    <a:lvl4pPr marR="0" lvl="3" algn="l" rtl="0">
       <a:lnSpc>
         <a:spcPct val="100000"/>
       </a:lnSpc>
@@ -568,7 +583,7 @@
         <a:srgbClr val="000000"/>
       </a:buClr>
       <a:buFont typeface="Arial"/>
-      <a:defRPr b="0" i="0" sz="1400" u="none" cap="none" strike="noStrike">
+      <a:defRPr sz="1400" b="0" i="0" u="none" strike="noStrike" cap="none">
         <a:solidFill>
           <a:srgbClr val="000000"/>
         </a:solidFill>
@@ -578,7 +593,7 @@
         <a:sym typeface="Arial"/>
       </a:defRPr>
     </a:lvl4pPr>
-    <a:lvl5pPr lvl="4" marR="0" rtl="0" algn="l">
+    <a:lvl5pPr marR="0" lvl="4" algn="l" rtl="0">
       <a:lnSpc>
         <a:spcPct val="100000"/>
       </a:lnSpc>
@@ -592,7 +607,7 @@
         <a:srgbClr val="000000"/>
       </a:buClr>
       <a:buFont typeface="Arial"/>
-      <a:defRPr b="0" i="0" sz="1400" u="none" cap="none" strike="noStrike">
+      <a:defRPr sz="1400" b="0" i="0" u="none" strike="noStrike" cap="none">
         <a:solidFill>
           <a:srgbClr val="000000"/>
         </a:solidFill>
@@ -602,7 +617,7 @@
         <a:sym typeface="Arial"/>
       </a:defRPr>
     </a:lvl5pPr>
-    <a:lvl6pPr lvl="5" marR="0" rtl="0" algn="l">
+    <a:lvl6pPr marR="0" lvl="5" algn="l" rtl="0">
       <a:lnSpc>
         <a:spcPct val="100000"/>
       </a:lnSpc>
@@ -616,7 +631,7 @@
         <a:srgbClr val="000000"/>
       </a:buClr>
       <a:buFont typeface="Arial"/>
-      <a:defRPr b="0" i="0" sz="1400" u="none" cap="none" strike="noStrike">
+      <a:defRPr sz="1400" b="0" i="0" u="none" strike="noStrike" cap="none">
         <a:solidFill>
           <a:srgbClr val="000000"/>
         </a:solidFill>
@@ -626,7 +641,7 @@
         <a:sym typeface="Arial"/>
       </a:defRPr>
     </a:lvl6pPr>
-    <a:lvl7pPr lvl="6" marR="0" rtl="0" algn="l">
+    <a:lvl7pPr marR="0" lvl="6" algn="l" rtl="0">
       <a:lnSpc>
         <a:spcPct val="100000"/>
       </a:lnSpc>
@@ -640,7 +655,7 @@
         <a:srgbClr val="000000"/>
       </a:buClr>
       <a:buFont typeface="Arial"/>
-      <a:defRPr b="0" i="0" sz="1400" u="none" cap="none" strike="noStrike">
+      <a:defRPr sz="1400" b="0" i="0" u="none" strike="noStrike" cap="none">
         <a:solidFill>
           <a:srgbClr val="000000"/>
         </a:solidFill>
@@ -650,7 +665,7 @@
         <a:sym typeface="Arial"/>
       </a:defRPr>
     </a:lvl7pPr>
-    <a:lvl8pPr lvl="7" marR="0" rtl="0" algn="l">
+    <a:lvl8pPr marR="0" lvl="7" algn="l" rtl="0">
       <a:lnSpc>
         <a:spcPct val="100000"/>
       </a:lnSpc>
@@ -664,7 +679,7 @@
         <a:srgbClr val="000000"/>
       </a:buClr>
       <a:buFont typeface="Arial"/>
-      <a:defRPr b="0" i="0" sz="1400" u="none" cap="none" strike="noStrike">
+      <a:defRPr sz="1400" b="0" i="0" u="none" strike="noStrike" cap="none">
         <a:solidFill>
           <a:srgbClr val="000000"/>
         </a:solidFill>
@@ -674,7 +689,7 @@
         <a:sym typeface="Arial"/>
       </a:defRPr>
     </a:lvl8pPr>
-    <a:lvl9pPr lvl="8" marR="0" rtl="0" algn="l">
+    <a:lvl9pPr marR="0" lvl="8" algn="l" rtl="0">
       <a:lnSpc>
         <a:spcPct val="100000"/>
       </a:lnSpc>
@@ -688,7 +703,7 @@
         <a:srgbClr val="000000"/>
       </a:buClr>
       <a:buFont typeface="Arial"/>
-      <a:defRPr b="0" i="0" sz="1400" u="none" cap="none" strike="noStrike">
+      <a:defRPr sz="1400" b="0" i="0" u="none" strike="noStrike" cap="none">
         <a:solidFill>
           <a:srgbClr val="000000"/>
         </a:solidFill>
@@ -703,11 +718,11 @@
 </file>
 
 <file path=ppt/notesSlides/notesSlide1.xml><?xml version="1.0" encoding="utf-8"?>
-<p:notes xmlns:a="http://schemas.openxmlformats.org/drawingml/2006/main" xmlns:r="http://schemas.openxmlformats.org/officeDocument/2006/relationships" xmlns:mc="http://schemas.openxmlformats.org/markup-compatibility/2006" xmlns:mv="urn:schemas-microsoft-com:mac:vml" xmlns:p="http://schemas.openxmlformats.org/presentationml/2006/main" xmlns:c="http://schemas.openxmlformats.org/drawingml/2006/chart" xmlns:dgm="http://schemas.openxmlformats.org/drawingml/2006/diagram" xmlns:o="urn:schemas-microsoft-com:office:office" xmlns:v="urn:schemas-microsoft-com:vml" xmlns:pvml="urn:schemas-microsoft-com:office:powerpoint" xmlns:com="http://schemas.openxmlformats.org/drawingml/2006/compatibility" xmlns:p14="http://schemas.microsoft.com/office/powerpoint/2010/main" xmlns:p15="http://schemas.microsoft.com/office/powerpoint/2012/main" showMasterPhAnim="0" showMasterSp="0">
+<p:notes xmlns:a="http://schemas.openxmlformats.org/drawingml/2006/main" xmlns:r="http://schemas.openxmlformats.org/officeDocument/2006/relationships" xmlns:p="http://schemas.openxmlformats.org/presentationml/2006/main" showMasterSp="0" showMasterPhAnim="0">
   <p:cSld>
     <p:spTree>
       <p:nvGrpSpPr>
-        <p:cNvPr id="55" name="Shape 55"/>
+        <p:cNvPr id="1" name="Shape 55"/>
         <p:cNvGrpSpPr/>
         <p:nvPr/>
       </p:nvGrpSpPr>
@@ -722,20 +737,26 @@
       <p:sp>
         <p:nvSpPr>
           <p:cNvPr id="56" name="Google Shape;56;p:notes"/>
-          <p:cNvSpPr/>
+          <p:cNvSpPr>
+            <a:spLocks noGrp="1" noRot="1" noChangeAspect="1"/>
+          </p:cNvSpPr>
           <p:nvPr>
-            <p:ph idx="2" type="sldImg"/>
+            <p:ph type="sldImg" idx="2"/>
           </p:nvPr>
         </p:nvSpPr>
         <p:spPr>
           <a:xfrm>
-            <a:off x="381300" y="685800"/>
-            <a:ext cx="6096075" cy="3429000"/>
+            <a:off x="381000" y="685800"/>
+            <a:ext cx="6096000" cy="3429000"/>
           </a:xfrm>
           <a:custGeom>
-            <a:rect b="b" l="l" r="r" t="t"/>
+            <a:avLst/>
+            <a:gdLst/>
+            <a:ahLst/>
+            <a:cxnLst/>
+            <a:rect l="l" t="t" r="r" b="b"/>
             <a:pathLst>
-              <a:path extrusionOk="0" h="120000" w="120000">
+              <a:path w="120000" h="120000" extrusionOk="0">
                 <a:moveTo>
                   <a:pt x="0" y="0"/>
                 </a:moveTo>
@@ -757,9 +778,11 @@
       <p:sp>
         <p:nvSpPr>
           <p:cNvPr id="57" name="Google Shape;57;p:notes"/>
-          <p:cNvSpPr txBox="1"/>
+          <p:cNvSpPr txBox="1">
+            <a:spLocks noGrp="1"/>
+          </p:cNvSpPr>
           <p:nvPr>
-            <p:ph idx="1" type="body"/>
+            <p:ph type="body" idx="1"/>
           </p:nvPr>
         </p:nvSpPr>
         <p:spPr>
@@ -772,12 +795,12 @@
           </a:prstGeom>
         </p:spPr>
         <p:txBody>
-          <a:bodyPr anchorCtr="0" anchor="t" bIns="91425" lIns="91425" spcFirstLastPara="1" rIns="91425" wrap="square" tIns="91425">
+          <a:bodyPr spcFirstLastPara="1" wrap="square" lIns="91425" tIns="91425" rIns="91425" bIns="91425" anchor="t" anchorCtr="0">
             <a:noAutofit/>
           </a:bodyPr>
           <a:lstStyle/>
           <a:p>
-            <a:pPr indent="0" lvl="0" marL="0" rtl="0" algn="l">
+            <a:pPr marL="0" lvl="0" indent="0" algn="l" rtl="0">
               <a:spcBef>
                 <a:spcPts val="0"/>
               </a:spcBef>
@@ -786,9 +809,6 @@
               </a:spcAft>
               <a:buNone/>
             </a:pPr>
-            <a:r>
-              <a:t/>
-            </a:r>
             <a:endParaRPr/>
           </a:p>
         </p:txBody>
@@ -802,11 +822,11 @@
 </file>
 
 <file path=ppt/notesSlides/notesSlide2.xml><?xml version="1.0" encoding="utf-8"?>
-<p:notes xmlns:a="http://schemas.openxmlformats.org/drawingml/2006/main" xmlns:r="http://schemas.openxmlformats.org/officeDocument/2006/relationships" xmlns:mc="http://schemas.openxmlformats.org/markup-compatibility/2006" xmlns:mv="urn:schemas-microsoft-com:mac:vml" xmlns:p="http://schemas.openxmlformats.org/presentationml/2006/main" xmlns:c="http://schemas.openxmlformats.org/drawingml/2006/chart" xmlns:dgm="http://schemas.openxmlformats.org/drawingml/2006/diagram" xmlns:o="urn:schemas-microsoft-com:office:office" xmlns:v="urn:schemas-microsoft-com:vml" xmlns:pvml="urn:schemas-microsoft-com:office:powerpoint" xmlns:com="http://schemas.openxmlformats.org/drawingml/2006/compatibility" xmlns:p14="http://schemas.microsoft.com/office/powerpoint/2010/main" xmlns:p15="http://schemas.microsoft.com/office/powerpoint/2012/main" showMasterPhAnim="0" showMasterSp="0">
+<p:notes xmlns:a="http://schemas.openxmlformats.org/drawingml/2006/main" xmlns:r="http://schemas.openxmlformats.org/officeDocument/2006/relationships" xmlns:p="http://schemas.openxmlformats.org/presentationml/2006/main" showMasterSp="0" showMasterPhAnim="0">
   <p:cSld>
     <p:spTree>
       <p:nvGrpSpPr>
-        <p:cNvPr id="63" name="Shape 63"/>
+        <p:cNvPr id="1" name="Shape 63"/>
         <p:cNvGrpSpPr/>
         <p:nvPr/>
       </p:nvGrpSpPr>
@@ -821,9 +841,11 @@
       <p:sp>
         <p:nvSpPr>
           <p:cNvPr id="64" name="Google Shape;64;g63c8cfdb8f_1_5:notes"/>
-          <p:cNvSpPr/>
+          <p:cNvSpPr>
+            <a:spLocks noGrp="1" noRot="1" noChangeAspect="1"/>
+          </p:cNvSpPr>
           <p:nvPr>
-            <p:ph idx="2" type="sldImg"/>
+            <p:ph type="sldImg" idx="2"/>
           </p:nvPr>
         </p:nvSpPr>
         <p:spPr>
@@ -832,9 +854,13 @@
             <a:ext cx="6096000" cy="3429000"/>
           </a:xfrm>
           <a:custGeom>
-            <a:rect b="b" l="l" r="r" t="t"/>
+            <a:avLst/>
+            <a:gdLst/>
+            <a:ahLst/>
+            <a:cxnLst/>
+            <a:rect l="l" t="t" r="r" b="b"/>
             <a:pathLst>
-              <a:path extrusionOk="0" h="120000" w="120000">
+              <a:path w="120000" h="120000" extrusionOk="0">
                 <a:moveTo>
                   <a:pt x="0" y="0"/>
                 </a:moveTo>
@@ -856,9 +882,11 @@
       <p:sp>
         <p:nvSpPr>
           <p:cNvPr id="65" name="Google Shape;65;g63c8cfdb8f_1_5:notes"/>
-          <p:cNvSpPr txBox="1"/>
+          <p:cNvSpPr txBox="1">
+            <a:spLocks noGrp="1"/>
+          </p:cNvSpPr>
           <p:nvPr>
-            <p:ph idx="1" type="body"/>
+            <p:ph type="body" idx="1"/>
           </p:nvPr>
         </p:nvSpPr>
         <p:spPr>
@@ -871,12 +899,12 @@
           </a:prstGeom>
         </p:spPr>
         <p:txBody>
-          <a:bodyPr anchorCtr="0" anchor="t" bIns="91425" lIns="91425" spcFirstLastPara="1" rIns="91425" wrap="square" tIns="91425">
+          <a:bodyPr spcFirstLastPara="1" wrap="square" lIns="91425" tIns="91425" rIns="91425" bIns="91425" anchor="t" anchorCtr="0">
             <a:noAutofit/>
           </a:bodyPr>
           <a:lstStyle/>
           <a:p>
-            <a:pPr indent="0" lvl="0" marL="0" rtl="0" algn="l">
+            <a:pPr marL="0" lvl="0" indent="0" algn="l" rtl="0">
               <a:spcBef>
                 <a:spcPts val="0"/>
               </a:spcBef>
@@ -885,9 +913,6 @@
               </a:spcAft>
               <a:buNone/>
             </a:pPr>
-            <a:r>
-              <a:t/>
-            </a:r>
             <a:endParaRPr/>
           </a:p>
         </p:txBody>
@@ -901,11 +926,11 @@
 </file>
 
 <file path=ppt/notesSlides/notesSlide3.xml><?xml version="1.0" encoding="utf-8"?>
-<p:notes xmlns:a="http://schemas.openxmlformats.org/drawingml/2006/main" xmlns:r="http://schemas.openxmlformats.org/officeDocument/2006/relationships" xmlns:mc="http://schemas.openxmlformats.org/markup-compatibility/2006" xmlns:mv="urn:schemas-microsoft-com:mac:vml" xmlns:p="http://schemas.openxmlformats.org/presentationml/2006/main" xmlns:c="http://schemas.openxmlformats.org/drawingml/2006/chart" xmlns:dgm="http://schemas.openxmlformats.org/drawingml/2006/diagram" xmlns:o="urn:schemas-microsoft-com:office:office" xmlns:v="urn:schemas-microsoft-com:vml" xmlns:pvml="urn:schemas-microsoft-com:office:powerpoint" xmlns:com="http://schemas.openxmlformats.org/drawingml/2006/compatibility" xmlns:p14="http://schemas.microsoft.com/office/powerpoint/2010/main" xmlns:p15="http://schemas.microsoft.com/office/powerpoint/2012/main" showMasterPhAnim="0" showMasterSp="0">
+<p:notes xmlns:a="http://schemas.openxmlformats.org/drawingml/2006/main" xmlns:r="http://schemas.openxmlformats.org/officeDocument/2006/relationships" xmlns:p="http://schemas.openxmlformats.org/presentationml/2006/main" showMasterSp="0" showMasterPhAnim="0">
   <p:cSld>
     <p:spTree>
       <p:nvGrpSpPr>
-        <p:cNvPr id="69" name="Shape 69"/>
+        <p:cNvPr id="1" name="Shape 69"/>
         <p:cNvGrpSpPr/>
         <p:nvPr/>
       </p:nvGrpSpPr>
@@ -920,9 +945,11 @@
       <p:sp>
         <p:nvSpPr>
           <p:cNvPr id="70" name="Google Shape;70;g63dd875dbd_0_0:notes"/>
-          <p:cNvSpPr/>
+          <p:cNvSpPr>
+            <a:spLocks noGrp="1" noRot="1" noChangeAspect="1"/>
+          </p:cNvSpPr>
           <p:nvPr>
-            <p:ph idx="2" type="sldImg"/>
+            <p:ph type="sldImg" idx="2"/>
           </p:nvPr>
         </p:nvSpPr>
         <p:spPr>
@@ -931,9 +958,13 @@
             <a:ext cx="6096000" cy="3429000"/>
           </a:xfrm>
           <a:custGeom>
-            <a:rect b="b" l="l" r="r" t="t"/>
+            <a:avLst/>
+            <a:gdLst/>
+            <a:ahLst/>
+            <a:cxnLst/>
+            <a:rect l="l" t="t" r="r" b="b"/>
             <a:pathLst>
-              <a:path extrusionOk="0" h="120000" w="120000">
+              <a:path w="120000" h="120000" extrusionOk="0">
                 <a:moveTo>
                   <a:pt x="0" y="0"/>
                 </a:moveTo>
@@ -955,9 +986,11 @@
       <p:sp>
         <p:nvSpPr>
           <p:cNvPr id="71" name="Google Shape;71;g63dd875dbd_0_0:notes"/>
-          <p:cNvSpPr txBox="1"/>
+          <p:cNvSpPr txBox="1">
+            <a:spLocks noGrp="1"/>
+          </p:cNvSpPr>
           <p:nvPr>
-            <p:ph idx="1" type="body"/>
+            <p:ph type="body" idx="1"/>
           </p:nvPr>
         </p:nvSpPr>
         <p:spPr>
@@ -970,12 +1003,12 @@
           </a:prstGeom>
         </p:spPr>
         <p:txBody>
-          <a:bodyPr anchorCtr="0" anchor="t" bIns="91425" lIns="91425" spcFirstLastPara="1" rIns="91425" wrap="square" tIns="91425">
+          <a:bodyPr spcFirstLastPara="1" wrap="square" lIns="91425" tIns="91425" rIns="91425" bIns="91425" anchor="t" anchorCtr="0">
             <a:noAutofit/>
           </a:bodyPr>
           <a:lstStyle/>
           <a:p>
-            <a:pPr indent="0" lvl="0" marL="0" rtl="0" algn="l">
+            <a:pPr marL="0" lvl="0" indent="0" algn="l" rtl="0">
               <a:spcBef>
                 <a:spcPts val="0"/>
               </a:spcBef>
@@ -984,9 +1017,6 @@
               </a:spcAft>
               <a:buNone/>
             </a:pPr>
-            <a:r>
-              <a:t/>
-            </a:r>
             <a:endParaRPr/>
           </a:p>
         </p:txBody>
@@ -1000,11 +1030,11 @@
 </file>
 
 <file path=ppt/notesSlides/notesSlide4.xml><?xml version="1.0" encoding="utf-8"?>
-<p:notes xmlns:a="http://schemas.openxmlformats.org/drawingml/2006/main" xmlns:r="http://schemas.openxmlformats.org/officeDocument/2006/relationships" xmlns:mc="http://schemas.openxmlformats.org/markup-compatibility/2006" xmlns:mv="urn:schemas-microsoft-com:mac:vml" xmlns:p="http://schemas.openxmlformats.org/presentationml/2006/main" xmlns:c="http://schemas.openxmlformats.org/drawingml/2006/chart" xmlns:dgm="http://schemas.openxmlformats.org/drawingml/2006/diagram" xmlns:o="urn:schemas-microsoft-com:office:office" xmlns:v="urn:schemas-microsoft-com:vml" xmlns:pvml="urn:schemas-microsoft-com:office:powerpoint" xmlns:com="http://schemas.openxmlformats.org/drawingml/2006/compatibility" xmlns:p14="http://schemas.microsoft.com/office/powerpoint/2010/main" xmlns:p15="http://schemas.microsoft.com/office/powerpoint/2012/main" showMasterPhAnim="0" showMasterSp="0">
+<p:notes xmlns:a="http://schemas.openxmlformats.org/drawingml/2006/main" xmlns:r="http://schemas.openxmlformats.org/officeDocument/2006/relationships" xmlns:p="http://schemas.openxmlformats.org/presentationml/2006/main" showMasterSp="0" showMasterPhAnim="0">
   <p:cSld>
     <p:spTree>
       <p:nvGrpSpPr>
-        <p:cNvPr id="75" name="Shape 75"/>
+        <p:cNvPr id="1" name="Shape 75"/>
         <p:cNvGrpSpPr/>
         <p:nvPr/>
       </p:nvGrpSpPr>
@@ -1019,9 +1049,11 @@
       <p:sp>
         <p:nvSpPr>
           <p:cNvPr id="76" name="Google Shape;76;g63dd875dbd_0_682:notes"/>
-          <p:cNvSpPr/>
+          <p:cNvSpPr>
+            <a:spLocks noGrp="1" noRot="1" noChangeAspect="1"/>
+          </p:cNvSpPr>
           <p:nvPr>
-            <p:ph idx="2" type="sldImg"/>
+            <p:ph type="sldImg" idx="2"/>
           </p:nvPr>
         </p:nvSpPr>
         <p:spPr>
@@ -1030,9 +1062,13 @@
             <a:ext cx="6096000" cy="3429000"/>
           </a:xfrm>
           <a:custGeom>
-            <a:rect b="b" l="l" r="r" t="t"/>
+            <a:avLst/>
+            <a:gdLst/>
+            <a:ahLst/>
+            <a:cxnLst/>
+            <a:rect l="l" t="t" r="r" b="b"/>
             <a:pathLst>
-              <a:path extrusionOk="0" h="120000" w="120000">
+              <a:path w="120000" h="120000" extrusionOk="0">
                 <a:moveTo>
                   <a:pt x="0" y="0"/>
                 </a:moveTo>
@@ -1054,9 +1090,11 @@
       <p:sp>
         <p:nvSpPr>
           <p:cNvPr id="77" name="Google Shape;77;g63dd875dbd_0_682:notes"/>
-          <p:cNvSpPr txBox="1"/>
+          <p:cNvSpPr txBox="1">
+            <a:spLocks noGrp="1"/>
+          </p:cNvSpPr>
           <p:nvPr>
-            <p:ph idx="1" type="body"/>
+            <p:ph type="body" idx="1"/>
           </p:nvPr>
         </p:nvSpPr>
         <p:spPr>
@@ -1069,12 +1107,12 @@
           </a:prstGeom>
         </p:spPr>
         <p:txBody>
-          <a:bodyPr anchorCtr="0" anchor="t" bIns="91425" lIns="91425" spcFirstLastPara="1" rIns="91425" wrap="square" tIns="91425">
+          <a:bodyPr spcFirstLastPara="1" wrap="square" lIns="91425" tIns="91425" rIns="91425" bIns="91425" anchor="t" anchorCtr="0">
             <a:noAutofit/>
           </a:bodyPr>
           <a:lstStyle/>
           <a:p>
-            <a:pPr indent="0" lvl="0" marL="0" rtl="0" algn="l">
+            <a:pPr marL="0" lvl="0" indent="0" algn="l" rtl="0">
               <a:spcBef>
                 <a:spcPts val="0"/>
               </a:spcBef>
@@ -1083,9 +1121,6 @@
               </a:spcAft>
               <a:buNone/>
             </a:pPr>
-            <a:r>
-              <a:t/>
-            </a:r>
             <a:endParaRPr/>
           </a:p>
         </p:txBody>
@@ -1099,11 +1134,11 @@
 </file>
 
 <file path=ppt/notesSlides/notesSlide5.xml><?xml version="1.0" encoding="utf-8"?>
-<p:notes xmlns:a="http://schemas.openxmlformats.org/drawingml/2006/main" xmlns:r="http://schemas.openxmlformats.org/officeDocument/2006/relationships" xmlns:mc="http://schemas.openxmlformats.org/markup-compatibility/2006" xmlns:mv="urn:schemas-microsoft-com:mac:vml" xmlns:p="http://schemas.openxmlformats.org/presentationml/2006/main" xmlns:c="http://schemas.openxmlformats.org/drawingml/2006/chart" xmlns:dgm="http://schemas.openxmlformats.org/drawingml/2006/diagram" xmlns:o="urn:schemas-microsoft-com:office:office" xmlns:v="urn:schemas-microsoft-com:vml" xmlns:pvml="urn:schemas-microsoft-com:office:powerpoint" xmlns:com="http://schemas.openxmlformats.org/drawingml/2006/compatibility" xmlns:p14="http://schemas.microsoft.com/office/powerpoint/2010/main" xmlns:p15="http://schemas.microsoft.com/office/powerpoint/2012/main" showMasterPhAnim="0" showMasterSp="0">
+<p:notes xmlns:a="http://schemas.openxmlformats.org/drawingml/2006/main" xmlns:r="http://schemas.openxmlformats.org/officeDocument/2006/relationships" xmlns:p="http://schemas.openxmlformats.org/presentationml/2006/main" showMasterSp="0" showMasterPhAnim="0">
   <p:cSld>
     <p:spTree>
       <p:nvGrpSpPr>
-        <p:cNvPr id="81" name="Shape 81"/>
+        <p:cNvPr id="1" name="Shape 81"/>
         <p:cNvGrpSpPr/>
         <p:nvPr/>
       </p:nvGrpSpPr>
@@ -1118,9 +1153,11 @@
       <p:sp>
         <p:nvSpPr>
           <p:cNvPr id="82" name="Google Shape;82;g63c8cfdb8f_0_50:notes"/>
-          <p:cNvSpPr/>
+          <p:cNvSpPr>
+            <a:spLocks noGrp="1" noRot="1" noChangeAspect="1"/>
+          </p:cNvSpPr>
           <p:nvPr>
-            <p:ph idx="2" type="sldImg"/>
+            <p:ph type="sldImg" idx="2"/>
           </p:nvPr>
         </p:nvSpPr>
         <p:spPr>
@@ -1129,9 +1166,13 @@
             <a:ext cx="6096000" cy="3429000"/>
           </a:xfrm>
           <a:custGeom>
-            <a:rect b="b" l="l" r="r" t="t"/>
+            <a:avLst/>
+            <a:gdLst/>
+            <a:ahLst/>
+            <a:cxnLst/>
+            <a:rect l="l" t="t" r="r" b="b"/>
             <a:pathLst>
-              <a:path extrusionOk="0" h="120000" w="120000">
+              <a:path w="120000" h="120000" extrusionOk="0">
                 <a:moveTo>
                   <a:pt x="0" y="0"/>
                 </a:moveTo>
@@ -1153,9 +1194,11 @@
       <p:sp>
         <p:nvSpPr>
           <p:cNvPr id="83" name="Google Shape;83;g63c8cfdb8f_0_50:notes"/>
-          <p:cNvSpPr txBox="1"/>
+          <p:cNvSpPr txBox="1">
+            <a:spLocks noGrp="1"/>
+          </p:cNvSpPr>
           <p:nvPr>
-            <p:ph idx="1" type="body"/>
+            <p:ph type="body" idx="1"/>
           </p:nvPr>
         </p:nvSpPr>
         <p:spPr>
@@ -1168,12 +1211,12 @@
           </a:prstGeom>
         </p:spPr>
         <p:txBody>
-          <a:bodyPr anchorCtr="0" anchor="t" bIns="91425" lIns="91425" spcFirstLastPara="1" rIns="91425" wrap="square" tIns="91425">
+          <a:bodyPr spcFirstLastPara="1" wrap="square" lIns="91425" tIns="91425" rIns="91425" bIns="91425" anchor="t" anchorCtr="0">
             <a:noAutofit/>
           </a:bodyPr>
           <a:lstStyle/>
           <a:p>
-            <a:pPr indent="0" lvl="0" marL="0" rtl="0" algn="l">
+            <a:pPr marL="0" lvl="0" indent="0" algn="l" rtl="0">
               <a:spcBef>
                 <a:spcPts val="0"/>
               </a:spcBef>
@@ -1182,9 +1225,6 @@
               </a:spcAft>
               <a:buNone/>
             </a:pPr>
-            <a:r>
-              <a:t/>
-            </a:r>
             <a:endParaRPr/>
           </a:p>
         </p:txBody>
@@ -1198,11 +1238,11 @@
 </file>
 
 <file path=ppt/notesSlides/notesSlide6.xml><?xml version="1.0" encoding="utf-8"?>
-<p:notes xmlns:a="http://schemas.openxmlformats.org/drawingml/2006/main" xmlns:r="http://schemas.openxmlformats.org/officeDocument/2006/relationships" xmlns:mc="http://schemas.openxmlformats.org/markup-compatibility/2006" xmlns:mv="urn:schemas-microsoft-com:mac:vml" xmlns:p="http://schemas.openxmlformats.org/presentationml/2006/main" xmlns:c="http://schemas.openxmlformats.org/drawingml/2006/chart" xmlns:dgm="http://schemas.openxmlformats.org/drawingml/2006/diagram" xmlns:o="urn:schemas-microsoft-com:office:office" xmlns:v="urn:schemas-microsoft-com:vml" xmlns:pvml="urn:schemas-microsoft-com:office:powerpoint" xmlns:com="http://schemas.openxmlformats.org/drawingml/2006/compatibility" xmlns:p14="http://schemas.microsoft.com/office/powerpoint/2010/main" xmlns:p15="http://schemas.microsoft.com/office/powerpoint/2012/main" showMasterPhAnim="0" showMasterSp="0">
+<p:notes xmlns:a="http://schemas.openxmlformats.org/drawingml/2006/main" xmlns:r="http://schemas.openxmlformats.org/officeDocument/2006/relationships" xmlns:p="http://schemas.openxmlformats.org/presentationml/2006/main" showMasterSp="0" showMasterPhAnim="0">
   <p:cSld>
     <p:spTree>
       <p:nvGrpSpPr>
-        <p:cNvPr id="87" name="Shape 87"/>
+        <p:cNvPr id="1" name="Shape 87"/>
         <p:cNvGrpSpPr/>
         <p:nvPr/>
       </p:nvGrpSpPr>
@@ -1217,9 +1257,11 @@
       <p:sp>
         <p:nvSpPr>
           <p:cNvPr id="88" name="Google Shape;88;g63dd875dbd_0_689:notes"/>
-          <p:cNvSpPr/>
+          <p:cNvSpPr>
+            <a:spLocks noGrp="1" noRot="1" noChangeAspect="1"/>
+          </p:cNvSpPr>
           <p:nvPr>
-            <p:ph idx="2" type="sldImg"/>
+            <p:ph type="sldImg" idx="2"/>
           </p:nvPr>
         </p:nvSpPr>
         <p:spPr>
@@ -1228,9 +1270,13 @@
             <a:ext cx="6096000" cy="3429000"/>
           </a:xfrm>
           <a:custGeom>
-            <a:rect b="b" l="l" r="r" t="t"/>
+            <a:avLst/>
+            <a:gdLst/>
+            <a:ahLst/>
+            <a:cxnLst/>
+            <a:rect l="l" t="t" r="r" b="b"/>
             <a:pathLst>
-              <a:path extrusionOk="0" h="120000" w="120000">
+              <a:path w="120000" h="120000" extrusionOk="0">
                 <a:moveTo>
                   <a:pt x="0" y="0"/>
                 </a:moveTo>
@@ -1252,9 +1298,11 @@
       <p:sp>
         <p:nvSpPr>
           <p:cNvPr id="89" name="Google Shape;89;g63dd875dbd_0_689:notes"/>
-          <p:cNvSpPr txBox="1"/>
+          <p:cNvSpPr txBox="1">
+            <a:spLocks noGrp="1"/>
+          </p:cNvSpPr>
           <p:nvPr>
-            <p:ph idx="1" type="body"/>
+            <p:ph type="body" idx="1"/>
           </p:nvPr>
         </p:nvSpPr>
         <p:spPr>
@@ -1267,12 +1315,12 @@
           </a:prstGeom>
         </p:spPr>
         <p:txBody>
-          <a:bodyPr anchorCtr="0" anchor="t" bIns="91425" lIns="91425" spcFirstLastPara="1" rIns="91425" wrap="square" tIns="91425">
+          <a:bodyPr spcFirstLastPara="1" wrap="square" lIns="91425" tIns="91425" rIns="91425" bIns="91425" anchor="t" anchorCtr="0">
             <a:noAutofit/>
           </a:bodyPr>
           <a:lstStyle/>
           <a:p>
-            <a:pPr indent="0" lvl="0" marL="0" rtl="0" algn="l">
+            <a:pPr marL="0" lvl="0" indent="0" algn="l" rtl="0">
               <a:spcBef>
                 <a:spcPts val="0"/>
               </a:spcBef>
@@ -1281,9 +1329,6 @@
               </a:spcAft>
               <a:buNone/>
             </a:pPr>
-            <a:r>
-              <a:t/>
-            </a:r>
             <a:endParaRPr/>
           </a:p>
         </p:txBody>
@@ -1297,11 +1342,11 @@
 </file>
 
 <file path=ppt/slideLayouts/slideLayout1.xml><?xml version="1.0" encoding="utf-8"?>
-<p:sldLayout xmlns:a="http://schemas.openxmlformats.org/drawingml/2006/main" xmlns:r="http://schemas.openxmlformats.org/officeDocument/2006/relationships" xmlns:mc="http://schemas.openxmlformats.org/markup-compatibility/2006" xmlns:mv="urn:schemas-microsoft-com:mac:vml" xmlns:p="http://schemas.openxmlformats.org/presentationml/2006/main" xmlns:c="http://schemas.openxmlformats.org/drawingml/2006/chart" xmlns:dgm="http://schemas.openxmlformats.org/drawingml/2006/diagram" xmlns:o="urn:schemas-microsoft-com:office:office" xmlns:v="urn:schemas-microsoft-com:vml" xmlns:pvml="urn:schemas-microsoft-com:office:powerpoint" xmlns:com="http://schemas.openxmlformats.org/drawingml/2006/compatibility" xmlns:p14="http://schemas.microsoft.com/office/powerpoint/2010/main" xmlns:p15="http://schemas.microsoft.com/office/powerpoint/2012/main" matchingName="Title slide" type="title">
+<p:sldLayout xmlns:a="http://schemas.openxmlformats.org/drawingml/2006/main" xmlns:r="http://schemas.openxmlformats.org/officeDocument/2006/relationships" xmlns:p="http://schemas.openxmlformats.org/presentationml/2006/main" matchingName="Title slide" type="title">
   <p:cSld name="TITLE">
     <p:spTree>
       <p:nvGrpSpPr>
-        <p:cNvPr id="9" name="Shape 9"/>
+        <p:cNvPr id="1" name="Shape 9"/>
         <p:cNvGrpSpPr/>
         <p:nvPr/>
       </p:nvGrpSpPr>
@@ -1349,12 +1394,12 @@
             </a:ln>
           </p:spPr>
           <p:txBody>
-            <a:bodyPr anchorCtr="0" anchor="ctr" bIns="91425" lIns="91425" spcFirstLastPara="1" rIns="91425" wrap="square" tIns="91425">
+            <a:bodyPr spcFirstLastPara="1" wrap="square" lIns="91425" tIns="91425" rIns="91425" bIns="91425" anchor="ctr" anchorCtr="0">
               <a:noAutofit/>
             </a:bodyPr>
             <a:lstStyle/>
             <a:p>
-              <a:pPr indent="0" lvl="0" marL="0" rtl="0" algn="l">
+              <a:pPr marL="0" lvl="0" indent="0" algn="l" rtl="0">
                 <a:spcBef>
                   <a:spcPts val="0"/>
                 </a:spcBef>
@@ -1363,9 +1408,6 @@
                 </a:spcAft>
                 <a:buNone/>
               </a:pPr>
-              <a:r>
-                <a:t/>
-              </a:r>
               <a:endParaRPr/>
             </a:p>
           </p:txBody>
@@ -1392,12 +1434,12 @@
             </a:ln>
           </p:spPr>
           <p:txBody>
-            <a:bodyPr anchorCtr="0" anchor="ctr" bIns="91425" lIns="91425" spcFirstLastPara="1" rIns="91425" wrap="square" tIns="91425">
+            <a:bodyPr spcFirstLastPara="1" wrap="square" lIns="91425" tIns="91425" rIns="91425" bIns="91425" anchor="ctr" anchorCtr="0">
               <a:noAutofit/>
             </a:bodyPr>
             <a:lstStyle/>
             <a:p>
-              <a:pPr indent="0" lvl="0" marL="0" rtl="0" algn="l">
+              <a:pPr marL="0" lvl="0" indent="0" algn="l" rtl="0">
                 <a:spcBef>
                   <a:spcPts val="0"/>
                 </a:spcBef>
@@ -1406,9 +1448,6 @@
                 </a:spcAft>
                 <a:buNone/>
               </a:pPr>
-              <a:r>
-                <a:t/>
-              </a:r>
               <a:endParaRPr/>
             </a:p>
           </p:txBody>
@@ -1435,12 +1474,12 @@
             </a:ln>
           </p:spPr>
           <p:txBody>
-            <a:bodyPr anchorCtr="0" anchor="ctr" bIns="91425" lIns="91425" spcFirstLastPara="1" rIns="91425" wrap="square" tIns="91425">
+            <a:bodyPr spcFirstLastPara="1" wrap="square" lIns="91425" tIns="91425" rIns="91425" bIns="91425" anchor="ctr" anchorCtr="0">
               <a:noAutofit/>
             </a:bodyPr>
             <a:lstStyle/>
             <a:p>
-              <a:pPr indent="0" lvl="0" marL="0" rtl="0" algn="l">
+              <a:pPr marL="0" lvl="0" indent="0" algn="l" rtl="0">
                 <a:spcBef>
                   <a:spcPts val="0"/>
                 </a:spcBef>
@@ -1449,9 +1488,6 @@
                 </a:spcAft>
                 <a:buNone/>
               </a:pPr>
-              <a:r>
-                <a:t/>
-              </a:r>
               <a:endParaRPr/>
             </a:p>
           </p:txBody>
@@ -1460,7 +1496,9 @@
       <p:sp>
         <p:nvSpPr>
           <p:cNvPr id="14" name="Google Shape;14;p2"/>
-          <p:cNvSpPr txBox="1"/>
+          <p:cNvSpPr txBox="1">
+            <a:spLocks noGrp="1"/>
+          </p:cNvSpPr>
           <p:nvPr>
             <p:ph type="ctrTitle"/>
           </p:nvPr>
@@ -1475,7 +1513,7 @@
           </a:prstGeom>
         </p:spPr>
         <p:txBody>
-          <a:bodyPr anchorCtr="0" anchor="b" bIns="91425" lIns="91425" spcFirstLastPara="1" rIns="91425" wrap="square" tIns="91425">
+          <a:bodyPr spcFirstLastPara="1" wrap="square" lIns="91425" tIns="91425" rIns="91425" bIns="91425" anchor="b" anchorCtr="0">
             <a:noAutofit/>
           </a:bodyPr>
           <a:lstStyle>
@@ -1579,15 +1617,19 @@
               <a:defRPr sz="4800"/>
             </a:lvl9pPr>
           </a:lstStyle>
-          <a:p/>
+          <a:p>
+            <a:endParaRPr/>
+          </a:p>
         </p:txBody>
       </p:sp>
       <p:sp>
         <p:nvSpPr>
           <p:cNvPr id="15" name="Google Shape;15;p2"/>
-          <p:cNvSpPr txBox="1"/>
+          <p:cNvSpPr txBox="1">
+            <a:spLocks noGrp="1"/>
+          </p:cNvSpPr>
           <p:nvPr>
-            <p:ph idx="1" type="subTitle"/>
+            <p:ph type="subTitle" idx="1"/>
           </p:nvPr>
         </p:nvSpPr>
         <p:spPr>
@@ -1600,7 +1642,7 @@
           </a:prstGeom>
         </p:spPr>
         <p:txBody>
-          <a:bodyPr anchorCtr="0" anchor="t" bIns="91425" lIns="91425" spcFirstLastPara="1" rIns="91425" wrap="square" tIns="91425">
+          <a:bodyPr spcFirstLastPara="1" wrap="square" lIns="91425" tIns="91425" rIns="91425" bIns="91425" anchor="t" anchorCtr="0">
             <a:noAutofit/>
           </a:bodyPr>
           <a:lstStyle>
@@ -1731,15 +1773,19 @@
               <a:defRPr sz="2100"/>
             </a:lvl9pPr>
           </a:lstStyle>
-          <a:p/>
+          <a:p>
+            <a:endParaRPr/>
+          </a:p>
         </p:txBody>
       </p:sp>
       <p:sp>
         <p:nvSpPr>
           <p:cNvPr id="16" name="Google Shape;16;p2"/>
-          <p:cNvSpPr txBox="1"/>
+          <p:cNvSpPr txBox="1">
+            <a:spLocks noGrp="1"/>
+          </p:cNvSpPr>
           <p:nvPr>
-            <p:ph idx="12" type="sldNum"/>
+            <p:ph type="sldNum" idx="12"/>
           </p:nvPr>
         </p:nvSpPr>
         <p:spPr>
@@ -1752,7 +1798,7 @@
           </a:prstGeom>
         </p:spPr>
         <p:txBody>
-          <a:bodyPr anchorCtr="0" anchor="ctr" bIns="91425" lIns="91425" spcFirstLastPara="1" rIns="91425" wrap="square" tIns="91425">
+          <a:bodyPr spcFirstLastPara="1" wrap="square" lIns="91425" tIns="91425" rIns="91425" bIns="91425" anchor="ctr" anchorCtr="0">
             <a:noAutofit/>
           </a:bodyPr>
           <a:lstStyle>
@@ -1794,7 +1840,7 @@
             </a:lvl9pPr>
           </a:lstStyle>
           <a:p>
-            <a:pPr indent="0" lvl="0" marL="0" rtl="0" algn="r">
+            <a:pPr marL="0" lvl="0" indent="0" algn="r" rtl="0">
               <a:spcBef>
                 <a:spcPts val="0"/>
               </a:spcBef>
@@ -1820,11 +1866,11 @@
 </file>
 
 <file path=ppt/slideLayouts/slideLayout10.xml><?xml version="1.0" encoding="utf-8"?>
-<p:sldLayout xmlns:a="http://schemas.openxmlformats.org/drawingml/2006/main" xmlns:r="http://schemas.openxmlformats.org/officeDocument/2006/relationships" xmlns:mc="http://schemas.openxmlformats.org/markup-compatibility/2006" xmlns:mv="urn:schemas-microsoft-com:mac:vml" xmlns:p="http://schemas.openxmlformats.org/presentationml/2006/main" xmlns:c="http://schemas.openxmlformats.org/drawingml/2006/chart" xmlns:dgm="http://schemas.openxmlformats.org/drawingml/2006/diagram" xmlns:o="urn:schemas-microsoft-com:office:office" xmlns:v="urn:schemas-microsoft-com:vml" xmlns:pvml="urn:schemas-microsoft-com:office:powerpoint" xmlns:com="http://schemas.openxmlformats.org/drawingml/2006/compatibility" xmlns:p14="http://schemas.microsoft.com/office/powerpoint/2010/main" xmlns:p15="http://schemas.microsoft.com/office/powerpoint/2012/main" matchingName="Big number">
+<p:sldLayout xmlns:a="http://schemas.openxmlformats.org/drawingml/2006/main" xmlns:r="http://schemas.openxmlformats.org/officeDocument/2006/relationships" xmlns:p="http://schemas.openxmlformats.org/presentationml/2006/main" matchingName="Big number">
   <p:cSld name="BIG_NUMBER">
     <p:spTree>
       <p:nvGrpSpPr>
-        <p:cNvPr id="49" name="Shape 49"/>
+        <p:cNvPr id="1" name="Shape 49"/>
         <p:cNvGrpSpPr/>
         <p:nvPr/>
       </p:nvGrpSpPr>
@@ -1839,9 +1885,11 @@
       <p:sp>
         <p:nvSpPr>
           <p:cNvPr id="50" name="Google Shape;50;p11"/>
-          <p:cNvSpPr txBox="1"/>
+          <p:cNvSpPr txBox="1">
+            <a:spLocks noGrp="1"/>
+          </p:cNvSpPr>
           <p:nvPr>
-            <p:ph hasCustomPrompt="1" type="title"/>
+            <p:ph type="title" hasCustomPrompt="1"/>
           </p:nvPr>
         </p:nvSpPr>
         <p:spPr>
@@ -1854,7 +1902,7 @@
           </a:prstGeom>
         </p:spPr>
         <p:txBody>
-          <a:bodyPr anchorCtr="0" anchor="b" bIns="91425" lIns="91425" spcFirstLastPara="1" rIns="91425" wrap="square" tIns="91425">
+          <a:bodyPr spcFirstLastPara="1" wrap="square" lIns="91425" tIns="91425" rIns="91425" bIns="91425" anchor="b" anchorCtr="0">
             <a:noAutofit/>
           </a:bodyPr>
           <a:lstStyle>
@@ -1968,9 +2016,11 @@
       <p:sp>
         <p:nvSpPr>
           <p:cNvPr id="51" name="Google Shape;51;p11"/>
-          <p:cNvSpPr txBox="1"/>
+          <p:cNvSpPr txBox="1">
+            <a:spLocks noGrp="1"/>
+          </p:cNvSpPr>
           <p:nvPr>
-            <p:ph idx="1" type="body"/>
+            <p:ph type="body" idx="1"/>
           </p:nvPr>
         </p:nvSpPr>
         <p:spPr>
@@ -1983,11 +2033,11 @@
           </a:prstGeom>
         </p:spPr>
         <p:txBody>
-          <a:bodyPr anchorCtr="0" anchor="t" bIns="91425" lIns="91425" spcFirstLastPara="1" rIns="91425" wrap="square" tIns="91425">
+          <a:bodyPr spcFirstLastPara="1" wrap="square" lIns="91425" tIns="91425" rIns="91425" bIns="91425" anchor="t" anchorCtr="0">
             <a:noAutofit/>
           </a:bodyPr>
           <a:lstStyle>
-            <a:lvl1pPr indent="-342900" lvl="0" marL="457200" algn="ctr">
+            <a:lvl1pPr marL="457200" lvl="0" indent="-342900" algn="ctr">
               <a:spcBef>
                 <a:spcPts val="0"/>
               </a:spcBef>
@@ -1998,7 +2048,7 @@
               <a:buChar char="●"/>
               <a:defRPr/>
             </a:lvl1pPr>
-            <a:lvl2pPr indent="-317500" lvl="1" marL="914400" algn="ctr">
+            <a:lvl2pPr marL="914400" lvl="1" indent="-317500" algn="ctr">
               <a:spcBef>
                 <a:spcPts val="1600"/>
               </a:spcBef>
@@ -2009,7 +2059,7 @@
               <a:buChar char="○"/>
               <a:defRPr/>
             </a:lvl2pPr>
-            <a:lvl3pPr indent="-317500" lvl="2" marL="1371600" algn="ctr">
+            <a:lvl3pPr marL="1371600" lvl="2" indent="-317500" algn="ctr">
               <a:spcBef>
                 <a:spcPts val="1600"/>
               </a:spcBef>
@@ -2020,7 +2070,7 @@
               <a:buChar char="■"/>
               <a:defRPr/>
             </a:lvl3pPr>
-            <a:lvl4pPr indent="-317500" lvl="3" marL="1828800" algn="ctr">
+            <a:lvl4pPr marL="1828800" lvl="3" indent="-317500" algn="ctr">
               <a:spcBef>
                 <a:spcPts val="1600"/>
               </a:spcBef>
@@ -2031,7 +2081,7 @@
               <a:buChar char="●"/>
               <a:defRPr/>
             </a:lvl4pPr>
-            <a:lvl5pPr indent="-317500" lvl="4" marL="2286000" algn="ctr">
+            <a:lvl5pPr marL="2286000" lvl="4" indent="-317500" algn="ctr">
               <a:spcBef>
                 <a:spcPts val="1600"/>
               </a:spcBef>
@@ -2042,7 +2092,7 @@
               <a:buChar char="○"/>
               <a:defRPr/>
             </a:lvl5pPr>
-            <a:lvl6pPr indent="-317500" lvl="5" marL="2743200" algn="ctr">
+            <a:lvl6pPr marL="2743200" lvl="5" indent="-317500" algn="ctr">
               <a:spcBef>
                 <a:spcPts val="1600"/>
               </a:spcBef>
@@ -2053,7 +2103,7 @@
               <a:buChar char="■"/>
               <a:defRPr/>
             </a:lvl6pPr>
-            <a:lvl7pPr indent="-317500" lvl="6" marL="3200400" algn="ctr">
+            <a:lvl7pPr marL="3200400" lvl="6" indent="-317500" algn="ctr">
               <a:spcBef>
                 <a:spcPts val="1600"/>
               </a:spcBef>
@@ -2064,7 +2114,7 @@
               <a:buChar char="●"/>
               <a:defRPr/>
             </a:lvl7pPr>
-            <a:lvl8pPr indent="-317500" lvl="7" marL="3657600" algn="ctr">
+            <a:lvl8pPr marL="3657600" lvl="7" indent="-317500" algn="ctr">
               <a:spcBef>
                 <a:spcPts val="1600"/>
               </a:spcBef>
@@ -2075,7 +2125,7 @@
               <a:buChar char="○"/>
               <a:defRPr/>
             </a:lvl8pPr>
-            <a:lvl9pPr indent="-317500" lvl="8" marL="4114800" algn="ctr">
+            <a:lvl9pPr marL="4114800" lvl="8" indent="-317500" algn="ctr">
               <a:spcBef>
                 <a:spcPts val="1600"/>
               </a:spcBef>
@@ -2087,15 +2137,19 @@
               <a:defRPr/>
             </a:lvl9pPr>
           </a:lstStyle>
-          <a:p/>
+          <a:p>
+            <a:endParaRPr/>
+          </a:p>
         </p:txBody>
       </p:sp>
       <p:sp>
         <p:nvSpPr>
           <p:cNvPr id="52" name="Google Shape;52;p11"/>
-          <p:cNvSpPr txBox="1"/>
+          <p:cNvSpPr txBox="1">
+            <a:spLocks noGrp="1"/>
+          </p:cNvSpPr>
           <p:nvPr>
-            <p:ph idx="12" type="sldNum"/>
+            <p:ph type="sldNum" idx="12"/>
           </p:nvPr>
         </p:nvSpPr>
         <p:spPr>
@@ -2108,7 +2162,7 @@
           </a:prstGeom>
         </p:spPr>
         <p:txBody>
-          <a:bodyPr anchorCtr="0" anchor="ctr" bIns="91425" lIns="91425" spcFirstLastPara="1" rIns="91425" wrap="square" tIns="91425">
+          <a:bodyPr spcFirstLastPara="1" wrap="square" lIns="91425" tIns="91425" rIns="91425" bIns="91425" anchor="ctr" anchorCtr="0">
             <a:noAutofit/>
           </a:bodyPr>
           <a:lstStyle>
@@ -2150,7 +2204,7 @@
             </a:lvl9pPr>
           </a:lstStyle>
           <a:p>
-            <a:pPr indent="0" lvl="0" marL="0" rtl="0" algn="r">
+            <a:pPr marL="0" lvl="0" indent="0" algn="r" rtl="0">
               <a:spcBef>
                 <a:spcPts val="0"/>
               </a:spcBef>
@@ -2176,11 +2230,11 @@
 </file>
 
 <file path=ppt/slideLayouts/slideLayout11.xml><?xml version="1.0" encoding="utf-8"?>
-<p:sldLayout xmlns:a="http://schemas.openxmlformats.org/drawingml/2006/main" xmlns:r="http://schemas.openxmlformats.org/officeDocument/2006/relationships" xmlns:mc="http://schemas.openxmlformats.org/markup-compatibility/2006" xmlns:mv="urn:schemas-microsoft-com:mac:vml" xmlns:p="http://schemas.openxmlformats.org/presentationml/2006/main" xmlns:c="http://schemas.openxmlformats.org/drawingml/2006/chart" xmlns:dgm="http://schemas.openxmlformats.org/drawingml/2006/diagram" xmlns:o="urn:schemas-microsoft-com:office:office" xmlns:v="urn:schemas-microsoft-com:vml" xmlns:pvml="urn:schemas-microsoft-com:office:powerpoint" xmlns:com="http://schemas.openxmlformats.org/drawingml/2006/compatibility" xmlns:p14="http://schemas.microsoft.com/office/powerpoint/2010/main" xmlns:p15="http://schemas.microsoft.com/office/powerpoint/2012/main" matchingName="Blank" type="blank">
+<p:sldLayout xmlns:a="http://schemas.openxmlformats.org/drawingml/2006/main" xmlns:r="http://schemas.openxmlformats.org/officeDocument/2006/relationships" xmlns:p="http://schemas.openxmlformats.org/presentationml/2006/main" matchingName="Blank" type="blank">
   <p:cSld name="BLANK">
     <p:spTree>
       <p:nvGrpSpPr>
-        <p:cNvPr id="53" name="Shape 53"/>
+        <p:cNvPr id="1" name="Shape 53"/>
         <p:cNvGrpSpPr/>
         <p:nvPr/>
       </p:nvGrpSpPr>
@@ -2195,9 +2249,11 @@
       <p:sp>
         <p:nvSpPr>
           <p:cNvPr id="54" name="Google Shape;54;p12"/>
-          <p:cNvSpPr txBox="1"/>
+          <p:cNvSpPr txBox="1">
+            <a:spLocks noGrp="1"/>
+          </p:cNvSpPr>
           <p:nvPr>
-            <p:ph idx="12" type="sldNum"/>
+            <p:ph type="sldNum" idx="12"/>
           </p:nvPr>
         </p:nvSpPr>
         <p:spPr>
@@ -2210,7 +2266,7 @@
           </a:prstGeom>
         </p:spPr>
         <p:txBody>
-          <a:bodyPr anchorCtr="0" anchor="ctr" bIns="91425" lIns="91425" spcFirstLastPara="1" rIns="91425" wrap="square" tIns="91425">
+          <a:bodyPr spcFirstLastPara="1" wrap="square" lIns="91425" tIns="91425" rIns="91425" bIns="91425" anchor="ctr" anchorCtr="0">
             <a:noAutofit/>
           </a:bodyPr>
           <a:lstStyle>
@@ -2252,7 +2308,7 @@
             </a:lvl9pPr>
           </a:lstStyle>
           <a:p>
-            <a:pPr indent="0" lvl="0" marL="0" rtl="0" algn="r">
+            <a:pPr marL="0" lvl="0" indent="0" algn="r" rtl="0">
               <a:spcBef>
                 <a:spcPts val="0"/>
               </a:spcBef>
@@ -2278,11 +2334,11 @@
 </file>
 
 <file path=ppt/slideLayouts/slideLayout2.xml><?xml version="1.0" encoding="utf-8"?>
-<p:sldLayout xmlns:a="http://schemas.openxmlformats.org/drawingml/2006/main" xmlns:r="http://schemas.openxmlformats.org/officeDocument/2006/relationships" xmlns:mc="http://schemas.openxmlformats.org/markup-compatibility/2006" xmlns:mv="urn:schemas-microsoft-com:mac:vml" xmlns:p="http://schemas.openxmlformats.org/presentationml/2006/main" xmlns:c="http://schemas.openxmlformats.org/drawingml/2006/chart" xmlns:dgm="http://schemas.openxmlformats.org/drawingml/2006/diagram" xmlns:o="urn:schemas-microsoft-com:office:office" xmlns:v="urn:schemas-microsoft-com:vml" xmlns:pvml="urn:schemas-microsoft-com:office:powerpoint" xmlns:com="http://schemas.openxmlformats.org/drawingml/2006/compatibility" xmlns:p14="http://schemas.microsoft.com/office/powerpoint/2010/main" xmlns:p15="http://schemas.microsoft.com/office/powerpoint/2012/main" matchingName="Section header" type="secHead">
+<p:sldLayout xmlns:a="http://schemas.openxmlformats.org/drawingml/2006/main" xmlns:r="http://schemas.openxmlformats.org/officeDocument/2006/relationships" xmlns:p="http://schemas.openxmlformats.org/presentationml/2006/main" matchingName="Section header" type="secHead">
   <p:cSld name="SECTION_HEADER">
     <p:spTree>
       <p:nvGrpSpPr>
-        <p:cNvPr id="17" name="Shape 17"/>
+        <p:cNvPr id="1" name="Shape 17"/>
         <p:cNvGrpSpPr/>
         <p:nvPr/>
       </p:nvGrpSpPr>
@@ -2297,7 +2353,9 @@
       <p:sp>
         <p:nvSpPr>
           <p:cNvPr id="18" name="Google Shape;18;p3"/>
-          <p:cNvSpPr txBox="1"/>
+          <p:cNvSpPr txBox="1">
+            <a:spLocks noGrp="1"/>
+          </p:cNvSpPr>
           <p:nvPr>
             <p:ph type="title"/>
           </p:nvPr>
@@ -2312,7 +2370,7 @@
           </a:prstGeom>
         </p:spPr>
         <p:txBody>
-          <a:bodyPr anchorCtr="0" anchor="ctr" bIns="91425" lIns="91425" spcFirstLastPara="1" rIns="91425" wrap="square" tIns="91425">
+          <a:bodyPr spcFirstLastPara="1" wrap="square" lIns="91425" tIns="91425" rIns="91425" bIns="91425" anchor="ctr" anchorCtr="0">
             <a:noAutofit/>
           </a:bodyPr>
           <a:lstStyle>
@@ -2416,15 +2474,19 @@
               <a:defRPr sz="3600"/>
             </a:lvl9pPr>
           </a:lstStyle>
-          <a:p/>
+          <a:p>
+            <a:endParaRPr/>
+          </a:p>
         </p:txBody>
       </p:sp>
       <p:sp>
         <p:nvSpPr>
           <p:cNvPr id="19" name="Google Shape;19;p3"/>
-          <p:cNvSpPr txBox="1"/>
+          <p:cNvSpPr txBox="1">
+            <a:spLocks noGrp="1"/>
+          </p:cNvSpPr>
           <p:nvPr>
-            <p:ph idx="12" type="sldNum"/>
+            <p:ph type="sldNum" idx="12"/>
           </p:nvPr>
         </p:nvSpPr>
         <p:spPr>
@@ -2437,7 +2499,7 @@
           </a:prstGeom>
         </p:spPr>
         <p:txBody>
-          <a:bodyPr anchorCtr="0" anchor="ctr" bIns="91425" lIns="91425" spcFirstLastPara="1" rIns="91425" wrap="square" tIns="91425">
+          <a:bodyPr spcFirstLastPara="1" wrap="square" lIns="91425" tIns="91425" rIns="91425" bIns="91425" anchor="ctr" anchorCtr="0">
             <a:noAutofit/>
           </a:bodyPr>
           <a:lstStyle>
@@ -2479,7 +2541,7 @@
             </a:lvl9pPr>
           </a:lstStyle>
           <a:p>
-            <a:pPr indent="0" lvl="0" marL="0" rtl="0" algn="r">
+            <a:pPr marL="0" lvl="0" indent="0" algn="r" rtl="0">
               <a:spcBef>
                 <a:spcPts val="0"/>
               </a:spcBef>
@@ -2505,11 +2567,11 @@
 </file>
 
 <file path=ppt/slideLayouts/slideLayout3.xml><?xml version="1.0" encoding="utf-8"?>
-<p:sldLayout xmlns:a="http://schemas.openxmlformats.org/drawingml/2006/main" xmlns:r="http://schemas.openxmlformats.org/officeDocument/2006/relationships" xmlns:mc="http://schemas.openxmlformats.org/markup-compatibility/2006" xmlns:mv="urn:schemas-microsoft-com:mac:vml" xmlns:p="http://schemas.openxmlformats.org/presentationml/2006/main" xmlns:c="http://schemas.openxmlformats.org/drawingml/2006/chart" xmlns:dgm="http://schemas.openxmlformats.org/drawingml/2006/diagram" xmlns:o="urn:schemas-microsoft-com:office:office" xmlns:v="urn:schemas-microsoft-com:vml" xmlns:pvml="urn:schemas-microsoft-com:office:powerpoint" xmlns:com="http://schemas.openxmlformats.org/drawingml/2006/compatibility" xmlns:p14="http://schemas.microsoft.com/office/powerpoint/2010/main" xmlns:p15="http://schemas.microsoft.com/office/powerpoint/2012/main" matchingName="Title and body" type="tx">
+<p:sldLayout xmlns:a="http://schemas.openxmlformats.org/drawingml/2006/main" xmlns:r="http://schemas.openxmlformats.org/officeDocument/2006/relationships" xmlns:p="http://schemas.openxmlformats.org/presentationml/2006/main" matchingName="Title and body" type="tx">
   <p:cSld name="TITLE_AND_BODY">
     <p:spTree>
       <p:nvGrpSpPr>
-        <p:cNvPr id="20" name="Shape 20"/>
+        <p:cNvPr id="1" name="Shape 20"/>
         <p:cNvGrpSpPr/>
         <p:nvPr/>
       </p:nvGrpSpPr>
@@ -2524,7 +2586,9 @@
       <p:sp>
         <p:nvSpPr>
           <p:cNvPr id="21" name="Google Shape;21;p4"/>
-          <p:cNvSpPr txBox="1"/>
+          <p:cNvSpPr txBox="1">
+            <a:spLocks noGrp="1"/>
+          </p:cNvSpPr>
           <p:nvPr>
             <p:ph type="title"/>
           </p:nvPr>
@@ -2539,7 +2603,7 @@
           </a:prstGeom>
         </p:spPr>
         <p:txBody>
-          <a:bodyPr anchorCtr="0" anchor="t" bIns="91425" lIns="91425" spcFirstLastPara="1" rIns="91425" wrap="square" tIns="91425">
+          <a:bodyPr spcFirstLastPara="1" wrap="square" lIns="91425" tIns="91425" rIns="91425" bIns="91425" anchor="t" anchorCtr="0">
             <a:noAutofit/>
           </a:bodyPr>
           <a:lstStyle>
@@ -2643,15 +2707,19 @@
               <a:defRPr/>
             </a:lvl9pPr>
           </a:lstStyle>
-          <a:p/>
+          <a:p>
+            <a:endParaRPr/>
+          </a:p>
         </p:txBody>
       </p:sp>
       <p:sp>
         <p:nvSpPr>
           <p:cNvPr id="22" name="Google Shape;22;p4"/>
-          <p:cNvSpPr txBox="1"/>
+          <p:cNvSpPr txBox="1">
+            <a:spLocks noGrp="1"/>
+          </p:cNvSpPr>
           <p:nvPr>
-            <p:ph idx="1" type="body"/>
+            <p:ph type="body" idx="1"/>
           </p:nvPr>
         </p:nvSpPr>
         <p:spPr>
@@ -2664,11 +2732,11 @@
           </a:prstGeom>
         </p:spPr>
         <p:txBody>
-          <a:bodyPr anchorCtr="0" anchor="t" bIns="91425" lIns="91425" spcFirstLastPara="1" rIns="91425" wrap="square" tIns="91425">
+          <a:bodyPr spcFirstLastPara="1" wrap="square" lIns="91425" tIns="91425" rIns="91425" bIns="91425" anchor="t" anchorCtr="0">
             <a:noAutofit/>
           </a:bodyPr>
           <a:lstStyle>
-            <a:lvl1pPr indent="-342900" lvl="0" marL="457200">
+            <a:lvl1pPr marL="457200" lvl="0" indent="-342900">
               <a:spcBef>
                 <a:spcPts val="0"/>
               </a:spcBef>
@@ -2679,7 +2747,7 @@
               <a:buChar char="●"/>
               <a:defRPr/>
             </a:lvl1pPr>
-            <a:lvl2pPr indent="-317500" lvl="1" marL="914400">
+            <a:lvl2pPr marL="914400" lvl="1" indent="-317500">
               <a:spcBef>
                 <a:spcPts val="1600"/>
               </a:spcBef>
@@ -2690,7 +2758,7 @@
               <a:buChar char="○"/>
               <a:defRPr/>
             </a:lvl2pPr>
-            <a:lvl3pPr indent="-317500" lvl="2" marL="1371600">
+            <a:lvl3pPr marL="1371600" lvl="2" indent="-317500">
               <a:spcBef>
                 <a:spcPts val="1600"/>
               </a:spcBef>
@@ -2701,7 +2769,7 @@
               <a:buChar char="■"/>
               <a:defRPr/>
             </a:lvl3pPr>
-            <a:lvl4pPr indent="-317500" lvl="3" marL="1828800">
+            <a:lvl4pPr marL="1828800" lvl="3" indent="-317500">
               <a:spcBef>
                 <a:spcPts val="1600"/>
               </a:spcBef>
@@ -2712,7 +2780,7 @@
               <a:buChar char="●"/>
               <a:defRPr/>
             </a:lvl4pPr>
-            <a:lvl5pPr indent="-317500" lvl="4" marL="2286000">
+            <a:lvl5pPr marL="2286000" lvl="4" indent="-317500">
               <a:spcBef>
                 <a:spcPts val="1600"/>
               </a:spcBef>
@@ -2723,7 +2791,7 @@
               <a:buChar char="○"/>
               <a:defRPr/>
             </a:lvl5pPr>
-            <a:lvl6pPr indent="-317500" lvl="5" marL="2743200">
+            <a:lvl6pPr marL="2743200" lvl="5" indent="-317500">
               <a:spcBef>
                 <a:spcPts val="1600"/>
               </a:spcBef>
@@ -2734,7 +2802,7 @@
               <a:buChar char="■"/>
               <a:defRPr/>
             </a:lvl6pPr>
-            <a:lvl7pPr indent="-317500" lvl="6" marL="3200400">
+            <a:lvl7pPr marL="3200400" lvl="6" indent="-317500">
               <a:spcBef>
                 <a:spcPts val="1600"/>
               </a:spcBef>
@@ -2745,7 +2813,7 @@
               <a:buChar char="●"/>
               <a:defRPr/>
             </a:lvl7pPr>
-            <a:lvl8pPr indent="-317500" lvl="7" marL="3657600">
+            <a:lvl8pPr marL="3657600" lvl="7" indent="-317500">
               <a:spcBef>
                 <a:spcPts val="1600"/>
               </a:spcBef>
@@ -2756,7 +2824,7 @@
               <a:buChar char="○"/>
               <a:defRPr/>
             </a:lvl8pPr>
-            <a:lvl9pPr indent="-317500" lvl="8" marL="4114800">
+            <a:lvl9pPr marL="4114800" lvl="8" indent="-317500">
               <a:spcBef>
                 <a:spcPts val="1600"/>
               </a:spcBef>
@@ -2768,15 +2836,19 @@
               <a:defRPr/>
             </a:lvl9pPr>
           </a:lstStyle>
-          <a:p/>
+          <a:p>
+            <a:endParaRPr/>
+          </a:p>
         </p:txBody>
       </p:sp>
       <p:sp>
         <p:nvSpPr>
           <p:cNvPr id="23" name="Google Shape;23;p4"/>
-          <p:cNvSpPr txBox="1"/>
+          <p:cNvSpPr txBox="1">
+            <a:spLocks noGrp="1"/>
+          </p:cNvSpPr>
           <p:nvPr>
-            <p:ph idx="12" type="sldNum"/>
+            <p:ph type="sldNum" idx="12"/>
           </p:nvPr>
         </p:nvSpPr>
         <p:spPr>
@@ -2789,7 +2861,7 @@
           </a:prstGeom>
         </p:spPr>
         <p:txBody>
-          <a:bodyPr anchorCtr="0" anchor="ctr" bIns="91425" lIns="91425" spcFirstLastPara="1" rIns="91425" wrap="square" tIns="91425">
+          <a:bodyPr spcFirstLastPara="1" wrap="square" lIns="91425" tIns="91425" rIns="91425" bIns="91425" anchor="ctr" anchorCtr="0">
             <a:noAutofit/>
           </a:bodyPr>
           <a:lstStyle>
@@ -2831,7 +2903,7 @@
             </a:lvl9pPr>
           </a:lstStyle>
           <a:p>
-            <a:pPr indent="0" lvl="0" marL="0" rtl="0" algn="r">
+            <a:pPr marL="0" lvl="0" indent="0" algn="r" rtl="0">
               <a:spcBef>
                 <a:spcPts val="0"/>
               </a:spcBef>
@@ -2857,11 +2929,11 @@
 </file>
 
 <file path=ppt/slideLayouts/slideLayout4.xml><?xml version="1.0" encoding="utf-8"?>
-<p:sldLayout xmlns:a="http://schemas.openxmlformats.org/drawingml/2006/main" xmlns:r="http://schemas.openxmlformats.org/officeDocument/2006/relationships" xmlns:mc="http://schemas.openxmlformats.org/markup-compatibility/2006" xmlns:mv="urn:schemas-microsoft-com:mac:vml" xmlns:p="http://schemas.openxmlformats.org/presentationml/2006/main" xmlns:c="http://schemas.openxmlformats.org/drawingml/2006/chart" xmlns:dgm="http://schemas.openxmlformats.org/drawingml/2006/diagram" xmlns:o="urn:schemas-microsoft-com:office:office" xmlns:v="urn:schemas-microsoft-com:vml" xmlns:pvml="urn:schemas-microsoft-com:office:powerpoint" xmlns:com="http://schemas.openxmlformats.org/drawingml/2006/compatibility" xmlns:p14="http://schemas.microsoft.com/office/powerpoint/2010/main" xmlns:p15="http://schemas.microsoft.com/office/powerpoint/2012/main" matchingName="Title and two columns" type="twoColTx">
+<p:sldLayout xmlns:a="http://schemas.openxmlformats.org/drawingml/2006/main" xmlns:r="http://schemas.openxmlformats.org/officeDocument/2006/relationships" xmlns:p="http://schemas.openxmlformats.org/presentationml/2006/main" matchingName="Title and two columns" type="twoColTx">
   <p:cSld name="TITLE_AND_TWO_COLUMNS">
     <p:spTree>
       <p:nvGrpSpPr>
-        <p:cNvPr id="24" name="Shape 24"/>
+        <p:cNvPr id="1" name="Shape 24"/>
         <p:cNvGrpSpPr/>
         <p:nvPr/>
       </p:nvGrpSpPr>
@@ -2876,7 +2948,9 @@
       <p:sp>
         <p:nvSpPr>
           <p:cNvPr id="25" name="Google Shape;25;p5"/>
-          <p:cNvSpPr txBox="1"/>
+          <p:cNvSpPr txBox="1">
+            <a:spLocks noGrp="1"/>
+          </p:cNvSpPr>
           <p:nvPr>
             <p:ph type="title"/>
           </p:nvPr>
@@ -2891,7 +2965,7 @@
           </a:prstGeom>
         </p:spPr>
         <p:txBody>
-          <a:bodyPr anchorCtr="0" anchor="t" bIns="91425" lIns="91425" spcFirstLastPara="1" rIns="91425" wrap="square" tIns="91425">
+          <a:bodyPr spcFirstLastPara="1" wrap="square" lIns="91425" tIns="91425" rIns="91425" bIns="91425" anchor="t" anchorCtr="0">
             <a:noAutofit/>
           </a:bodyPr>
           <a:lstStyle>
@@ -2995,15 +3069,19 @@
               <a:defRPr/>
             </a:lvl9pPr>
           </a:lstStyle>
-          <a:p/>
+          <a:p>
+            <a:endParaRPr/>
+          </a:p>
         </p:txBody>
       </p:sp>
       <p:sp>
         <p:nvSpPr>
           <p:cNvPr id="26" name="Google Shape;26;p5"/>
-          <p:cNvSpPr txBox="1"/>
+          <p:cNvSpPr txBox="1">
+            <a:spLocks noGrp="1"/>
+          </p:cNvSpPr>
           <p:nvPr>
-            <p:ph idx="1" type="body"/>
+            <p:ph type="body" idx="1"/>
           </p:nvPr>
         </p:nvSpPr>
         <p:spPr>
@@ -3016,11 +3094,11 @@
           </a:prstGeom>
         </p:spPr>
         <p:txBody>
-          <a:bodyPr anchorCtr="0" anchor="t" bIns="91425" lIns="91425" spcFirstLastPara="1" rIns="91425" wrap="square" tIns="91425">
+          <a:bodyPr spcFirstLastPara="1" wrap="square" lIns="91425" tIns="91425" rIns="91425" bIns="91425" anchor="t" anchorCtr="0">
             <a:noAutofit/>
           </a:bodyPr>
           <a:lstStyle>
-            <a:lvl1pPr indent="-317500" lvl="0" marL="457200">
+            <a:lvl1pPr marL="457200" lvl="0" indent="-317500">
               <a:spcBef>
                 <a:spcPts val="0"/>
               </a:spcBef>
@@ -3031,7 +3109,7 @@
               <a:buChar char="●"/>
               <a:defRPr sz="1400"/>
             </a:lvl1pPr>
-            <a:lvl2pPr indent="-304800" lvl="1" marL="914400">
+            <a:lvl2pPr marL="914400" lvl="1" indent="-304800">
               <a:spcBef>
                 <a:spcPts val="1600"/>
               </a:spcBef>
@@ -3042,7 +3120,7 @@
               <a:buChar char="○"/>
               <a:defRPr sz="1200"/>
             </a:lvl2pPr>
-            <a:lvl3pPr indent="-304800" lvl="2" marL="1371600">
+            <a:lvl3pPr marL="1371600" lvl="2" indent="-304800">
               <a:spcBef>
                 <a:spcPts val="1600"/>
               </a:spcBef>
@@ -3053,7 +3131,7 @@
               <a:buChar char="■"/>
               <a:defRPr sz="1200"/>
             </a:lvl3pPr>
-            <a:lvl4pPr indent="-304800" lvl="3" marL="1828800">
+            <a:lvl4pPr marL="1828800" lvl="3" indent="-304800">
               <a:spcBef>
                 <a:spcPts val="1600"/>
               </a:spcBef>
@@ -3064,7 +3142,7 @@
               <a:buChar char="●"/>
               <a:defRPr sz="1200"/>
             </a:lvl4pPr>
-            <a:lvl5pPr indent="-304800" lvl="4" marL="2286000">
+            <a:lvl5pPr marL="2286000" lvl="4" indent="-304800">
               <a:spcBef>
                 <a:spcPts val="1600"/>
               </a:spcBef>
@@ -3075,7 +3153,7 @@
               <a:buChar char="○"/>
               <a:defRPr sz="1200"/>
             </a:lvl5pPr>
-            <a:lvl6pPr indent="-304800" lvl="5" marL="2743200">
+            <a:lvl6pPr marL="2743200" lvl="5" indent="-304800">
               <a:spcBef>
                 <a:spcPts val="1600"/>
               </a:spcBef>
@@ -3086,7 +3164,7 @@
               <a:buChar char="■"/>
               <a:defRPr sz="1200"/>
             </a:lvl6pPr>
-            <a:lvl7pPr indent="-304800" lvl="6" marL="3200400">
+            <a:lvl7pPr marL="3200400" lvl="6" indent="-304800">
               <a:spcBef>
                 <a:spcPts val="1600"/>
               </a:spcBef>
@@ -3097,7 +3175,7 @@
               <a:buChar char="●"/>
               <a:defRPr sz="1200"/>
             </a:lvl7pPr>
-            <a:lvl8pPr indent="-304800" lvl="7" marL="3657600">
+            <a:lvl8pPr marL="3657600" lvl="7" indent="-304800">
               <a:spcBef>
                 <a:spcPts val="1600"/>
               </a:spcBef>
@@ -3108,7 +3186,7 @@
               <a:buChar char="○"/>
               <a:defRPr sz="1200"/>
             </a:lvl8pPr>
-            <a:lvl9pPr indent="-304800" lvl="8" marL="4114800">
+            <a:lvl9pPr marL="4114800" lvl="8" indent="-304800">
               <a:spcBef>
                 <a:spcPts val="1600"/>
               </a:spcBef>
@@ -3120,15 +3198,19 @@
               <a:defRPr sz="1200"/>
             </a:lvl9pPr>
           </a:lstStyle>
-          <a:p/>
+          <a:p>
+            <a:endParaRPr/>
+          </a:p>
         </p:txBody>
       </p:sp>
       <p:sp>
         <p:nvSpPr>
           <p:cNvPr id="27" name="Google Shape;27;p5"/>
-          <p:cNvSpPr txBox="1"/>
+          <p:cNvSpPr txBox="1">
+            <a:spLocks noGrp="1"/>
+          </p:cNvSpPr>
           <p:nvPr>
-            <p:ph idx="2" type="body"/>
+            <p:ph type="body" idx="2"/>
           </p:nvPr>
         </p:nvSpPr>
         <p:spPr>
@@ -3141,11 +3223,11 @@
           </a:prstGeom>
         </p:spPr>
         <p:txBody>
-          <a:bodyPr anchorCtr="0" anchor="t" bIns="91425" lIns="91425" spcFirstLastPara="1" rIns="91425" wrap="square" tIns="91425">
+          <a:bodyPr spcFirstLastPara="1" wrap="square" lIns="91425" tIns="91425" rIns="91425" bIns="91425" anchor="t" anchorCtr="0">
             <a:noAutofit/>
           </a:bodyPr>
           <a:lstStyle>
-            <a:lvl1pPr indent="-317500" lvl="0" marL="457200">
+            <a:lvl1pPr marL="457200" lvl="0" indent="-317500">
               <a:spcBef>
                 <a:spcPts val="0"/>
               </a:spcBef>
@@ -3156,7 +3238,7 @@
               <a:buChar char="●"/>
               <a:defRPr sz="1400"/>
             </a:lvl1pPr>
-            <a:lvl2pPr indent="-304800" lvl="1" marL="914400">
+            <a:lvl2pPr marL="914400" lvl="1" indent="-304800">
               <a:spcBef>
                 <a:spcPts val="1600"/>
               </a:spcBef>
@@ -3167,7 +3249,7 @@
               <a:buChar char="○"/>
               <a:defRPr sz="1200"/>
             </a:lvl2pPr>
-            <a:lvl3pPr indent="-304800" lvl="2" marL="1371600">
+            <a:lvl3pPr marL="1371600" lvl="2" indent="-304800">
               <a:spcBef>
                 <a:spcPts val="1600"/>
               </a:spcBef>
@@ -3178,7 +3260,7 @@
               <a:buChar char="■"/>
               <a:defRPr sz="1200"/>
             </a:lvl3pPr>
-            <a:lvl4pPr indent="-304800" lvl="3" marL="1828800">
+            <a:lvl4pPr marL="1828800" lvl="3" indent="-304800">
               <a:spcBef>
                 <a:spcPts val="1600"/>
               </a:spcBef>
@@ -3189,7 +3271,7 @@
               <a:buChar char="●"/>
               <a:defRPr sz="1200"/>
             </a:lvl4pPr>
-            <a:lvl5pPr indent="-304800" lvl="4" marL="2286000">
+            <a:lvl5pPr marL="2286000" lvl="4" indent="-304800">
               <a:spcBef>
                 <a:spcPts val="1600"/>
               </a:spcBef>
@@ -3200,7 +3282,7 @@
               <a:buChar char="○"/>
               <a:defRPr sz="1200"/>
             </a:lvl5pPr>
-            <a:lvl6pPr indent="-304800" lvl="5" marL="2743200">
+            <a:lvl6pPr marL="2743200" lvl="5" indent="-304800">
               <a:spcBef>
                 <a:spcPts val="1600"/>
               </a:spcBef>
@@ -3211,7 +3293,7 @@
               <a:buChar char="■"/>
               <a:defRPr sz="1200"/>
             </a:lvl6pPr>
-            <a:lvl7pPr indent="-304800" lvl="6" marL="3200400">
+            <a:lvl7pPr marL="3200400" lvl="6" indent="-304800">
               <a:spcBef>
                 <a:spcPts val="1600"/>
               </a:spcBef>
@@ -3222,7 +3304,7 @@
               <a:buChar char="●"/>
               <a:defRPr sz="1200"/>
             </a:lvl7pPr>
-            <a:lvl8pPr indent="-304800" lvl="7" marL="3657600">
+            <a:lvl8pPr marL="3657600" lvl="7" indent="-304800">
               <a:spcBef>
                 <a:spcPts val="1600"/>
               </a:spcBef>
@@ -3233,7 +3315,7 @@
               <a:buChar char="○"/>
               <a:defRPr sz="1200"/>
             </a:lvl8pPr>
-            <a:lvl9pPr indent="-304800" lvl="8" marL="4114800">
+            <a:lvl9pPr marL="4114800" lvl="8" indent="-304800">
               <a:spcBef>
                 <a:spcPts val="1600"/>
               </a:spcBef>
@@ -3245,15 +3327,19 @@
               <a:defRPr sz="1200"/>
             </a:lvl9pPr>
           </a:lstStyle>
-          <a:p/>
+          <a:p>
+            <a:endParaRPr/>
+          </a:p>
         </p:txBody>
       </p:sp>
       <p:sp>
         <p:nvSpPr>
           <p:cNvPr id="28" name="Google Shape;28;p5"/>
-          <p:cNvSpPr txBox="1"/>
+          <p:cNvSpPr txBox="1">
+            <a:spLocks noGrp="1"/>
+          </p:cNvSpPr>
           <p:nvPr>
-            <p:ph idx="12" type="sldNum"/>
+            <p:ph type="sldNum" idx="12"/>
           </p:nvPr>
         </p:nvSpPr>
         <p:spPr>
@@ -3266,7 +3352,7 @@
           </a:prstGeom>
         </p:spPr>
         <p:txBody>
-          <a:bodyPr anchorCtr="0" anchor="ctr" bIns="91425" lIns="91425" spcFirstLastPara="1" rIns="91425" wrap="square" tIns="91425">
+          <a:bodyPr spcFirstLastPara="1" wrap="square" lIns="91425" tIns="91425" rIns="91425" bIns="91425" anchor="ctr" anchorCtr="0">
             <a:noAutofit/>
           </a:bodyPr>
           <a:lstStyle>
@@ -3308,7 +3394,7 @@
             </a:lvl9pPr>
           </a:lstStyle>
           <a:p>
-            <a:pPr indent="0" lvl="0" marL="0" rtl="0" algn="r">
+            <a:pPr marL="0" lvl="0" indent="0" algn="r" rtl="0">
               <a:spcBef>
                 <a:spcPts val="0"/>
               </a:spcBef>
@@ -3334,11 +3420,11 @@
 </file>
 
 <file path=ppt/slideLayouts/slideLayout5.xml><?xml version="1.0" encoding="utf-8"?>
-<p:sldLayout xmlns:a="http://schemas.openxmlformats.org/drawingml/2006/main" xmlns:r="http://schemas.openxmlformats.org/officeDocument/2006/relationships" xmlns:mc="http://schemas.openxmlformats.org/markup-compatibility/2006" xmlns:mv="urn:schemas-microsoft-com:mac:vml" xmlns:p="http://schemas.openxmlformats.org/presentationml/2006/main" xmlns:c="http://schemas.openxmlformats.org/drawingml/2006/chart" xmlns:dgm="http://schemas.openxmlformats.org/drawingml/2006/diagram" xmlns:o="urn:schemas-microsoft-com:office:office" xmlns:v="urn:schemas-microsoft-com:vml" xmlns:pvml="urn:schemas-microsoft-com:office:powerpoint" xmlns:com="http://schemas.openxmlformats.org/drawingml/2006/compatibility" xmlns:p14="http://schemas.microsoft.com/office/powerpoint/2010/main" xmlns:p15="http://schemas.microsoft.com/office/powerpoint/2012/main" matchingName="Title only" type="titleOnly">
+<p:sldLayout xmlns:a="http://schemas.openxmlformats.org/drawingml/2006/main" xmlns:r="http://schemas.openxmlformats.org/officeDocument/2006/relationships" xmlns:p="http://schemas.openxmlformats.org/presentationml/2006/main" matchingName="Title only" type="titleOnly">
   <p:cSld name="TITLE_ONLY">
     <p:spTree>
       <p:nvGrpSpPr>
-        <p:cNvPr id="29" name="Shape 29"/>
+        <p:cNvPr id="1" name="Shape 29"/>
         <p:cNvGrpSpPr/>
         <p:nvPr/>
       </p:nvGrpSpPr>
@@ -3353,7 +3439,9 @@
       <p:sp>
         <p:nvSpPr>
           <p:cNvPr id="30" name="Google Shape;30;p6"/>
-          <p:cNvSpPr txBox="1"/>
+          <p:cNvSpPr txBox="1">
+            <a:spLocks noGrp="1"/>
+          </p:cNvSpPr>
           <p:nvPr>
             <p:ph type="title"/>
           </p:nvPr>
@@ -3368,7 +3456,7 @@
           </a:prstGeom>
         </p:spPr>
         <p:txBody>
-          <a:bodyPr anchorCtr="0" anchor="t" bIns="91425" lIns="91425" spcFirstLastPara="1" rIns="91425" wrap="square" tIns="91425">
+          <a:bodyPr spcFirstLastPara="1" wrap="square" lIns="91425" tIns="91425" rIns="91425" bIns="91425" anchor="t" anchorCtr="0">
             <a:noAutofit/>
           </a:bodyPr>
           <a:lstStyle>
@@ -3472,15 +3560,19 @@
               <a:defRPr/>
             </a:lvl9pPr>
           </a:lstStyle>
-          <a:p/>
+          <a:p>
+            <a:endParaRPr/>
+          </a:p>
         </p:txBody>
       </p:sp>
       <p:sp>
         <p:nvSpPr>
           <p:cNvPr id="31" name="Google Shape;31;p6"/>
-          <p:cNvSpPr txBox="1"/>
+          <p:cNvSpPr txBox="1">
+            <a:spLocks noGrp="1"/>
+          </p:cNvSpPr>
           <p:nvPr>
-            <p:ph idx="12" type="sldNum"/>
+            <p:ph type="sldNum" idx="12"/>
           </p:nvPr>
         </p:nvSpPr>
         <p:spPr>
@@ -3493,7 +3585,7 @@
           </a:prstGeom>
         </p:spPr>
         <p:txBody>
-          <a:bodyPr anchorCtr="0" anchor="ctr" bIns="91425" lIns="91425" spcFirstLastPara="1" rIns="91425" wrap="square" tIns="91425">
+          <a:bodyPr spcFirstLastPara="1" wrap="square" lIns="91425" tIns="91425" rIns="91425" bIns="91425" anchor="ctr" anchorCtr="0">
             <a:noAutofit/>
           </a:bodyPr>
           <a:lstStyle>
@@ -3535,7 +3627,7 @@
             </a:lvl9pPr>
           </a:lstStyle>
           <a:p>
-            <a:pPr indent="0" lvl="0" marL="0" rtl="0" algn="r">
+            <a:pPr marL="0" lvl="0" indent="0" algn="r" rtl="0">
               <a:spcBef>
                 <a:spcPts val="0"/>
               </a:spcBef>
@@ -3561,11 +3653,11 @@
 </file>
 
 <file path=ppt/slideLayouts/slideLayout6.xml><?xml version="1.0" encoding="utf-8"?>
-<p:sldLayout xmlns:a="http://schemas.openxmlformats.org/drawingml/2006/main" xmlns:r="http://schemas.openxmlformats.org/officeDocument/2006/relationships" xmlns:mc="http://schemas.openxmlformats.org/markup-compatibility/2006" xmlns:mv="urn:schemas-microsoft-com:mac:vml" xmlns:p="http://schemas.openxmlformats.org/presentationml/2006/main" xmlns:c="http://schemas.openxmlformats.org/drawingml/2006/chart" xmlns:dgm="http://schemas.openxmlformats.org/drawingml/2006/diagram" xmlns:o="urn:schemas-microsoft-com:office:office" xmlns:v="urn:schemas-microsoft-com:vml" xmlns:pvml="urn:schemas-microsoft-com:office:powerpoint" xmlns:com="http://schemas.openxmlformats.org/drawingml/2006/compatibility" xmlns:p14="http://schemas.microsoft.com/office/powerpoint/2010/main" xmlns:p15="http://schemas.microsoft.com/office/powerpoint/2012/main" matchingName="One column text">
+<p:sldLayout xmlns:a="http://schemas.openxmlformats.org/drawingml/2006/main" xmlns:r="http://schemas.openxmlformats.org/officeDocument/2006/relationships" xmlns:p="http://schemas.openxmlformats.org/presentationml/2006/main" matchingName="One column text">
   <p:cSld name="ONE_COLUMN_TEXT">
     <p:spTree>
       <p:nvGrpSpPr>
-        <p:cNvPr id="32" name="Shape 32"/>
+        <p:cNvPr id="1" name="Shape 32"/>
         <p:cNvGrpSpPr/>
         <p:nvPr/>
       </p:nvGrpSpPr>
@@ -3580,7 +3672,9 @@
       <p:sp>
         <p:nvSpPr>
           <p:cNvPr id="33" name="Google Shape;33;p7"/>
-          <p:cNvSpPr txBox="1"/>
+          <p:cNvSpPr txBox="1">
+            <a:spLocks noGrp="1"/>
+          </p:cNvSpPr>
           <p:nvPr>
             <p:ph type="title"/>
           </p:nvPr>
@@ -3595,7 +3689,7 @@
           </a:prstGeom>
         </p:spPr>
         <p:txBody>
-          <a:bodyPr anchorCtr="0" anchor="b" bIns="91425" lIns="91425" spcFirstLastPara="1" rIns="91425" wrap="square" tIns="91425">
+          <a:bodyPr spcFirstLastPara="1" wrap="square" lIns="91425" tIns="91425" rIns="91425" bIns="91425" anchor="b" anchorCtr="0">
             <a:noAutofit/>
           </a:bodyPr>
           <a:lstStyle>
@@ -3699,15 +3793,19 @@
               <a:defRPr sz="2400"/>
             </a:lvl9pPr>
           </a:lstStyle>
-          <a:p/>
+          <a:p>
+            <a:endParaRPr/>
+          </a:p>
         </p:txBody>
       </p:sp>
       <p:sp>
         <p:nvSpPr>
           <p:cNvPr id="34" name="Google Shape;34;p7"/>
-          <p:cNvSpPr txBox="1"/>
+          <p:cNvSpPr txBox="1">
+            <a:spLocks noGrp="1"/>
+          </p:cNvSpPr>
           <p:nvPr>
-            <p:ph idx="1" type="body"/>
+            <p:ph type="body" idx="1"/>
           </p:nvPr>
         </p:nvSpPr>
         <p:spPr>
@@ -3720,11 +3818,11 @@
           </a:prstGeom>
         </p:spPr>
         <p:txBody>
-          <a:bodyPr anchorCtr="0" anchor="t" bIns="91425" lIns="91425" spcFirstLastPara="1" rIns="91425" wrap="square" tIns="91425">
+          <a:bodyPr spcFirstLastPara="1" wrap="square" lIns="91425" tIns="91425" rIns="91425" bIns="91425" anchor="t" anchorCtr="0">
             <a:noAutofit/>
           </a:bodyPr>
           <a:lstStyle>
-            <a:lvl1pPr indent="-304800" lvl="0" marL="457200">
+            <a:lvl1pPr marL="457200" lvl="0" indent="-304800">
               <a:spcBef>
                 <a:spcPts val="0"/>
               </a:spcBef>
@@ -3735,7 +3833,7 @@
               <a:buChar char="●"/>
               <a:defRPr sz="1200"/>
             </a:lvl1pPr>
-            <a:lvl2pPr indent="-304800" lvl="1" marL="914400">
+            <a:lvl2pPr marL="914400" lvl="1" indent="-304800">
               <a:spcBef>
                 <a:spcPts val="1600"/>
               </a:spcBef>
@@ -3746,7 +3844,7 @@
               <a:buChar char="○"/>
               <a:defRPr sz="1200"/>
             </a:lvl2pPr>
-            <a:lvl3pPr indent="-304800" lvl="2" marL="1371600">
+            <a:lvl3pPr marL="1371600" lvl="2" indent="-304800">
               <a:spcBef>
                 <a:spcPts val="1600"/>
               </a:spcBef>
@@ -3757,7 +3855,7 @@
               <a:buChar char="■"/>
               <a:defRPr sz="1200"/>
             </a:lvl3pPr>
-            <a:lvl4pPr indent="-304800" lvl="3" marL="1828800">
+            <a:lvl4pPr marL="1828800" lvl="3" indent="-304800">
               <a:spcBef>
                 <a:spcPts val="1600"/>
               </a:spcBef>
@@ -3768,7 +3866,7 @@
               <a:buChar char="●"/>
               <a:defRPr sz="1200"/>
             </a:lvl4pPr>
-            <a:lvl5pPr indent="-304800" lvl="4" marL="2286000">
+            <a:lvl5pPr marL="2286000" lvl="4" indent="-304800">
               <a:spcBef>
                 <a:spcPts val="1600"/>
               </a:spcBef>
@@ -3779,7 +3877,7 @@
               <a:buChar char="○"/>
               <a:defRPr sz="1200"/>
             </a:lvl5pPr>
-            <a:lvl6pPr indent="-304800" lvl="5" marL="2743200">
+            <a:lvl6pPr marL="2743200" lvl="5" indent="-304800">
               <a:spcBef>
                 <a:spcPts val="1600"/>
               </a:spcBef>
@@ -3790,7 +3888,7 @@
               <a:buChar char="■"/>
               <a:defRPr sz="1200"/>
             </a:lvl6pPr>
-            <a:lvl7pPr indent="-304800" lvl="6" marL="3200400">
+            <a:lvl7pPr marL="3200400" lvl="6" indent="-304800">
               <a:spcBef>
                 <a:spcPts val="1600"/>
               </a:spcBef>
@@ -3801,7 +3899,7 @@
               <a:buChar char="●"/>
               <a:defRPr sz="1200"/>
             </a:lvl7pPr>
-            <a:lvl8pPr indent="-304800" lvl="7" marL="3657600">
+            <a:lvl8pPr marL="3657600" lvl="7" indent="-304800">
               <a:spcBef>
                 <a:spcPts val="1600"/>
               </a:spcBef>
@@ -3812,7 +3910,7 @@
               <a:buChar char="○"/>
               <a:defRPr sz="1200"/>
             </a:lvl8pPr>
-            <a:lvl9pPr indent="-304800" lvl="8" marL="4114800">
+            <a:lvl9pPr marL="4114800" lvl="8" indent="-304800">
               <a:spcBef>
                 <a:spcPts val="1600"/>
               </a:spcBef>
@@ -3824,15 +3922,19 @@
               <a:defRPr sz="1200"/>
             </a:lvl9pPr>
           </a:lstStyle>
-          <a:p/>
+          <a:p>
+            <a:endParaRPr/>
+          </a:p>
         </p:txBody>
       </p:sp>
       <p:sp>
         <p:nvSpPr>
           <p:cNvPr id="35" name="Google Shape;35;p7"/>
-          <p:cNvSpPr txBox="1"/>
+          <p:cNvSpPr txBox="1">
+            <a:spLocks noGrp="1"/>
+          </p:cNvSpPr>
           <p:nvPr>
-            <p:ph idx="12" type="sldNum"/>
+            <p:ph type="sldNum" idx="12"/>
           </p:nvPr>
         </p:nvSpPr>
         <p:spPr>
@@ -3845,7 +3947,7 @@
           </a:prstGeom>
         </p:spPr>
         <p:txBody>
-          <a:bodyPr anchorCtr="0" anchor="ctr" bIns="91425" lIns="91425" spcFirstLastPara="1" rIns="91425" wrap="square" tIns="91425">
+          <a:bodyPr spcFirstLastPara="1" wrap="square" lIns="91425" tIns="91425" rIns="91425" bIns="91425" anchor="ctr" anchorCtr="0">
             <a:noAutofit/>
           </a:bodyPr>
           <a:lstStyle>
@@ -3887,7 +3989,7 @@
             </a:lvl9pPr>
           </a:lstStyle>
           <a:p>
-            <a:pPr indent="0" lvl="0" marL="0" rtl="0" algn="r">
+            <a:pPr marL="0" lvl="0" indent="0" algn="r" rtl="0">
               <a:spcBef>
                 <a:spcPts val="0"/>
               </a:spcBef>
@@ -3913,18 +4015,19 @@
 </file>
 
 <file path=ppt/slideLayouts/slideLayout7.xml><?xml version="1.0" encoding="utf-8"?>
-<p:sldLayout xmlns:a="http://schemas.openxmlformats.org/drawingml/2006/main" xmlns:r="http://schemas.openxmlformats.org/officeDocument/2006/relationships" xmlns:mc="http://schemas.openxmlformats.org/markup-compatibility/2006" xmlns:mv="urn:schemas-microsoft-com:mac:vml" xmlns:p="http://schemas.openxmlformats.org/presentationml/2006/main" xmlns:c="http://schemas.openxmlformats.org/drawingml/2006/chart" xmlns:dgm="http://schemas.openxmlformats.org/drawingml/2006/diagram" xmlns:o="urn:schemas-microsoft-com:office:office" xmlns:v="urn:schemas-microsoft-com:vml" xmlns:pvml="urn:schemas-microsoft-com:office:powerpoint" xmlns:com="http://schemas.openxmlformats.org/drawingml/2006/compatibility" xmlns:p14="http://schemas.microsoft.com/office/powerpoint/2010/main" xmlns:p15="http://schemas.microsoft.com/office/powerpoint/2012/main" matchingName="Main point">
+<p:sldLayout xmlns:a="http://schemas.openxmlformats.org/drawingml/2006/main" xmlns:r="http://schemas.openxmlformats.org/officeDocument/2006/relationships" xmlns:p="http://schemas.openxmlformats.org/presentationml/2006/main" matchingName="Main point">
   <p:cSld name="MAIN_POINT">
     <p:bg>
       <p:bgPr>
         <a:solidFill>
           <a:schemeClr val="lt2"/>
         </a:solidFill>
+        <a:effectLst/>
       </p:bgPr>
     </p:bg>
     <p:spTree>
       <p:nvGrpSpPr>
-        <p:cNvPr id="36" name="Shape 36"/>
+        <p:cNvPr id="1" name="Shape 36"/>
         <p:cNvGrpSpPr/>
         <p:nvPr/>
       </p:nvGrpSpPr>
@@ -3939,7 +4042,9 @@
       <p:sp>
         <p:nvSpPr>
           <p:cNvPr id="37" name="Google Shape;37;p8"/>
-          <p:cNvSpPr txBox="1"/>
+          <p:cNvSpPr txBox="1">
+            <a:spLocks noGrp="1"/>
+          </p:cNvSpPr>
           <p:nvPr>
             <p:ph type="title"/>
           </p:nvPr>
@@ -3954,7 +4059,7 @@
           </a:prstGeom>
         </p:spPr>
         <p:txBody>
-          <a:bodyPr anchorCtr="0" anchor="ctr" bIns="91425" lIns="91425" spcFirstLastPara="1" rIns="91425" wrap="square" tIns="91425">
+          <a:bodyPr spcFirstLastPara="1" wrap="square" lIns="91425" tIns="91425" rIns="91425" bIns="91425" anchor="ctr" anchorCtr="0">
             <a:noAutofit/>
           </a:bodyPr>
           <a:lstStyle>
@@ -4121,15 +4226,19 @@
               </a:defRPr>
             </a:lvl9pPr>
           </a:lstStyle>
-          <a:p/>
+          <a:p>
+            <a:endParaRPr/>
+          </a:p>
         </p:txBody>
       </p:sp>
       <p:sp>
         <p:nvSpPr>
           <p:cNvPr id="38" name="Google Shape;38;p8"/>
-          <p:cNvSpPr txBox="1"/>
+          <p:cNvSpPr txBox="1">
+            <a:spLocks noGrp="1"/>
+          </p:cNvSpPr>
           <p:nvPr>
-            <p:ph idx="12" type="sldNum"/>
+            <p:ph type="sldNum" idx="12"/>
           </p:nvPr>
         </p:nvSpPr>
         <p:spPr>
@@ -4142,7 +4251,7 @@
           </a:prstGeom>
         </p:spPr>
         <p:txBody>
-          <a:bodyPr anchorCtr="0" anchor="ctr" bIns="91425" lIns="91425" spcFirstLastPara="1" rIns="91425" wrap="square" tIns="91425">
+          <a:bodyPr spcFirstLastPara="1" wrap="square" lIns="91425" tIns="91425" rIns="91425" bIns="91425" anchor="ctr" anchorCtr="0">
             <a:noAutofit/>
           </a:bodyPr>
           <a:lstStyle>
@@ -4220,7 +4329,7 @@
             </a:lvl9pPr>
           </a:lstStyle>
           <a:p>
-            <a:pPr indent="0" lvl="0" marL="0" rtl="0" algn="r">
+            <a:pPr marL="0" lvl="0" indent="0" algn="r" rtl="0">
               <a:spcBef>
                 <a:spcPts val="0"/>
               </a:spcBef>
@@ -4246,11 +4355,11 @@
 </file>
 
 <file path=ppt/slideLayouts/slideLayout8.xml><?xml version="1.0" encoding="utf-8"?>
-<p:sldLayout xmlns:a="http://schemas.openxmlformats.org/drawingml/2006/main" xmlns:r="http://schemas.openxmlformats.org/officeDocument/2006/relationships" xmlns:mc="http://schemas.openxmlformats.org/markup-compatibility/2006" xmlns:mv="urn:schemas-microsoft-com:mac:vml" xmlns:p="http://schemas.openxmlformats.org/presentationml/2006/main" xmlns:c="http://schemas.openxmlformats.org/drawingml/2006/chart" xmlns:dgm="http://schemas.openxmlformats.org/drawingml/2006/diagram" xmlns:o="urn:schemas-microsoft-com:office:office" xmlns:v="urn:schemas-microsoft-com:vml" xmlns:pvml="urn:schemas-microsoft-com:office:powerpoint" xmlns:com="http://schemas.openxmlformats.org/drawingml/2006/compatibility" xmlns:p14="http://schemas.microsoft.com/office/powerpoint/2010/main" xmlns:p15="http://schemas.microsoft.com/office/powerpoint/2012/main" matchingName="Section title and description">
+<p:sldLayout xmlns:a="http://schemas.openxmlformats.org/drawingml/2006/main" xmlns:r="http://schemas.openxmlformats.org/officeDocument/2006/relationships" xmlns:p="http://schemas.openxmlformats.org/presentationml/2006/main" matchingName="Section title and description">
   <p:cSld name="SECTION_TITLE_AND_DESCRIPTION">
     <p:spTree>
       <p:nvGrpSpPr>
-        <p:cNvPr id="39" name="Shape 39"/>
+        <p:cNvPr id="1" name="Shape 39"/>
         <p:cNvGrpSpPr/>
         <p:nvPr/>
       </p:nvGrpSpPr>
@@ -4284,12 +4393,12 @@
           </a:ln>
         </p:spPr>
         <p:txBody>
-          <a:bodyPr anchorCtr="0" anchor="ctr" bIns="91425" lIns="91425" spcFirstLastPara="1" rIns="91425" wrap="square" tIns="91425">
+          <a:bodyPr spcFirstLastPara="1" wrap="square" lIns="91425" tIns="91425" rIns="91425" bIns="91425" anchor="ctr" anchorCtr="0">
             <a:noAutofit/>
           </a:bodyPr>
           <a:lstStyle/>
           <a:p>
-            <a:pPr indent="0" lvl="0" marL="0" rtl="0" algn="l">
+            <a:pPr marL="0" lvl="0" indent="0" algn="l" rtl="0">
               <a:spcBef>
                 <a:spcPts val="0"/>
               </a:spcBef>
@@ -4298,9 +4407,6 @@
               </a:spcAft>
               <a:buNone/>
             </a:pPr>
-            <a:r>
-              <a:t/>
-            </a:r>
             <a:endParaRPr/>
           </a:p>
         </p:txBody>
@@ -4320,21 +4426,23 @@
             <a:avLst/>
           </a:prstGeom>
           <a:noFill/>
-          <a:ln cap="flat" cmpd="sng" w="19050">
+          <a:ln w="19050" cap="flat" cmpd="sng">
             <a:solidFill>
               <a:schemeClr val="lt1"/>
             </a:solidFill>
             <a:prstDash val="solid"/>
             <a:round/>
-            <a:headEnd len="sm" w="sm" type="none"/>
-            <a:tailEnd len="sm" w="sm" type="none"/>
+            <a:headEnd type="none" w="sm" len="sm"/>
+            <a:tailEnd type="none" w="sm" len="sm"/>
           </a:ln>
         </p:spPr>
       </p:cxnSp>
       <p:sp>
         <p:nvSpPr>
           <p:cNvPr id="42" name="Google Shape;42;p9"/>
-          <p:cNvSpPr txBox="1"/>
+          <p:cNvSpPr txBox="1">
+            <a:spLocks noGrp="1"/>
+          </p:cNvSpPr>
           <p:nvPr>
             <p:ph type="title"/>
           </p:nvPr>
@@ -4349,7 +4457,7 @@
           </a:prstGeom>
         </p:spPr>
         <p:txBody>
-          <a:bodyPr anchorCtr="0" anchor="b" bIns="91425" lIns="91425" spcFirstLastPara="1" rIns="91425" wrap="square" tIns="91425">
+          <a:bodyPr spcFirstLastPara="1" wrap="square" lIns="91425" tIns="91425" rIns="91425" bIns="91425" anchor="b" anchorCtr="0">
             <a:noAutofit/>
           </a:bodyPr>
           <a:lstStyle>
@@ -4453,15 +4561,19 @@
               <a:defRPr sz="4200"/>
             </a:lvl9pPr>
           </a:lstStyle>
-          <a:p/>
+          <a:p>
+            <a:endParaRPr/>
+          </a:p>
         </p:txBody>
       </p:sp>
       <p:sp>
         <p:nvSpPr>
           <p:cNvPr id="43" name="Google Shape;43;p9"/>
-          <p:cNvSpPr txBox="1"/>
+          <p:cNvSpPr txBox="1">
+            <a:spLocks noGrp="1"/>
+          </p:cNvSpPr>
           <p:nvPr>
-            <p:ph idx="1" type="subTitle"/>
+            <p:ph type="subTitle" idx="1"/>
           </p:nvPr>
         </p:nvSpPr>
         <p:spPr>
@@ -4474,7 +4586,7 @@
           </a:prstGeom>
         </p:spPr>
         <p:txBody>
-          <a:bodyPr anchorCtr="0" anchor="t" bIns="91425" lIns="91425" spcFirstLastPara="1" rIns="91425" wrap="square" tIns="91425">
+          <a:bodyPr spcFirstLastPara="1" wrap="square" lIns="91425" tIns="91425" rIns="91425" bIns="91425" anchor="t" anchorCtr="0">
             <a:noAutofit/>
           </a:bodyPr>
           <a:lstStyle>
@@ -4668,15 +4780,19 @@
               </a:defRPr>
             </a:lvl9pPr>
           </a:lstStyle>
-          <a:p/>
+          <a:p>
+            <a:endParaRPr/>
+          </a:p>
         </p:txBody>
       </p:sp>
       <p:sp>
         <p:nvSpPr>
           <p:cNvPr id="44" name="Google Shape;44;p9"/>
-          <p:cNvSpPr txBox="1"/>
+          <p:cNvSpPr txBox="1">
+            <a:spLocks noGrp="1"/>
+          </p:cNvSpPr>
           <p:nvPr>
-            <p:ph idx="2" type="body"/>
+            <p:ph type="body" idx="2"/>
           </p:nvPr>
         </p:nvSpPr>
         <p:spPr>
@@ -4689,11 +4805,11 @@
           </a:prstGeom>
         </p:spPr>
         <p:txBody>
-          <a:bodyPr anchorCtr="0" anchor="ctr" bIns="91425" lIns="91425" spcFirstLastPara="1" rIns="91425" wrap="square" tIns="91425">
+          <a:bodyPr spcFirstLastPara="1" wrap="square" lIns="91425" tIns="91425" rIns="91425" bIns="91425" anchor="ctr" anchorCtr="0">
             <a:noAutofit/>
           </a:bodyPr>
           <a:lstStyle>
-            <a:lvl1pPr indent="-342900" lvl="0" marL="457200">
+            <a:lvl1pPr marL="457200" lvl="0" indent="-342900">
               <a:spcBef>
                 <a:spcPts val="0"/>
               </a:spcBef>
@@ -4711,7 +4827,7 @@
                 </a:solidFill>
               </a:defRPr>
             </a:lvl1pPr>
-            <a:lvl2pPr indent="-317500" lvl="1" marL="914400">
+            <a:lvl2pPr marL="914400" lvl="1" indent="-317500">
               <a:spcBef>
                 <a:spcPts val="1600"/>
               </a:spcBef>
@@ -4729,7 +4845,7 @@
                 </a:solidFill>
               </a:defRPr>
             </a:lvl2pPr>
-            <a:lvl3pPr indent="-317500" lvl="2" marL="1371600">
+            <a:lvl3pPr marL="1371600" lvl="2" indent="-317500">
               <a:spcBef>
                 <a:spcPts val="1600"/>
               </a:spcBef>
@@ -4747,7 +4863,7 @@
                 </a:solidFill>
               </a:defRPr>
             </a:lvl3pPr>
-            <a:lvl4pPr indent="-317500" lvl="3" marL="1828800">
+            <a:lvl4pPr marL="1828800" lvl="3" indent="-317500">
               <a:spcBef>
                 <a:spcPts val="1600"/>
               </a:spcBef>
@@ -4765,7 +4881,7 @@
                 </a:solidFill>
               </a:defRPr>
             </a:lvl4pPr>
-            <a:lvl5pPr indent="-317500" lvl="4" marL="2286000">
+            <a:lvl5pPr marL="2286000" lvl="4" indent="-317500">
               <a:spcBef>
                 <a:spcPts val="1600"/>
               </a:spcBef>
@@ -4783,7 +4899,7 @@
                 </a:solidFill>
               </a:defRPr>
             </a:lvl5pPr>
-            <a:lvl6pPr indent="-317500" lvl="5" marL="2743200">
+            <a:lvl6pPr marL="2743200" lvl="5" indent="-317500">
               <a:spcBef>
                 <a:spcPts val="1600"/>
               </a:spcBef>
@@ -4801,7 +4917,7 @@
                 </a:solidFill>
               </a:defRPr>
             </a:lvl6pPr>
-            <a:lvl7pPr indent="-317500" lvl="6" marL="3200400">
+            <a:lvl7pPr marL="3200400" lvl="6" indent="-317500">
               <a:spcBef>
                 <a:spcPts val="1600"/>
               </a:spcBef>
@@ -4819,7 +4935,7 @@
                 </a:solidFill>
               </a:defRPr>
             </a:lvl7pPr>
-            <a:lvl8pPr indent="-317500" lvl="7" marL="3657600">
+            <a:lvl8pPr marL="3657600" lvl="7" indent="-317500">
               <a:spcBef>
                 <a:spcPts val="1600"/>
               </a:spcBef>
@@ -4837,7 +4953,7 @@
                 </a:solidFill>
               </a:defRPr>
             </a:lvl8pPr>
-            <a:lvl9pPr indent="-317500" lvl="8" marL="4114800">
+            <a:lvl9pPr marL="4114800" lvl="8" indent="-317500">
               <a:spcBef>
                 <a:spcPts val="1600"/>
               </a:spcBef>
@@ -4856,15 +4972,19 @@
               </a:defRPr>
             </a:lvl9pPr>
           </a:lstStyle>
-          <a:p/>
+          <a:p>
+            <a:endParaRPr/>
+          </a:p>
         </p:txBody>
       </p:sp>
       <p:sp>
         <p:nvSpPr>
           <p:cNvPr id="45" name="Google Shape;45;p9"/>
-          <p:cNvSpPr txBox="1"/>
+          <p:cNvSpPr txBox="1">
+            <a:spLocks noGrp="1"/>
+          </p:cNvSpPr>
           <p:nvPr>
-            <p:ph idx="12" type="sldNum"/>
+            <p:ph type="sldNum" idx="12"/>
           </p:nvPr>
         </p:nvSpPr>
         <p:spPr>
@@ -4877,7 +4997,7 @@
           </a:prstGeom>
         </p:spPr>
         <p:txBody>
-          <a:bodyPr anchorCtr="0" anchor="ctr" bIns="91425" lIns="91425" spcFirstLastPara="1" rIns="91425" wrap="square" tIns="91425">
+          <a:bodyPr spcFirstLastPara="1" wrap="square" lIns="91425" tIns="91425" rIns="91425" bIns="91425" anchor="ctr" anchorCtr="0">
             <a:noAutofit/>
           </a:bodyPr>
           <a:lstStyle>
@@ -4955,7 +5075,7 @@
             </a:lvl9pPr>
           </a:lstStyle>
           <a:p>
-            <a:pPr indent="0" lvl="0" marL="0" rtl="0" algn="r">
+            <a:pPr marL="0" lvl="0" indent="0" algn="r" rtl="0">
               <a:spcBef>
                 <a:spcPts val="0"/>
               </a:spcBef>
@@ -4981,11 +5101,11 @@
 </file>
 
 <file path=ppt/slideLayouts/slideLayout9.xml><?xml version="1.0" encoding="utf-8"?>
-<p:sldLayout xmlns:a="http://schemas.openxmlformats.org/drawingml/2006/main" xmlns:r="http://schemas.openxmlformats.org/officeDocument/2006/relationships" xmlns:mc="http://schemas.openxmlformats.org/markup-compatibility/2006" xmlns:mv="urn:schemas-microsoft-com:mac:vml" xmlns:p="http://schemas.openxmlformats.org/presentationml/2006/main" xmlns:c="http://schemas.openxmlformats.org/drawingml/2006/chart" xmlns:dgm="http://schemas.openxmlformats.org/drawingml/2006/diagram" xmlns:o="urn:schemas-microsoft-com:office:office" xmlns:v="urn:schemas-microsoft-com:vml" xmlns:pvml="urn:schemas-microsoft-com:office:powerpoint" xmlns:com="http://schemas.openxmlformats.org/drawingml/2006/compatibility" xmlns:p14="http://schemas.microsoft.com/office/powerpoint/2010/main" xmlns:p15="http://schemas.microsoft.com/office/powerpoint/2012/main" matchingName="Caption">
+<p:sldLayout xmlns:a="http://schemas.openxmlformats.org/drawingml/2006/main" xmlns:r="http://schemas.openxmlformats.org/officeDocument/2006/relationships" xmlns:p="http://schemas.openxmlformats.org/presentationml/2006/main" matchingName="Caption">
   <p:cSld name="CAPTION_ONLY">
     <p:spTree>
       <p:nvGrpSpPr>
-        <p:cNvPr id="46" name="Shape 46"/>
+        <p:cNvPr id="1" name="Shape 46"/>
         <p:cNvGrpSpPr/>
         <p:nvPr/>
       </p:nvGrpSpPr>
@@ -5000,9 +5120,11 @@
       <p:sp>
         <p:nvSpPr>
           <p:cNvPr id="47" name="Google Shape;47;p10"/>
-          <p:cNvSpPr txBox="1"/>
+          <p:cNvSpPr txBox="1">
+            <a:spLocks noGrp="1"/>
+          </p:cNvSpPr>
           <p:nvPr>
-            <p:ph idx="1" type="body"/>
+            <p:ph type="body" idx="1"/>
           </p:nvPr>
         </p:nvSpPr>
         <p:spPr>
@@ -5015,11 +5137,11 @@
           </a:prstGeom>
         </p:spPr>
         <p:txBody>
-          <a:bodyPr anchorCtr="0" anchor="ctr" bIns="91425" lIns="91425" spcFirstLastPara="1" rIns="91425" wrap="square" tIns="91425">
+          <a:bodyPr spcFirstLastPara="1" wrap="square" lIns="91425" tIns="91425" rIns="91425" bIns="91425" anchor="ctr" anchorCtr="0">
             <a:noAutofit/>
           </a:bodyPr>
           <a:lstStyle>
-            <a:lvl1pPr indent="-228600" lvl="0" marL="457200">
+            <a:lvl1pPr marL="457200" lvl="0" indent="-228600">
               <a:lnSpc>
                 <a:spcPct val="100000"/>
               </a:lnSpc>
@@ -5046,15 +5168,19 @@
               </a:defRPr>
             </a:lvl1pPr>
           </a:lstStyle>
-          <a:p/>
+          <a:p>
+            <a:endParaRPr/>
+          </a:p>
         </p:txBody>
       </p:sp>
       <p:sp>
         <p:nvSpPr>
           <p:cNvPr id="48" name="Google Shape;48;p10"/>
-          <p:cNvSpPr txBox="1"/>
+          <p:cNvSpPr txBox="1">
+            <a:spLocks noGrp="1"/>
+          </p:cNvSpPr>
           <p:nvPr>
-            <p:ph idx="12" type="sldNum"/>
+            <p:ph type="sldNum" idx="12"/>
           </p:nvPr>
         </p:nvSpPr>
         <p:spPr>
@@ -5067,7 +5193,7 @@
           </a:prstGeom>
         </p:spPr>
         <p:txBody>
-          <a:bodyPr anchorCtr="0" anchor="ctr" bIns="91425" lIns="91425" spcFirstLastPara="1" rIns="91425" wrap="square" tIns="91425">
+          <a:bodyPr spcFirstLastPara="1" wrap="square" lIns="91425" tIns="91425" rIns="91425" bIns="91425" anchor="ctr" anchorCtr="0">
             <a:noAutofit/>
           </a:bodyPr>
           <a:lstStyle>
@@ -5109,7 +5235,7 @@
             </a:lvl9pPr>
           </a:lstStyle>
           <a:p>
-            <a:pPr indent="0" lvl="0" marL="0" rtl="0" algn="r">
+            <a:pPr marL="0" lvl="0" indent="0" algn="r" rtl="0">
               <a:spcBef>
                 <a:spcPts val="0"/>
               </a:spcBef>
@@ -5135,18 +5261,19 @@
 </file>
 
 <file path=ppt/slideMasters/slideMaster1.xml><?xml version="1.0" encoding="utf-8"?>
-<p:sldMaster xmlns:a="http://schemas.openxmlformats.org/drawingml/2006/main" xmlns:r="http://schemas.openxmlformats.org/officeDocument/2006/relationships" xmlns:mc="http://schemas.openxmlformats.org/markup-compatibility/2006" xmlns:mv="urn:schemas-microsoft-com:mac:vml" xmlns:p="http://schemas.openxmlformats.org/presentationml/2006/main" xmlns:c="http://schemas.openxmlformats.org/drawingml/2006/chart" xmlns:dgm="http://schemas.openxmlformats.org/drawingml/2006/diagram" xmlns:o="urn:schemas-microsoft-com:office:office" xmlns:v="urn:schemas-microsoft-com:vml" xmlns:pvml="urn:schemas-microsoft-com:office:powerpoint" xmlns:com="http://schemas.openxmlformats.org/drawingml/2006/compatibility" xmlns:p14="http://schemas.microsoft.com/office/powerpoint/2010/main" xmlns:p15="http://schemas.microsoft.com/office/powerpoint/2012/main">
+<p:sldMaster xmlns:a="http://schemas.openxmlformats.org/drawingml/2006/main" xmlns:r="http://schemas.openxmlformats.org/officeDocument/2006/relationships" xmlns:p="http://schemas.openxmlformats.org/presentationml/2006/main">
   <p:cSld name="slate">
     <p:bg>
       <p:bgPr>
         <a:solidFill>
           <a:schemeClr val="lt1"/>
         </a:solidFill>
+        <a:effectLst/>
       </p:bgPr>
     </p:bg>
     <p:spTree>
       <p:nvGrpSpPr>
-        <p:cNvPr id="5" name="Shape 5"/>
+        <p:cNvPr id="1" name="Shape 5"/>
         <p:cNvGrpSpPr/>
         <p:nvPr/>
       </p:nvGrpSpPr>
@@ -5161,7 +5288,9 @@
       <p:sp>
         <p:nvSpPr>
           <p:cNvPr id="6" name="Google Shape;6;p1"/>
-          <p:cNvSpPr txBox="1"/>
+          <p:cNvSpPr txBox="1">
+            <a:spLocks noGrp="1"/>
+          </p:cNvSpPr>
           <p:nvPr>
             <p:ph type="title"/>
           </p:nvPr>
@@ -5180,7 +5309,7 @@
           </a:ln>
         </p:spPr>
         <p:txBody>
-          <a:bodyPr anchorCtr="0" anchor="t" bIns="91425" lIns="91425" spcFirstLastPara="1" rIns="91425" wrap="square" tIns="91425">
+          <a:bodyPr spcFirstLastPara="1" wrap="square" lIns="91425" tIns="91425" rIns="91425" bIns="91425" anchor="t" anchorCtr="0">
             <a:noAutofit/>
           </a:bodyPr>
           <a:lstStyle>
@@ -5392,15 +5521,19 @@
               </a:defRPr>
             </a:lvl9pPr>
           </a:lstStyle>
-          <a:p/>
+          <a:p>
+            <a:endParaRPr/>
+          </a:p>
         </p:txBody>
       </p:sp>
       <p:sp>
         <p:nvSpPr>
           <p:cNvPr id="7" name="Google Shape;7;p1"/>
-          <p:cNvSpPr txBox="1"/>
+          <p:cNvSpPr txBox="1">
+            <a:spLocks noGrp="1"/>
+          </p:cNvSpPr>
           <p:nvPr>
-            <p:ph idx="1" type="body"/>
+            <p:ph type="body" idx="1"/>
           </p:nvPr>
         </p:nvSpPr>
         <p:spPr>
@@ -5417,11 +5550,11 @@
           </a:ln>
         </p:spPr>
         <p:txBody>
-          <a:bodyPr anchorCtr="0" anchor="t" bIns="91425" lIns="91425" spcFirstLastPara="1" rIns="91425" wrap="square" tIns="91425">
+          <a:bodyPr spcFirstLastPara="1" wrap="square" lIns="91425" tIns="91425" rIns="91425" bIns="91425" anchor="t" anchorCtr="0">
             <a:noAutofit/>
           </a:bodyPr>
           <a:lstStyle>
-            <a:lvl1pPr indent="-342900" lvl="0" marL="457200">
+            <a:lvl1pPr marL="457200" lvl="0" indent="-342900">
               <a:lnSpc>
                 <a:spcPct val="115000"/>
               </a:lnSpc>
@@ -5447,7 +5580,7 @@
                 <a:sym typeface="Average"/>
               </a:defRPr>
             </a:lvl1pPr>
-            <a:lvl2pPr indent="-317500" lvl="1" marL="914400">
+            <a:lvl2pPr marL="914400" lvl="1" indent="-317500">
               <a:lnSpc>
                 <a:spcPct val="115000"/>
               </a:lnSpc>
@@ -5473,7 +5606,7 @@
                 <a:sym typeface="Average"/>
               </a:defRPr>
             </a:lvl2pPr>
-            <a:lvl3pPr indent="-317500" lvl="2" marL="1371600">
+            <a:lvl3pPr marL="1371600" lvl="2" indent="-317500">
               <a:lnSpc>
                 <a:spcPct val="115000"/>
               </a:lnSpc>
@@ -5499,7 +5632,7 @@
                 <a:sym typeface="Average"/>
               </a:defRPr>
             </a:lvl3pPr>
-            <a:lvl4pPr indent="-317500" lvl="3" marL="1828800">
+            <a:lvl4pPr marL="1828800" lvl="3" indent="-317500">
               <a:lnSpc>
                 <a:spcPct val="115000"/>
               </a:lnSpc>
@@ -5525,7 +5658,7 @@
                 <a:sym typeface="Average"/>
               </a:defRPr>
             </a:lvl4pPr>
-            <a:lvl5pPr indent="-317500" lvl="4" marL="2286000">
+            <a:lvl5pPr marL="2286000" lvl="4" indent="-317500">
               <a:lnSpc>
                 <a:spcPct val="115000"/>
               </a:lnSpc>
@@ -5551,7 +5684,7 @@
                 <a:sym typeface="Average"/>
               </a:defRPr>
             </a:lvl5pPr>
-            <a:lvl6pPr indent="-317500" lvl="5" marL="2743200">
+            <a:lvl6pPr marL="2743200" lvl="5" indent="-317500">
               <a:lnSpc>
                 <a:spcPct val="115000"/>
               </a:lnSpc>
@@ -5577,7 +5710,7 @@
                 <a:sym typeface="Average"/>
               </a:defRPr>
             </a:lvl6pPr>
-            <a:lvl7pPr indent="-317500" lvl="6" marL="3200400">
+            <a:lvl7pPr marL="3200400" lvl="6" indent="-317500">
               <a:lnSpc>
                 <a:spcPct val="115000"/>
               </a:lnSpc>
@@ -5603,7 +5736,7 @@
                 <a:sym typeface="Average"/>
               </a:defRPr>
             </a:lvl7pPr>
-            <a:lvl8pPr indent="-317500" lvl="7" marL="3657600">
+            <a:lvl8pPr marL="3657600" lvl="7" indent="-317500">
               <a:lnSpc>
                 <a:spcPct val="115000"/>
               </a:lnSpc>
@@ -5629,7 +5762,7 @@
                 <a:sym typeface="Average"/>
               </a:defRPr>
             </a:lvl8pPr>
-            <a:lvl9pPr indent="-317500" lvl="8" marL="4114800">
+            <a:lvl9pPr marL="4114800" lvl="8" indent="-317500">
               <a:lnSpc>
                 <a:spcPct val="115000"/>
               </a:lnSpc>
@@ -5656,15 +5789,19 @@
               </a:defRPr>
             </a:lvl9pPr>
           </a:lstStyle>
-          <a:p/>
+          <a:p>
+            <a:endParaRPr/>
+          </a:p>
         </p:txBody>
       </p:sp>
       <p:sp>
         <p:nvSpPr>
           <p:cNvPr id="8" name="Google Shape;8;p1"/>
-          <p:cNvSpPr txBox="1"/>
+          <p:cNvSpPr txBox="1">
+            <a:spLocks noGrp="1"/>
+          </p:cNvSpPr>
           <p:nvPr>
-            <p:ph idx="12" type="sldNum"/>
+            <p:ph type="sldNum" idx="12"/>
           </p:nvPr>
         </p:nvSpPr>
         <p:spPr>
@@ -5681,7 +5818,7 @@
           </a:ln>
         </p:spPr>
         <p:txBody>
-          <a:bodyPr anchorCtr="0" anchor="ctr" bIns="91425" lIns="91425" spcFirstLastPara="1" rIns="91425" wrap="square" tIns="91425">
+          <a:bodyPr spcFirstLastPara="1" wrap="square" lIns="91425" tIns="91425" rIns="91425" bIns="91425" anchor="ctr" anchorCtr="0">
             <a:noAutofit/>
           </a:bodyPr>
           <a:lstStyle>
@@ -5795,7 +5932,7 @@
             </a:lvl9pPr>
           </a:lstStyle>
           <a:p>
-            <a:pPr indent="0" lvl="0" marL="0" rtl="0" algn="r">
+            <a:pPr marL="0" lvl="0" indent="0" algn="r" rtl="0">
               <a:spcBef>
                 <a:spcPts val="0"/>
               </a:spcBef>
@@ -5814,7 +5951,7 @@
       </p:sp>
     </p:spTree>
   </p:cSld>
-  <p:clrMap accent1="accent1" accent2="accent2" accent3="accent3" accent4="accent4" accent5="accent5" accent6="accent6" bg1="lt1" bg2="dk2" tx1="dk1" tx2="lt2" folHlink="folHlink" hlink="hlink"/>
+  <p:clrMap bg1="lt1" tx1="dk1" bg2="dk2" tx2="lt2" accent1="accent1" accent2="accent2" accent3="accent3" accent4="accent4" accent5="accent5" accent6="accent6" hlink="hlink" folHlink="folHlink"/>
   <p:sldLayoutIdLst>
     <p:sldLayoutId id="2147483648" r:id="rId1"/>
     <p:sldLayoutId id="2147483649" r:id="rId2"/>
@@ -5828,10 +5965,10 @@
     <p:sldLayoutId id="2147483657" r:id="rId10"/>
     <p:sldLayoutId id="2147483658" r:id="rId11"/>
   </p:sldLayoutIdLst>
-  <p:hf dt="0" ftr="0" hdr="0" sldNum="0"/>
+  <p:hf sldNum="0" hdr="0" ftr="0" dt="0"/>
   <p:txStyles>
     <p:titleStyle>
-      <a:defPPr lvl="0" marR="0" rtl="0" algn="l">
+      <a:defPPr marR="0" lvl="0" algn="l" rtl="0">
         <a:lnSpc>
           <a:spcPct val="100000"/>
         </a:lnSpc>
@@ -5842,7 +5979,7 @@
           <a:spcPts val="0"/>
         </a:spcAft>
       </a:defPPr>
-      <a:lvl1pPr lvl="0" marR="0" rtl="0" algn="l">
+      <a:lvl1pPr marR="0" lvl="0" algn="l" rtl="0">
         <a:lnSpc>
           <a:spcPct val="100000"/>
         </a:lnSpc>
@@ -5856,7 +5993,7 @@
           <a:srgbClr val="000000"/>
         </a:buClr>
         <a:buFont typeface="Arial"/>
-        <a:defRPr b="0" i="0" sz="1400" u="none" cap="none" strike="noStrike">
+        <a:defRPr sz="1400" b="0" i="0" u="none" strike="noStrike" cap="none">
           <a:solidFill>
             <a:srgbClr val="000000"/>
           </a:solidFill>
@@ -5866,7 +6003,7 @@
           <a:sym typeface="Arial"/>
         </a:defRPr>
       </a:lvl1pPr>
-      <a:lvl2pPr lvl="1" marR="0" rtl="0" algn="l">
+      <a:lvl2pPr marR="0" lvl="1" algn="l" rtl="0">
         <a:lnSpc>
           <a:spcPct val="100000"/>
         </a:lnSpc>
@@ -5880,7 +6017,7 @@
           <a:srgbClr val="000000"/>
         </a:buClr>
         <a:buFont typeface="Arial"/>
-        <a:defRPr b="0" i="0" sz="1400" u="none" cap="none" strike="noStrike">
+        <a:defRPr sz="1400" b="0" i="0" u="none" strike="noStrike" cap="none">
           <a:solidFill>
             <a:srgbClr val="000000"/>
           </a:solidFill>
@@ -5890,7 +6027,7 @@
           <a:sym typeface="Arial"/>
         </a:defRPr>
       </a:lvl2pPr>
-      <a:lvl3pPr lvl="2" marR="0" rtl="0" algn="l">
+      <a:lvl3pPr marR="0" lvl="2" algn="l" rtl="0">
         <a:lnSpc>
           <a:spcPct val="100000"/>
         </a:lnSpc>
@@ -5904,7 +6041,7 @@
           <a:srgbClr val="000000"/>
         </a:buClr>
         <a:buFont typeface="Arial"/>
-        <a:defRPr b="0" i="0" sz="1400" u="none" cap="none" strike="noStrike">
+        <a:defRPr sz="1400" b="0" i="0" u="none" strike="noStrike" cap="none">
           <a:solidFill>
             <a:srgbClr val="000000"/>
           </a:solidFill>
@@ -5914,7 +6051,7 @@
           <a:sym typeface="Arial"/>
         </a:defRPr>
       </a:lvl3pPr>
-      <a:lvl4pPr lvl="3" marR="0" rtl="0" algn="l">
+      <a:lvl4pPr marR="0" lvl="3" algn="l" rtl="0">
         <a:lnSpc>
           <a:spcPct val="100000"/>
         </a:lnSpc>
@@ -5928,7 +6065,7 @@
           <a:srgbClr val="000000"/>
         </a:buClr>
         <a:buFont typeface="Arial"/>
-        <a:defRPr b="0" i="0" sz="1400" u="none" cap="none" strike="noStrike">
+        <a:defRPr sz="1400" b="0" i="0" u="none" strike="noStrike" cap="none">
           <a:solidFill>
             <a:srgbClr val="000000"/>
           </a:solidFill>
@@ -5938,7 +6075,7 @@
           <a:sym typeface="Arial"/>
         </a:defRPr>
       </a:lvl4pPr>
-      <a:lvl5pPr lvl="4" marR="0" rtl="0" algn="l">
+      <a:lvl5pPr marR="0" lvl="4" algn="l" rtl="0">
         <a:lnSpc>
           <a:spcPct val="100000"/>
         </a:lnSpc>
@@ -5952,7 +6089,7 @@
           <a:srgbClr val="000000"/>
         </a:buClr>
         <a:buFont typeface="Arial"/>
-        <a:defRPr b="0" i="0" sz="1400" u="none" cap="none" strike="noStrike">
+        <a:defRPr sz="1400" b="0" i="0" u="none" strike="noStrike" cap="none">
           <a:solidFill>
             <a:srgbClr val="000000"/>
           </a:solidFill>
@@ -5962,7 +6099,7 @@
           <a:sym typeface="Arial"/>
         </a:defRPr>
       </a:lvl5pPr>
-      <a:lvl6pPr lvl="5" marR="0" rtl="0" algn="l">
+      <a:lvl6pPr marR="0" lvl="5" algn="l" rtl="0">
         <a:lnSpc>
           <a:spcPct val="100000"/>
         </a:lnSpc>
@@ -5976,7 +6113,7 @@
           <a:srgbClr val="000000"/>
         </a:buClr>
         <a:buFont typeface="Arial"/>
-        <a:defRPr b="0" i="0" sz="1400" u="none" cap="none" strike="noStrike">
+        <a:defRPr sz="1400" b="0" i="0" u="none" strike="noStrike" cap="none">
           <a:solidFill>
             <a:srgbClr val="000000"/>
           </a:solidFill>
@@ -5986,7 +6123,7 @@
           <a:sym typeface="Arial"/>
         </a:defRPr>
       </a:lvl6pPr>
-      <a:lvl7pPr lvl="6" marR="0" rtl="0" algn="l">
+      <a:lvl7pPr marR="0" lvl="6" algn="l" rtl="0">
         <a:lnSpc>
           <a:spcPct val="100000"/>
         </a:lnSpc>
@@ -6000,7 +6137,7 @@
           <a:srgbClr val="000000"/>
         </a:buClr>
         <a:buFont typeface="Arial"/>
-        <a:defRPr b="0" i="0" sz="1400" u="none" cap="none" strike="noStrike">
+        <a:defRPr sz="1400" b="0" i="0" u="none" strike="noStrike" cap="none">
           <a:solidFill>
             <a:srgbClr val="000000"/>
           </a:solidFill>
@@ -6010,7 +6147,7 @@
           <a:sym typeface="Arial"/>
         </a:defRPr>
       </a:lvl7pPr>
-      <a:lvl8pPr lvl="7" marR="0" rtl="0" algn="l">
+      <a:lvl8pPr marR="0" lvl="7" algn="l" rtl="0">
         <a:lnSpc>
           <a:spcPct val="100000"/>
         </a:lnSpc>
@@ -6024,7 +6161,7 @@
           <a:srgbClr val="000000"/>
         </a:buClr>
         <a:buFont typeface="Arial"/>
-        <a:defRPr b="0" i="0" sz="1400" u="none" cap="none" strike="noStrike">
+        <a:defRPr sz="1400" b="0" i="0" u="none" strike="noStrike" cap="none">
           <a:solidFill>
             <a:srgbClr val="000000"/>
           </a:solidFill>
@@ -6034,7 +6171,7 @@
           <a:sym typeface="Arial"/>
         </a:defRPr>
       </a:lvl8pPr>
-      <a:lvl9pPr lvl="8" marR="0" rtl="0" algn="l">
+      <a:lvl9pPr marR="0" lvl="8" algn="l" rtl="0">
         <a:lnSpc>
           <a:spcPct val="100000"/>
         </a:lnSpc>
@@ -6048,7 +6185,7 @@
           <a:srgbClr val="000000"/>
         </a:buClr>
         <a:buFont typeface="Arial"/>
-        <a:defRPr b="0" i="0" sz="1400" u="none" cap="none" strike="noStrike">
+        <a:defRPr sz="1400" b="0" i="0" u="none" strike="noStrike" cap="none">
           <a:solidFill>
             <a:srgbClr val="000000"/>
           </a:solidFill>
@@ -6060,7 +6197,7 @@
       </a:lvl9pPr>
     </p:titleStyle>
     <p:bodyStyle>
-      <a:defPPr lvl="0" marR="0" rtl="0" algn="l">
+      <a:defPPr marR="0" lvl="0" algn="l" rtl="0">
         <a:lnSpc>
           <a:spcPct val="100000"/>
         </a:lnSpc>
@@ -6071,7 +6208,7 @@
           <a:spcPts val="0"/>
         </a:spcAft>
       </a:defPPr>
-      <a:lvl1pPr lvl="0" marR="0" rtl="0" algn="l">
+      <a:lvl1pPr marR="0" lvl="0" algn="l" rtl="0">
         <a:lnSpc>
           <a:spcPct val="100000"/>
         </a:lnSpc>
@@ -6085,7 +6222,7 @@
           <a:srgbClr val="000000"/>
         </a:buClr>
         <a:buFont typeface="Arial"/>
-        <a:defRPr b="0" i="0" sz="1400" u="none" cap="none" strike="noStrike">
+        <a:defRPr sz="1400" b="0" i="0" u="none" strike="noStrike" cap="none">
           <a:solidFill>
             <a:srgbClr val="000000"/>
           </a:solidFill>
@@ -6095,7 +6232,7 @@
           <a:sym typeface="Arial"/>
         </a:defRPr>
       </a:lvl1pPr>
-      <a:lvl2pPr lvl="1" marR="0" rtl="0" algn="l">
+      <a:lvl2pPr marR="0" lvl="1" algn="l" rtl="0">
         <a:lnSpc>
           <a:spcPct val="100000"/>
         </a:lnSpc>
@@ -6109,7 +6246,7 @@
           <a:srgbClr val="000000"/>
         </a:buClr>
         <a:buFont typeface="Arial"/>
-        <a:defRPr b="0" i="0" sz="1400" u="none" cap="none" strike="noStrike">
+        <a:defRPr sz="1400" b="0" i="0" u="none" strike="noStrike" cap="none">
           <a:solidFill>
             <a:srgbClr val="000000"/>
           </a:solidFill>
@@ -6119,7 +6256,7 @@
           <a:sym typeface="Arial"/>
         </a:defRPr>
       </a:lvl2pPr>
-      <a:lvl3pPr lvl="2" marR="0" rtl="0" algn="l">
+      <a:lvl3pPr marR="0" lvl="2" algn="l" rtl="0">
         <a:lnSpc>
           <a:spcPct val="100000"/>
         </a:lnSpc>
@@ -6133,7 +6270,7 @@
           <a:srgbClr val="000000"/>
         </a:buClr>
         <a:buFont typeface="Arial"/>
-        <a:defRPr b="0" i="0" sz="1400" u="none" cap="none" strike="noStrike">
+        <a:defRPr sz="1400" b="0" i="0" u="none" strike="noStrike" cap="none">
           <a:solidFill>
             <a:srgbClr val="000000"/>
           </a:solidFill>
@@ -6143,7 +6280,7 @@
           <a:sym typeface="Arial"/>
         </a:defRPr>
       </a:lvl3pPr>
-      <a:lvl4pPr lvl="3" marR="0" rtl="0" algn="l">
+      <a:lvl4pPr marR="0" lvl="3" algn="l" rtl="0">
         <a:lnSpc>
           <a:spcPct val="100000"/>
         </a:lnSpc>
@@ -6157,7 +6294,7 @@
           <a:srgbClr val="000000"/>
         </a:buClr>
         <a:buFont typeface="Arial"/>
-        <a:defRPr b="0" i="0" sz="1400" u="none" cap="none" strike="noStrike">
+        <a:defRPr sz="1400" b="0" i="0" u="none" strike="noStrike" cap="none">
           <a:solidFill>
             <a:srgbClr val="000000"/>
           </a:solidFill>
@@ -6167,7 +6304,7 @@
           <a:sym typeface="Arial"/>
         </a:defRPr>
       </a:lvl4pPr>
-      <a:lvl5pPr lvl="4" marR="0" rtl="0" algn="l">
+      <a:lvl5pPr marR="0" lvl="4" algn="l" rtl="0">
         <a:lnSpc>
           <a:spcPct val="100000"/>
         </a:lnSpc>
@@ -6181,7 +6318,7 @@
           <a:srgbClr val="000000"/>
         </a:buClr>
         <a:buFont typeface="Arial"/>
-        <a:defRPr b="0" i="0" sz="1400" u="none" cap="none" strike="noStrike">
+        <a:defRPr sz="1400" b="0" i="0" u="none" strike="noStrike" cap="none">
           <a:solidFill>
             <a:srgbClr val="000000"/>
           </a:solidFill>
@@ -6191,7 +6328,7 @@
           <a:sym typeface="Arial"/>
         </a:defRPr>
       </a:lvl5pPr>
-      <a:lvl6pPr lvl="5" marR="0" rtl="0" algn="l">
+      <a:lvl6pPr marR="0" lvl="5" algn="l" rtl="0">
         <a:lnSpc>
           <a:spcPct val="100000"/>
         </a:lnSpc>
@@ -6205,7 +6342,7 @@
           <a:srgbClr val="000000"/>
         </a:buClr>
         <a:buFont typeface="Arial"/>
-        <a:defRPr b="0" i="0" sz="1400" u="none" cap="none" strike="noStrike">
+        <a:defRPr sz="1400" b="0" i="0" u="none" strike="noStrike" cap="none">
           <a:solidFill>
             <a:srgbClr val="000000"/>
           </a:solidFill>
@@ -6215,7 +6352,7 @@
           <a:sym typeface="Arial"/>
         </a:defRPr>
       </a:lvl6pPr>
-      <a:lvl7pPr lvl="6" marR="0" rtl="0" algn="l">
+      <a:lvl7pPr marR="0" lvl="6" algn="l" rtl="0">
         <a:lnSpc>
           <a:spcPct val="100000"/>
         </a:lnSpc>
@@ -6229,7 +6366,7 @@
           <a:srgbClr val="000000"/>
         </a:buClr>
         <a:buFont typeface="Arial"/>
-        <a:defRPr b="0" i="0" sz="1400" u="none" cap="none" strike="noStrike">
+        <a:defRPr sz="1400" b="0" i="0" u="none" strike="noStrike" cap="none">
           <a:solidFill>
             <a:srgbClr val="000000"/>
           </a:solidFill>
@@ -6239,7 +6376,7 @@
           <a:sym typeface="Arial"/>
         </a:defRPr>
       </a:lvl7pPr>
-      <a:lvl8pPr lvl="7" marR="0" rtl="0" algn="l">
+      <a:lvl8pPr marR="0" lvl="7" algn="l" rtl="0">
         <a:lnSpc>
           <a:spcPct val="100000"/>
         </a:lnSpc>
@@ -6253,7 +6390,7 @@
           <a:srgbClr val="000000"/>
         </a:buClr>
         <a:buFont typeface="Arial"/>
-        <a:defRPr b="0" i="0" sz="1400" u="none" cap="none" strike="noStrike">
+        <a:defRPr sz="1400" b="0" i="0" u="none" strike="noStrike" cap="none">
           <a:solidFill>
             <a:srgbClr val="000000"/>
           </a:solidFill>
@@ -6263,7 +6400,7 @@
           <a:sym typeface="Arial"/>
         </a:defRPr>
       </a:lvl8pPr>
-      <a:lvl9pPr lvl="8" marR="0" rtl="0" algn="l">
+      <a:lvl9pPr marR="0" lvl="8" algn="l" rtl="0">
         <a:lnSpc>
           <a:spcPct val="100000"/>
         </a:lnSpc>
@@ -6277,7 +6414,7 @@
           <a:srgbClr val="000000"/>
         </a:buClr>
         <a:buFont typeface="Arial"/>
-        <a:defRPr b="0" i="0" sz="1400" u="none" cap="none" strike="noStrike">
+        <a:defRPr sz="1400" b="0" i="0" u="none" strike="noStrike" cap="none">
           <a:solidFill>
             <a:srgbClr val="000000"/>
           </a:solidFill>
@@ -6289,7 +6426,7 @@
       </a:lvl9pPr>
     </p:bodyStyle>
     <p:otherStyle>
-      <a:defPPr lvl="0" marR="0" rtl="0" algn="l">
+      <a:defPPr marR="0" lvl="0" algn="l" rtl="0">
         <a:lnSpc>
           <a:spcPct val="100000"/>
         </a:lnSpc>
@@ -6300,7 +6437,7 @@
           <a:spcPts val="0"/>
         </a:spcAft>
       </a:defPPr>
-      <a:lvl1pPr lvl="0" marR="0" rtl="0" algn="l">
+      <a:lvl1pPr marR="0" lvl="0" algn="l" rtl="0">
         <a:lnSpc>
           <a:spcPct val="100000"/>
         </a:lnSpc>
@@ -6314,7 +6451,7 @@
           <a:srgbClr val="000000"/>
         </a:buClr>
         <a:buFont typeface="Arial"/>
-        <a:defRPr b="0" i="0" sz="1400" u="none" cap="none" strike="noStrike">
+        <a:defRPr sz="1400" b="0" i="0" u="none" strike="noStrike" cap="none">
           <a:solidFill>
             <a:srgbClr val="000000"/>
           </a:solidFill>
@@ -6324,7 +6461,7 @@
           <a:sym typeface="Arial"/>
         </a:defRPr>
       </a:lvl1pPr>
-      <a:lvl2pPr lvl="1" marR="0" rtl="0" algn="l">
+      <a:lvl2pPr marR="0" lvl="1" algn="l" rtl="0">
         <a:lnSpc>
           <a:spcPct val="100000"/>
         </a:lnSpc>
@@ -6338,7 +6475,7 @@
           <a:srgbClr val="000000"/>
         </a:buClr>
         <a:buFont typeface="Arial"/>
-        <a:defRPr b="0" i="0" sz="1400" u="none" cap="none" strike="noStrike">
+        <a:defRPr sz="1400" b="0" i="0" u="none" strike="noStrike" cap="none">
           <a:solidFill>
             <a:srgbClr val="000000"/>
           </a:solidFill>
@@ -6348,7 +6485,7 @@
           <a:sym typeface="Arial"/>
         </a:defRPr>
       </a:lvl2pPr>
-      <a:lvl3pPr lvl="2" marR="0" rtl="0" algn="l">
+      <a:lvl3pPr marR="0" lvl="2" algn="l" rtl="0">
         <a:lnSpc>
           <a:spcPct val="100000"/>
         </a:lnSpc>
@@ -6362,7 +6499,7 @@
           <a:srgbClr val="000000"/>
         </a:buClr>
         <a:buFont typeface="Arial"/>
-        <a:defRPr b="0" i="0" sz="1400" u="none" cap="none" strike="noStrike">
+        <a:defRPr sz="1400" b="0" i="0" u="none" strike="noStrike" cap="none">
           <a:solidFill>
             <a:srgbClr val="000000"/>
           </a:solidFill>
@@ -6372,7 +6509,7 @@
           <a:sym typeface="Arial"/>
         </a:defRPr>
       </a:lvl3pPr>
-      <a:lvl4pPr lvl="3" marR="0" rtl="0" algn="l">
+      <a:lvl4pPr marR="0" lvl="3" algn="l" rtl="0">
         <a:lnSpc>
           <a:spcPct val="100000"/>
         </a:lnSpc>
@@ -6386,7 +6523,7 @@
           <a:srgbClr val="000000"/>
         </a:buClr>
         <a:buFont typeface="Arial"/>
-        <a:defRPr b="0" i="0" sz="1400" u="none" cap="none" strike="noStrike">
+        <a:defRPr sz="1400" b="0" i="0" u="none" strike="noStrike" cap="none">
           <a:solidFill>
             <a:srgbClr val="000000"/>
           </a:solidFill>
@@ -6396,7 +6533,7 @@
           <a:sym typeface="Arial"/>
         </a:defRPr>
       </a:lvl4pPr>
-      <a:lvl5pPr lvl="4" marR="0" rtl="0" algn="l">
+      <a:lvl5pPr marR="0" lvl="4" algn="l" rtl="0">
         <a:lnSpc>
           <a:spcPct val="100000"/>
         </a:lnSpc>
@@ -6410,7 +6547,7 @@
           <a:srgbClr val="000000"/>
         </a:buClr>
         <a:buFont typeface="Arial"/>
-        <a:defRPr b="0" i="0" sz="1400" u="none" cap="none" strike="noStrike">
+        <a:defRPr sz="1400" b="0" i="0" u="none" strike="noStrike" cap="none">
           <a:solidFill>
             <a:srgbClr val="000000"/>
           </a:solidFill>
@@ -6420,7 +6557,7 @@
           <a:sym typeface="Arial"/>
         </a:defRPr>
       </a:lvl5pPr>
-      <a:lvl6pPr lvl="5" marR="0" rtl="0" algn="l">
+      <a:lvl6pPr marR="0" lvl="5" algn="l" rtl="0">
         <a:lnSpc>
           <a:spcPct val="100000"/>
         </a:lnSpc>
@@ -6434,7 +6571,7 @@
           <a:srgbClr val="000000"/>
         </a:buClr>
         <a:buFont typeface="Arial"/>
-        <a:defRPr b="0" i="0" sz="1400" u="none" cap="none" strike="noStrike">
+        <a:defRPr sz="1400" b="0" i="0" u="none" strike="noStrike" cap="none">
           <a:solidFill>
             <a:srgbClr val="000000"/>
           </a:solidFill>
@@ -6444,7 +6581,7 @@
           <a:sym typeface="Arial"/>
         </a:defRPr>
       </a:lvl6pPr>
-      <a:lvl7pPr lvl="6" marR="0" rtl="0" algn="l">
+      <a:lvl7pPr marR="0" lvl="6" algn="l" rtl="0">
         <a:lnSpc>
           <a:spcPct val="100000"/>
         </a:lnSpc>
@@ -6458,7 +6595,7 @@
           <a:srgbClr val="000000"/>
         </a:buClr>
         <a:buFont typeface="Arial"/>
-        <a:defRPr b="0" i="0" sz="1400" u="none" cap="none" strike="noStrike">
+        <a:defRPr sz="1400" b="0" i="0" u="none" strike="noStrike" cap="none">
           <a:solidFill>
             <a:srgbClr val="000000"/>
           </a:solidFill>
@@ -6468,7 +6605,7 @@
           <a:sym typeface="Arial"/>
         </a:defRPr>
       </a:lvl7pPr>
-      <a:lvl8pPr lvl="7" marR="0" rtl="0" algn="l">
+      <a:lvl8pPr marR="0" lvl="7" algn="l" rtl="0">
         <a:lnSpc>
           <a:spcPct val="100000"/>
         </a:lnSpc>
@@ -6482,7 +6619,7 @@
           <a:srgbClr val="000000"/>
         </a:buClr>
         <a:buFont typeface="Arial"/>
-        <a:defRPr b="0" i="0" sz="1400" u="none" cap="none" strike="noStrike">
+        <a:defRPr sz="1400" b="0" i="0" u="none" strike="noStrike" cap="none">
           <a:solidFill>
             <a:srgbClr val="000000"/>
           </a:solidFill>
@@ -6492,7 +6629,7 @@
           <a:sym typeface="Arial"/>
         </a:defRPr>
       </a:lvl8pPr>
-      <a:lvl9pPr lvl="8" marR="0" rtl="0" algn="l">
+      <a:lvl9pPr marR="0" lvl="8" algn="l" rtl="0">
         <a:lnSpc>
           <a:spcPct val="100000"/>
         </a:lnSpc>
@@ -6506,7 +6643,7 @@
           <a:srgbClr val="000000"/>
         </a:buClr>
         <a:buFont typeface="Arial"/>
-        <a:defRPr b="0" i="0" sz="1400" u="none" cap="none" strike="noStrike">
+        <a:defRPr sz="1400" b="0" i="0" u="none" strike="noStrike" cap="none">
           <a:solidFill>
             <a:srgbClr val="000000"/>
           </a:solidFill>
@@ -6522,11 +6659,11 @@
 </file>
 
 <file path=ppt/slides/slide1.xml><?xml version="1.0" encoding="utf-8"?>
-<p:sld xmlns:a="http://schemas.openxmlformats.org/drawingml/2006/main" xmlns:r="http://schemas.openxmlformats.org/officeDocument/2006/relationships" xmlns:mc="http://schemas.openxmlformats.org/markup-compatibility/2006" xmlns:mv="urn:schemas-microsoft-com:mac:vml" xmlns:p="http://schemas.openxmlformats.org/presentationml/2006/main" xmlns:c="http://schemas.openxmlformats.org/drawingml/2006/chart" xmlns:dgm="http://schemas.openxmlformats.org/drawingml/2006/diagram" xmlns:o="urn:schemas-microsoft-com:office:office" xmlns:v="urn:schemas-microsoft-com:vml" xmlns:pvml="urn:schemas-microsoft-com:office:powerpoint" xmlns:com="http://schemas.openxmlformats.org/drawingml/2006/compatibility" xmlns:p14="http://schemas.microsoft.com/office/powerpoint/2010/main" xmlns:p15="http://schemas.microsoft.com/office/powerpoint/2012/main">
+<p:sld xmlns:a="http://schemas.openxmlformats.org/drawingml/2006/main" xmlns:r="http://schemas.openxmlformats.org/officeDocument/2006/relationships" xmlns:p="http://schemas.openxmlformats.org/presentationml/2006/main">
   <p:cSld>
     <p:spTree>
       <p:nvGrpSpPr>
-        <p:cNvPr id="58" name="Shape 58"/>
+        <p:cNvPr id="1" name="Shape 58"/>
         <p:cNvGrpSpPr/>
         <p:nvPr/>
       </p:nvGrpSpPr>
@@ -6541,7 +6678,9 @@
       <p:sp>
         <p:nvSpPr>
           <p:cNvPr id="59" name="Google Shape;59;p13"/>
-          <p:cNvSpPr txBox="1"/>
+          <p:cNvSpPr txBox="1">
+            <a:spLocks noGrp="1"/>
+          </p:cNvSpPr>
           <p:nvPr>
             <p:ph type="ctrTitle"/>
           </p:nvPr>
@@ -6556,12 +6695,12 @@
           </a:prstGeom>
         </p:spPr>
         <p:txBody>
-          <a:bodyPr anchorCtr="0" anchor="b" bIns="91425" lIns="91425" spcFirstLastPara="1" rIns="91425" wrap="square" tIns="91425">
+          <a:bodyPr spcFirstLastPara="1" wrap="square" lIns="91425" tIns="91425" rIns="91425" bIns="91425" anchor="b" anchorCtr="0">
             <a:noAutofit/>
           </a:bodyPr>
           <a:lstStyle/>
           <a:p>
-            <a:pPr indent="0" lvl="0" marL="0" rtl="0" algn="ctr">
+            <a:pPr marL="0" lvl="0" indent="0" algn="ctr" rtl="0">
               <a:spcBef>
                 <a:spcPts val="0"/>
               </a:spcBef>
@@ -6571,7 +6710,7 @@
               <a:buNone/>
             </a:pPr>
             <a:r>
-              <a:rPr b="1" lang="en">
+              <a:rPr lang="en" b="1">
                 <a:solidFill>
                   <a:srgbClr val="FFFFFF"/>
                 </a:solidFill>
@@ -6579,7 +6718,7 @@
               <a:t>Software Architecture: Group 5</a:t>
             </a:r>
             <a:r>
-              <a:rPr b="1" lang="en">
+              <a:rPr lang="en" b="1">
                 <a:solidFill>
                   <a:srgbClr val="FF0000"/>
                 </a:solidFill>
@@ -6597,9 +6736,11 @@
       <p:sp>
         <p:nvSpPr>
           <p:cNvPr id="60" name="Google Shape;60;p13"/>
-          <p:cNvSpPr txBox="1"/>
+          <p:cNvSpPr txBox="1">
+            <a:spLocks noGrp="1"/>
+          </p:cNvSpPr>
           <p:nvPr>
-            <p:ph idx="1" type="subTitle"/>
+            <p:ph type="subTitle" idx="1"/>
           </p:nvPr>
         </p:nvSpPr>
         <p:spPr>
@@ -6612,29 +6753,21 @@
           </a:prstGeom>
         </p:spPr>
         <p:txBody>
-          <a:bodyPr anchorCtr="0" anchor="t" bIns="91425" lIns="91425" spcFirstLastPara="1" rIns="91425" wrap="square" tIns="91425">
+          <a:bodyPr spcFirstLastPara="1" wrap="square" lIns="91425" tIns="91425" rIns="91425" bIns="91425" anchor="t" anchorCtr="0">
             <a:noAutofit/>
           </a:bodyPr>
           <a:lstStyle/>
           <a:p>
-            <a:pPr indent="0" lvl="0" marL="0" rtl="0" algn="ctr">
-              <a:spcBef>
-                <a:spcPts val="0"/>
-              </a:spcBef>
-              <a:spcAft>
-                <a:spcPts val="0"/>
-              </a:spcAft>
-              <a:buNone/>
-            </a:pPr>
+            <a:pPr marL="0" lvl="0" indent="0"/>
             <a:r>
-              <a:rPr lang="en" sz="3000">
+              <a:rPr lang="en" sz="3000" dirty="0">
                 <a:solidFill>
                   <a:srgbClr val="FFD966"/>
                 </a:solidFill>
               </a:rPr>
-              <a:t> 					Tactic Implementation</a:t>
+              <a:t> 		  Implementation Tactic</a:t>
             </a:r>
-            <a:endParaRPr sz="3000">
+            <a:endParaRPr sz="3000" dirty="0">
               <a:solidFill>
                 <a:srgbClr val="FFD966"/>
               </a:solidFill>
@@ -6645,9 +6778,11 @@
       <p:sp>
         <p:nvSpPr>
           <p:cNvPr id="61" name="Google Shape;61;p13"/>
-          <p:cNvSpPr txBox="1"/>
+          <p:cNvSpPr txBox="1">
+            <a:spLocks noGrp="1"/>
+          </p:cNvSpPr>
           <p:nvPr>
-            <p:ph idx="1" type="subTitle"/>
+            <p:ph type="subTitle" idx="1"/>
           </p:nvPr>
         </p:nvSpPr>
         <p:spPr>
@@ -6660,12 +6795,12 @@
           </a:prstGeom>
         </p:spPr>
         <p:txBody>
-          <a:bodyPr anchorCtr="0" anchor="t" bIns="91425" lIns="91425" spcFirstLastPara="1" rIns="91425" wrap="square" tIns="91425">
+          <a:bodyPr spcFirstLastPara="1" wrap="square" lIns="91425" tIns="91425" rIns="91425" bIns="91425" anchor="t" anchorCtr="0">
             <a:noAutofit/>
           </a:bodyPr>
           <a:lstStyle/>
           <a:p>
-            <a:pPr indent="0" lvl="0" marL="0" rtl="0" algn="ctr">
+            <a:pPr marL="0" lvl="0" indent="0" algn="ctr" rtl="0">
               <a:spcBef>
                 <a:spcPts val="0"/>
               </a:spcBef>
@@ -6689,7 +6824,7 @@
             </a:endParaRPr>
           </a:p>
           <a:p>
-            <a:pPr indent="0" lvl="0" marL="0" rtl="0" algn="ctr">
+            <a:pPr marL="0" lvl="0" indent="0" algn="ctr" rtl="0">
               <a:spcBef>
                 <a:spcPts val="0"/>
               </a:spcBef>
@@ -6713,7 +6848,7 @@
             </a:endParaRPr>
           </a:p>
           <a:p>
-            <a:pPr indent="0" lvl="0" marL="0" rtl="0" algn="ctr">
+            <a:pPr marL="0" lvl="0" indent="0" algn="ctr" rtl="0">
               <a:spcBef>
                 <a:spcPts val="0"/>
               </a:spcBef>
@@ -6766,6 +6901,38 @@
           </a:ln>
         </p:spPr>
       </p:pic>
+      <p:sp>
+        <p:nvSpPr>
+          <p:cNvPr id="2" name="TextBox 1">
+            <a:extLst>
+              <a:ext uri="{FF2B5EF4-FFF2-40B4-BE49-F238E27FC236}">
+                <a16:creationId xmlns:a16="http://schemas.microsoft.com/office/drawing/2014/main" id="{549A255F-2317-D14E-B9E4-0BAE23C87A03}"/>
+              </a:ext>
+            </a:extLst>
+          </p:cNvPr>
+          <p:cNvSpPr txBox="1"/>
+          <p:nvPr/>
+        </p:nvSpPr>
+        <p:spPr>
+          <a:xfrm>
+            <a:off x="-1453896" y="-292608"/>
+            <a:ext cx="184731" cy="307777"/>
+          </a:xfrm>
+          <a:prstGeom prst="rect">
+            <a:avLst/>
+          </a:prstGeom>
+          <a:noFill/>
+        </p:spPr>
+        <p:txBody>
+          <a:bodyPr wrap="none" rtlCol="0">
+            <a:spAutoFit/>
+          </a:bodyPr>
+          <a:lstStyle/>
+          <a:p>
+            <a:endParaRPr lang="en-US" dirty="0"/>
+          </a:p>
+        </p:txBody>
+      </p:sp>
     </p:spTree>
   </p:cSld>
   <p:clrMapOvr>
@@ -6775,11 +6942,11 @@
 </file>
 
 <file path=ppt/slides/slide2.xml><?xml version="1.0" encoding="utf-8"?>
-<p:sld xmlns:a="http://schemas.openxmlformats.org/drawingml/2006/main" xmlns:r="http://schemas.openxmlformats.org/officeDocument/2006/relationships" xmlns:mc="http://schemas.openxmlformats.org/markup-compatibility/2006" xmlns:mv="urn:schemas-microsoft-com:mac:vml" xmlns:p="http://schemas.openxmlformats.org/presentationml/2006/main" xmlns:c="http://schemas.openxmlformats.org/drawingml/2006/chart" xmlns:dgm="http://schemas.openxmlformats.org/drawingml/2006/diagram" xmlns:o="urn:schemas-microsoft-com:office:office" xmlns:v="urn:schemas-microsoft-com:vml" xmlns:pvml="urn:schemas-microsoft-com:office:powerpoint" xmlns:com="http://schemas.openxmlformats.org/drawingml/2006/compatibility" xmlns:p14="http://schemas.microsoft.com/office/powerpoint/2010/main" xmlns:p15="http://schemas.microsoft.com/office/powerpoint/2012/main">
+<p:sld xmlns:a="http://schemas.openxmlformats.org/drawingml/2006/main" xmlns:r="http://schemas.openxmlformats.org/officeDocument/2006/relationships" xmlns:p="http://schemas.openxmlformats.org/presentationml/2006/main">
   <p:cSld>
     <p:spTree>
       <p:nvGrpSpPr>
-        <p:cNvPr id="66" name="Shape 66"/>
+        <p:cNvPr id="1" name="Shape 66"/>
         <p:cNvGrpSpPr/>
         <p:nvPr/>
       </p:nvGrpSpPr>
@@ -6794,7 +6961,9 @@
       <p:sp>
         <p:nvSpPr>
           <p:cNvPr id="67" name="Google Shape;67;p14"/>
-          <p:cNvSpPr txBox="1"/>
+          <p:cNvSpPr txBox="1">
+            <a:spLocks noGrp="1"/>
+          </p:cNvSpPr>
           <p:nvPr>
             <p:ph type="title"/>
           </p:nvPr>
@@ -6809,12 +6978,12 @@
           </a:prstGeom>
         </p:spPr>
         <p:txBody>
-          <a:bodyPr anchorCtr="0" anchor="t" bIns="91425" lIns="91425" spcFirstLastPara="1" rIns="91425" wrap="square" tIns="91425">
+          <a:bodyPr spcFirstLastPara="1" wrap="square" lIns="91425" tIns="91425" rIns="91425" bIns="91425" anchor="t" anchorCtr="0">
             <a:noAutofit/>
           </a:bodyPr>
           <a:lstStyle/>
           <a:p>
-            <a:pPr indent="0" lvl="0" marL="0" rtl="0" algn="l">
+            <a:pPr marL="0" lvl="0" indent="0" algn="l" rtl="0">
               <a:spcBef>
                 <a:spcPts val="0"/>
               </a:spcBef>
@@ -6834,9 +7003,11 @@
       <p:sp>
         <p:nvSpPr>
           <p:cNvPr id="68" name="Google Shape;68;p14"/>
-          <p:cNvSpPr txBox="1"/>
+          <p:cNvSpPr txBox="1">
+            <a:spLocks noGrp="1"/>
+          </p:cNvSpPr>
           <p:nvPr>
-            <p:ph idx="1" type="body"/>
+            <p:ph type="body" idx="1"/>
           </p:nvPr>
         </p:nvSpPr>
         <p:spPr>
@@ -6849,12 +7020,12 @@
           </a:prstGeom>
         </p:spPr>
         <p:txBody>
-          <a:bodyPr anchorCtr="0" anchor="t" bIns="91425" lIns="91425" spcFirstLastPara="1" rIns="91425" wrap="square" tIns="91425">
+          <a:bodyPr spcFirstLastPara="1" wrap="square" lIns="91425" tIns="91425" rIns="91425" bIns="91425" anchor="t" anchorCtr="0">
             <a:noAutofit/>
           </a:bodyPr>
           <a:lstStyle/>
           <a:p>
-            <a:pPr indent="-342900" lvl="0" marL="457200" rtl="0" algn="l">
+            <a:pPr marL="457200" lvl="0" indent="-342900" algn="l" rtl="0">
               <a:spcBef>
                 <a:spcPts val="0"/>
               </a:spcBef>
@@ -6871,7 +7042,7 @@
             <a:endParaRPr/>
           </a:p>
           <a:p>
-            <a:pPr indent="-342900" lvl="0" marL="457200" rtl="0" algn="l">
+            <a:pPr marL="457200" lvl="0" indent="-342900" algn="l" rtl="0">
               <a:spcBef>
                 <a:spcPts val="0"/>
               </a:spcBef>
@@ -6888,7 +7059,7 @@
             <a:endParaRPr/>
           </a:p>
           <a:p>
-            <a:pPr indent="-342900" lvl="0" marL="457200" rtl="0" algn="l">
+            <a:pPr marL="457200" lvl="0" indent="-342900" algn="l" rtl="0">
               <a:spcBef>
                 <a:spcPts val="0"/>
               </a:spcBef>
@@ -6905,7 +7076,7 @@
             <a:endParaRPr/>
           </a:p>
           <a:p>
-            <a:pPr indent="-342900" lvl="0" marL="457200" rtl="0" algn="l">
+            <a:pPr marL="457200" lvl="0" indent="-342900" algn="l" rtl="0">
               <a:spcBef>
                 <a:spcPts val="0"/>
               </a:spcBef>
@@ -6932,11 +7103,11 @@
 </file>
 
 <file path=ppt/slides/slide3.xml><?xml version="1.0" encoding="utf-8"?>
-<p:sld xmlns:a="http://schemas.openxmlformats.org/drawingml/2006/main" xmlns:r="http://schemas.openxmlformats.org/officeDocument/2006/relationships" xmlns:mc="http://schemas.openxmlformats.org/markup-compatibility/2006" xmlns:mv="urn:schemas-microsoft-com:mac:vml" xmlns:p="http://schemas.openxmlformats.org/presentationml/2006/main" xmlns:c="http://schemas.openxmlformats.org/drawingml/2006/chart" xmlns:dgm="http://schemas.openxmlformats.org/drawingml/2006/diagram" xmlns:o="urn:schemas-microsoft-com:office:office" xmlns:v="urn:schemas-microsoft-com:vml" xmlns:pvml="urn:schemas-microsoft-com:office:powerpoint" xmlns:com="http://schemas.openxmlformats.org/drawingml/2006/compatibility" xmlns:p14="http://schemas.microsoft.com/office/powerpoint/2010/main" xmlns:p15="http://schemas.microsoft.com/office/powerpoint/2012/main">
+<p:sld xmlns:a="http://schemas.openxmlformats.org/drawingml/2006/main" xmlns:r="http://schemas.openxmlformats.org/officeDocument/2006/relationships" xmlns:p="http://schemas.openxmlformats.org/presentationml/2006/main">
   <p:cSld>
     <p:spTree>
       <p:nvGrpSpPr>
-        <p:cNvPr id="72" name="Shape 72"/>
+        <p:cNvPr id="1" name="Shape 72"/>
         <p:cNvGrpSpPr/>
         <p:nvPr/>
       </p:nvGrpSpPr>
@@ -6951,7 +7122,9 @@
       <p:sp>
         <p:nvSpPr>
           <p:cNvPr id="73" name="Google Shape;73;p15"/>
-          <p:cNvSpPr txBox="1"/>
+          <p:cNvSpPr txBox="1">
+            <a:spLocks noGrp="1"/>
+          </p:cNvSpPr>
           <p:nvPr>
             <p:ph type="title"/>
           </p:nvPr>
@@ -6966,12 +7139,12 @@
           </a:prstGeom>
         </p:spPr>
         <p:txBody>
-          <a:bodyPr anchorCtr="0" anchor="t" bIns="91425" lIns="91425" spcFirstLastPara="1" rIns="91425" wrap="square" tIns="91425">
+          <a:bodyPr spcFirstLastPara="1" wrap="square" lIns="91425" tIns="91425" rIns="91425" bIns="91425" anchor="t" anchorCtr="0">
             <a:noAutofit/>
           </a:bodyPr>
           <a:lstStyle/>
           <a:p>
-            <a:pPr indent="0" lvl="0" marL="0" rtl="0" algn="l">
+            <a:pPr marL="0" lvl="0" indent="0" algn="l" rtl="0">
               <a:spcBef>
                 <a:spcPts val="0"/>
               </a:spcBef>
@@ -6991,9 +7164,11 @@
       <p:sp>
         <p:nvSpPr>
           <p:cNvPr id="74" name="Google Shape;74;p15"/>
-          <p:cNvSpPr txBox="1"/>
+          <p:cNvSpPr txBox="1">
+            <a:spLocks noGrp="1"/>
+          </p:cNvSpPr>
           <p:nvPr>
-            <p:ph idx="1" type="body"/>
+            <p:ph type="body" idx="1"/>
           </p:nvPr>
         </p:nvSpPr>
         <p:spPr>
@@ -7006,12 +7181,12 @@
           </a:prstGeom>
         </p:spPr>
         <p:txBody>
-          <a:bodyPr anchorCtr="0" anchor="t" bIns="91425" lIns="91425" spcFirstLastPara="1" rIns="91425" wrap="square" tIns="91425">
+          <a:bodyPr spcFirstLastPara="1" wrap="square" lIns="91425" tIns="91425" rIns="91425" bIns="91425" anchor="t" anchorCtr="0">
             <a:noAutofit/>
           </a:bodyPr>
           <a:lstStyle/>
           <a:p>
-            <a:pPr indent="0" lvl="0" marL="0" rtl="0" algn="l">
+            <a:pPr marL="0" lvl="0" indent="0" algn="l" rtl="0">
               <a:spcBef>
                 <a:spcPts val="0"/>
               </a:spcBef>
@@ -7021,21 +7196,17 @@
               <a:buNone/>
             </a:pPr>
             <a:r>
-              <a:rPr b="1" lang="en"/>
+              <a:rPr lang="en" b="1"/>
               <a:t>1.</a:t>
             </a:r>
             <a:r>
               <a:rPr lang="en"/>
-              <a:t> </a:t>
-            </a:r>
-            <a:r>
-              <a:rPr lang="en"/>
-              <a:t>A Message could include any kind of information or even a simple text message.</a:t>
+              <a:t> A Message could include any kind of information or even a simple text message.</a:t>
             </a:r>
             <a:endParaRPr/>
           </a:p>
           <a:p>
-            <a:pPr indent="0" lvl="0" marL="0" rtl="0" algn="l">
+            <a:pPr marL="0" lvl="0" indent="0" algn="l" rtl="0">
               <a:spcBef>
                 <a:spcPts val="1600"/>
               </a:spcBef>
@@ -7045,7 +7216,7 @@
               <a:buNone/>
             </a:pPr>
             <a:r>
-              <a:rPr b="1" lang="en"/>
+              <a:rPr lang="en" b="1"/>
               <a:t>2.</a:t>
             </a:r>
             <a:r>
@@ -7055,7 +7226,7 @@
             <a:endParaRPr/>
           </a:p>
           <a:p>
-            <a:pPr indent="0" lvl="0" marL="0" rtl="0" algn="l">
+            <a:pPr marL="0" lvl="0" indent="0" algn="l" rtl="0">
               <a:spcBef>
                 <a:spcPts val="1600"/>
               </a:spcBef>
@@ -7065,33 +7236,17 @@
               <a:buNone/>
             </a:pPr>
             <a:r>
-              <a:rPr b="1" lang="en"/>
+              <a:rPr lang="en" b="1"/>
               <a:t>3.</a:t>
             </a:r>
             <a:r>
               <a:rPr lang="en"/>
-              <a:t>Pika is a pure </a:t>
-            </a:r>
-            <a:r>
-              <a:rPr lang="en"/>
-              <a:t>python</a:t>
-            </a:r>
-            <a:r>
-              <a:rPr lang="en"/>
-              <a:t> implementation of the AMQP 0-9-1 protocol that tries to stay fairly independent of the </a:t>
-            </a:r>
-            <a:r>
-              <a:rPr lang="en"/>
-              <a:t>underlying</a:t>
-            </a:r>
-            <a:r>
-              <a:rPr lang="en"/>
-              <a:t> network support library.  </a:t>
+              <a:t>Pika is a pure python implementation of the AMQP 0-9-1 protocol that tries to stay fairly independent of the underlying network support library.  </a:t>
             </a:r>
             <a:endParaRPr/>
           </a:p>
           <a:p>
-            <a:pPr indent="0" lvl="0" marL="0" rtl="0" algn="l">
+            <a:pPr marL="0" lvl="0" indent="0" algn="l" rtl="0">
               <a:spcBef>
                 <a:spcPts val="1600"/>
               </a:spcBef>
@@ -7101,7 +7256,7 @@
               <a:buNone/>
             </a:pPr>
             <a:r>
-              <a:rPr b="1" lang="en"/>
+              <a:rPr lang="en" b="1"/>
               <a:t>4. </a:t>
             </a:r>
             <a:r>
@@ -7121,11 +7276,11 @@
 </file>
 
 <file path=ppt/slides/slide4.xml><?xml version="1.0" encoding="utf-8"?>
-<p:sld xmlns:a="http://schemas.openxmlformats.org/drawingml/2006/main" xmlns:r="http://schemas.openxmlformats.org/officeDocument/2006/relationships" xmlns:mc="http://schemas.openxmlformats.org/markup-compatibility/2006" xmlns:mv="urn:schemas-microsoft-com:mac:vml" xmlns:p="http://schemas.openxmlformats.org/presentationml/2006/main" xmlns:c="http://schemas.openxmlformats.org/drawingml/2006/chart" xmlns:dgm="http://schemas.openxmlformats.org/drawingml/2006/diagram" xmlns:o="urn:schemas-microsoft-com:office:office" xmlns:v="urn:schemas-microsoft-com:vml" xmlns:pvml="urn:schemas-microsoft-com:office:powerpoint" xmlns:com="http://schemas.openxmlformats.org/drawingml/2006/compatibility" xmlns:p14="http://schemas.microsoft.com/office/powerpoint/2010/main" xmlns:p15="http://schemas.microsoft.com/office/powerpoint/2012/main">
+<p:sld xmlns:a="http://schemas.openxmlformats.org/drawingml/2006/main" xmlns:r="http://schemas.openxmlformats.org/officeDocument/2006/relationships" xmlns:p="http://schemas.openxmlformats.org/presentationml/2006/main">
   <p:cSld>
     <p:spTree>
       <p:nvGrpSpPr>
-        <p:cNvPr id="78" name="Shape 78"/>
+        <p:cNvPr id="1" name="Shape 78"/>
         <p:cNvGrpSpPr/>
         <p:nvPr/>
       </p:nvGrpSpPr>
@@ -7140,7 +7295,9 @@
       <p:sp>
         <p:nvSpPr>
           <p:cNvPr id="79" name="Google Shape;79;p16"/>
-          <p:cNvSpPr txBox="1"/>
+          <p:cNvSpPr txBox="1">
+            <a:spLocks noGrp="1"/>
+          </p:cNvSpPr>
           <p:nvPr>
             <p:ph type="title"/>
           </p:nvPr>
@@ -7155,12 +7312,12 @@
           </a:prstGeom>
         </p:spPr>
         <p:txBody>
-          <a:bodyPr anchorCtr="0" anchor="t" bIns="91425" lIns="91425" spcFirstLastPara="1" rIns="91425" wrap="square" tIns="91425">
+          <a:bodyPr spcFirstLastPara="1" wrap="square" lIns="91425" tIns="91425" rIns="91425" bIns="91425" anchor="t" anchorCtr="0">
             <a:noAutofit/>
           </a:bodyPr>
           <a:lstStyle/>
           <a:p>
-            <a:pPr indent="0" lvl="0" marL="0" rtl="0" algn="l">
+            <a:pPr marL="0" lvl="0" indent="0" algn="l" rtl="0">
               <a:spcBef>
                 <a:spcPts val="0"/>
               </a:spcBef>
@@ -7171,15 +7328,7 @@
             </a:pPr>
             <a:r>
               <a:rPr lang="en"/>
-              <a:t>An example of Message </a:t>
-            </a:r>
-            <a:r>
-              <a:rPr lang="en"/>
-              <a:t>queuing</a:t>
-            </a:r>
-            <a:r>
-              <a:rPr lang="en"/>
-              <a:t>.</a:t>
+              <a:t>An example of Message queuing.</a:t>
             </a:r>
             <a:endParaRPr/>
           </a:p>
@@ -7222,11 +7371,11 @@
 </file>
 
 <file path=ppt/slides/slide5.xml><?xml version="1.0" encoding="utf-8"?>
-<p:sld xmlns:a="http://schemas.openxmlformats.org/drawingml/2006/main" xmlns:r="http://schemas.openxmlformats.org/officeDocument/2006/relationships" xmlns:mc="http://schemas.openxmlformats.org/markup-compatibility/2006" xmlns:mv="urn:schemas-microsoft-com:mac:vml" xmlns:p="http://schemas.openxmlformats.org/presentationml/2006/main" xmlns:c="http://schemas.openxmlformats.org/drawingml/2006/chart" xmlns:dgm="http://schemas.openxmlformats.org/drawingml/2006/diagram" xmlns:o="urn:schemas-microsoft-com:office:office" xmlns:v="urn:schemas-microsoft-com:vml" xmlns:pvml="urn:schemas-microsoft-com:office:powerpoint" xmlns:com="http://schemas.openxmlformats.org/drawingml/2006/compatibility" xmlns:p14="http://schemas.microsoft.com/office/powerpoint/2010/main" xmlns:p15="http://schemas.microsoft.com/office/powerpoint/2012/main">
+<p:sld xmlns:a="http://schemas.openxmlformats.org/drawingml/2006/main" xmlns:r="http://schemas.openxmlformats.org/officeDocument/2006/relationships" xmlns:p="http://schemas.openxmlformats.org/presentationml/2006/main">
   <p:cSld>
     <p:spTree>
       <p:nvGrpSpPr>
-        <p:cNvPr id="84" name="Shape 84"/>
+        <p:cNvPr id="1" name="Shape 84"/>
         <p:cNvGrpSpPr/>
         <p:nvPr/>
       </p:nvGrpSpPr>
@@ -7241,7 +7390,9 @@
       <p:sp>
         <p:nvSpPr>
           <p:cNvPr id="85" name="Google Shape;85;p17"/>
-          <p:cNvSpPr txBox="1"/>
+          <p:cNvSpPr txBox="1">
+            <a:spLocks noGrp="1"/>
+          </p:cNvSpPr>
           <p:nvPr>
             <p:ph type="title"/>
           </p:nvPr>
@@ -7256,12 +7407,12 @@
           </a:prstGeom>
         </p:spPr>
         <p:txBody>
-          <a:bodyPr anchorCtr="0" anchor="t" bIns="91425" lIns="91425" spcFirstLastPara="1" rIns="91425" wrap="square" tIns="91425">
+          <a:bodyPr spcFirstLastPara="1" wrap="square" lIns="91425" tIns="91425" rIns="91425" bIns="91425" anchor="t" anchorCtr="0">
             <a:noAutofit/>
           </a:bodyPr>
           <a:lstStyle/>
           <a:p>
-            <a:pPr indent="0" lvl="0" marL="0" rtl="0" algn="l">
+            <a:pPr marL="0" lvl="0" indent="0" algn="l" rtl="0">
               <a:spcBef>
                 <a:spcPts val="0"/>
               </a:spcBef>
@@ -7272,11 +7423,7 @@
             </a:pPr>
             <a:r>
               <a:rPr lang="en"/>
-              <a:t>Designed </a:t>
-            </a:r>
-            <a:r>
-              <a:rPr lang="en"/>
-              <a:t>Workflow for tactic implementation</a:t>
+              <a:t>Designed Workflow for tactic implementation</a:t>
             </a:r>
             <a:endParaRPr/>
           </a:p>
@@ -7319,11 +7466,11 @@
 </file>
 
 <file path=ppt/slides/slide6.xml><?xml version="1.0" encoding="utf-8"?>
-<p:sld xmlns:a="http://schemas.openxmlformats.org/drawingml/2006/main" xmlns:r="http://schemas.openxmlformats.org/officeDocument/2006/relationships" xmlns:mc="http://schemas.openxmlformats.org/markup-compatibility/2006" xmlns:mv="urn:schemas-microsoft-com:mac:vml" xmlns:p="http://schemas.openxmlformats.org/presentationml/2006/main" xmlns:c="http://schemas.openxmlformats.org/drawingml/2006/chart" xmlns:dgm="http://schemas.openxmlformats.org/drawingml/2006/diagram" xmlns:o="urn:schemas-microsoft-com:office:office" xmlns:v="urn:schemas-microsoft-com:vml" xmlns:pvml="urn:schemas-microsoft-com:office:powerpoint" xmlns:com="http://schemas.openxmlformats.org/drawingml/2006/compatibility" xmlns:p14="http://schemas.microsoft.com/office/powerpoint/2010/main" xmlns:p15="http://schemas.microsoft.com/office/powerpoint/2012/main">
+<p:sld xmlns:a="http://schemas.openxmlformats.org/drawingml/2006/main" xmlns:r="http://schemas.openxmlformats.org/officeDocument/2006/relationships" xmlns:p="http://schemas.openxmlformats.org/presentationml/2006/main">
   <p:cSld>
     <p:spTree>
       <p:nvGrpSpPr>
-        <p:cNvPr id="90" name="Shape 90"/>
+        <p:cNvPr id="1" name="Shape 90"/>
         <p:cNvGrpSpPr/>
         <p:nvPr/>
       </p:nvGrpSpPr>
@@ -7338,7 +7485,9 @@
       <p:sp>
         <p:nvSpPr>
           <p:cNvPr id="91" name="Google Shape;91;p18"/>
-          <p:cNvSpPr txBox="1"/>
+          <p:cNvSpPr txBox="1">
+            <a:spLocks noGrp="1"/>
+          </p:cNvSpPr>
           <p:nvPr>
             <p:ph type="title"/>
           </p:nvPr>
@@ -7353,12 +7502,12 @@
           </a:prstGeom>
         </p:spPr>
         <p:txBody>
-          <a:bodyPr anchorCtr="0" anchor="t" bIns="91425" lIns="91425" spcFirstLastPara="1" rIns="91425" wrap="square" tIns="91425">
+          <a:bodyPr spcFirstLastPara="1" wrap="square" lIns="91425" tIns="91425" rIns="91425" bIns="91425" anchor="t" anchorCtr="0">
             <a:noAutofit/>
           </a:bodyPr>
           <a:lstStyle/>
           <a:p>
-            <a:pPr indent="0" lvl="0" marL="0" rtl="0" algn="ctr">
+            <a:pPr marL="0" lvl="0" indent="0" algn="ctr" rtl="0">
               <a:spcBef>
                 <a:spcPts val="0"/>
               </a:spcBef>
@@ -7369,15 +7518,7 @@
             </a:pPr>
             <a:r>
               <a:rPr lang="en"/>
-              <a:t>Let’s Dive into the </a:t>
-            </a:r>
-            <a:r>
-              <a:rPr lang="en"/>
-              <a:t>Demonstration</a:t>
-            </a:r>
-            <a:r>
-              <a:rPr lang="en"/>
-              <a:t> now ! </a:t>
+              <a:t>Let’s Dive into the Demonstration now ! </a:t>
             </a:r>
             <a:endParaRPr/>
           </a:p>
@@ -7392,7 +7533,288 @@
 </file>
 
 <file path=ppt/theme/theme1.xml><?xml version="1.0" encoding="utf-8"?>
-<a:theme xmlns:a="http://schemas.openxmlformats.org/drawingml/2006/main" xmlns:r="http://schemas.openxmlformats.org/officeDocument/2006/relationships">
+<a:theme xmlns:a="http://schemas.openxmlformats.org/drawingml/2006/main" name="Slate">
+  <a:themeElements>
+    <a:clrScheme name="Slate">
+      <a:dk1>
+        <a:srgbClr val="FFFFFF"/>
+      </a:dk1>
+      <a:lt1>
+        <a:srgbClr val="37474F"/>
+      </a:lt1>
+      <a:dk2>
+        <a:srgbClr val="9E9E9E"/>
+      </a:dk2>
+      <a:lt2>
+        <a:srgbClr val="E0E0E0"/>
+      </a:lt2>
+      <a:accent1>
+        <a:srgbClr val="616161"/>
+      </a:accent1>
+      <a:accent2>
+        <a:srgbClr val="78909C"/>
+      </a:accent2>
+      <a:accent3>
+        <a:srgbClr val="CACACA"/>
+      </a:accent3>
+      <a:accent4>
+        <a:srgbClr val="64FFDA"/>
+      </a:accent4>
+      <a:accent5>
+        <a:srgbClr val="FFD966"/>
+      </a:accent5>
+      <a:accent6>
+        <a:srgbClr val="F5F5F5"/>
+      </a:accent6>
+      <a:hlink>
+        <a:srgbClr val="FFD966"/>
+      </a:hlink>
+      <a:folHlink>
+        <a:srgbClr val="FFD966"/>
+      </a:folHlink>
+    </a:clrScheme>
+    <a:fontScheme name="Office">
+      <a:majorFont>
+        <a:latin typeface="Arial"/>
+        <a:ea typeface=""/>
+        <a:cs typeface=""/>
+        <a:font script="Jpan" typeface="ＭＳ Ｐゴシック"/>
+        <a:font script="Hang" typeface="맑은 고딕"/>
+        <a:font script="Hans" typeface="宋体"/>
+        <a:font script="Hant" typeface="新細明體"/>
+        <a:font script="Arab" typeface="Times New Roman"/>
+        <a:font script="Hebr" typeface="Times New Roman"/>
+        <a:font script="Thai" typeface="Angsana New"/>
+        <a:font script="Ethi" typeface="Nyala"/>
+        <a:font script="Beng" typeface="Vrinda"/>
+        <a:font script="Gujr" typeface="Shruti"/>
+        <a:font script="Khmr" typeface="MoolBoran"/>
+        <a:font script="Knda" typeface="Tunga"/>
+        <a:font script="Guru" typeface="Raavi"/>
+        <a:font script="Cans" typeface="Euphemia"/>
+        <a:font script="Cher" typeface="Plantagenet Cherokee"/>
+        <a:font script="Yiii" typeface="Microsoft Yi Baiti"/>
+        <a:font script="Tibt" typeface="Microsoft Himalaya"/>
+        <a:font script="Thaa" typeface="MV Boli"/>
+        <a:font script="Deva" typeface="Mangal"/>
+        <a:font script="Telu" typeface="Gautami"/>
+        <a:font script="Taml" typeface="Latha"/>
+        <a:font script="Syrc" typeface="Estrangelo Edessa"/>
+        <a:font script="Orya" typeface="Kalinga"/>
+        <a:font script="Mlym" typeface="Kartika"/>
+        <a:font script="Laoo" typeface="DokChampa"/>
+        <a:font script="Sinh" typeface="Iskoola Pota"/>
+        <a:font script="Mong" typeface="Mongolian Baiti"/>
+        <a:font script="Viet" typeface="Times New Roman"/>
+        <a:font script="Uigh" typeface="Microsoft Uighur"/>
+        <a:font script="Geor" typeface="Sylfaen"/>
+      </a:majorFont>
+      <a:minorFont>
+        <a:latin typeface="Arial"/>
+        <a:ea typeface=""/>
+        <a:cs typeface=""/>
+        <a:font script="Jpan" typeface="ＭＳ Ｐゴシック"/>
+        <a:font script="Hang" typeface="맑은 고딕"/>
+        <a:font script="Hans" typeface="宋体"/>
+        <a:font script="Hant" typeface="新細明體"/>
+        <a:font script="Arab" typeface="Arial"/>
+        <a:font script="Hebr" typeface="Arial"/>
+        <a:font script="Thai" typeface="Cordia New"/>
+        <a:font script="Ethi" typeface="Nyala"/>
+        <a:font script="Beng" typeface="Vrinda"/>
+        <a:font script="Gujr" typeface="Shruti"/>
+        <a:font script="Khmr" typeface="DaunPenh"/>
+        <a:font script="Knda" typeface="Tunga"/>
+        <a:font script="Guru" typeface="Raavi"/>
+        <a:font script="Cans" typeface="Euphemia"/>
+        <a:font script="Cher" typeface="Plantagenet Cherokee"/>
+        <a:font script="Yiii" typeface="Microsoft Yi Baiti"/>
+        <a:font script="Tibt" typeface="Microsoft Himalaya"/>
+        <a:font script="Thaa" typeface="MV Boli"/>
+        <a:font script="Deva" typeface="Mangal"/>
+        <a:font script="Telu" typeface="Gautami"/>
+        <a:font script="Taml" typeface="Latha"/>
+        <a:font script="Syrc" typeface="Estrangelo Edessa"/>
+        <a:font script="Orya" typeface="Kalinga"/>
+        <a:font script="Mlym" typeface="Kartika"/>
+        <a:font script="Laoo" typeface="DokChampa"/>
+        <a:font script="Sinh" typeface="Iskoola Pota"/>
+        <a:font script="Mong" typeface="Mongolian Baiti"/>
+        <a:font script="Viet" typeface="Arial"/>
+        <a:font script="Uigh" typeface="Microsoft Uighur"/>
+        <a:font script="Geor" typeface="Sylfaen"/>
+      </a:minorFont>
+    </a:fontScheme>
+    <a:fmtScheme name="Office">
+      <a:fillStyleLst>
+        <a:solidFill>
+          <a:schemeClr val="phClr"/>
+        </a:solidFill>
+        <a:gradFill rotWithShape="1">
+          <a:gsLst>
+            <a:gs pos="0">
+              <a:schemeClr val="phClr">
+                <a:tint val="50000"/>
+                <a:satMod val="300000"/>
+              </a:schemeClr>
+            </a:gs>
+            <a:gs pos="35000">
+              <a:schemeClr val="phClr">
+                <a:tint val="37000"/>
+                <a:satMod val="300000"/>
+              </a:schemeClr>
+            </a:gs>
+            <a:gs pos="100000">
+              <a:schemeClr val="phClr">
+                <a:tint val="15000"/>
+                <a:satMod val="350000"/>
+              </a:schemeClr>
+            </a:gs>
+          </a:gsLst>
+          <a:lin ang="16200000" scaled="1"/>
+        </a:gradFill>
+        <a:gradFill rotWithShape="1">
+          <a:gsLst>
+            <a:gs pos="0">
+              <a:schemeClr val="phClr">
+                <a:tint val="100000"/>
+                <a:shade val="100000"/>
+                <a:satMod val="130000"/>
+              </a:schemeClr>
+            </a:gs>
+            <a:gs pos="100000">
+              <a:schemeClr val="phClr">
+                <a:tint val="50000"/>
+                <a:shade val="100000"/>
+                <a:satMod val="350000"/>
+              </a:schemeClr>
+            </a:gs>
+          </a:gsLst>
+          <a:lin ang="16200000" scaled="0"/>
+        </a:gradFill>
+      </a:fillStyleLst>
+      <a:lnStyleLst>
+        <a:ln w="9525" cap="flat" cmpd="sng" algn="ctr">
+          <a:solidFill>
+            <a:schemeClr val="phClr">
+              <a:shade val="95000"/>
+              <a:satMod val="105000"/>
+            </a:schemeClr>
+          </a:solidFill>
+          <a:prstDash val="solid"/>
+        </a:ln>
+        <a:ln w="25400" cap="flat" cmpd="sng" algn="ctr">
+          <a:solidFill>
+            <a:schemeClr val="phClr"/>
+          </a:solidFill>
+          <a:prstDash val="solid"/>
+        </a:ln>
+        <a:ln w="38100" cap="flat" cmpd="sng" algn="ctr">
+          <a:solidFill>
+            <a:schemeClr val="phClr"/>
+          </a:solidFill>
+          <a:prstDash val="solid"/>
+        </a:ln>
+      </a:lnStyleLst>
+      <a:effectStyleLst>
+        <a:effectStyle>
+          <a:effectLst>
+            <a:outerShdw blurRad="40000" dist="20000" dir="5400000" rotWithShape="0">
+              <a:srgbClr val="000000">
+                <a:alpha val="38000"/>
+              </a:srgbClr>
+            </a:outerShdw>
+          </a:effectLst>
+        </a:effectStyle>
+        <a:effectStyle>
+          <a:effectLst>
+            <a:outerShdw blurRad="40000" dist="23000" dir="5400000" rotWithShape="0">
+              <a:srgbClr val="000000">
+                <a:alpha val="35000"/>
+              </a:srgbClr>
+            </a:outerShdw>
+          </a:effectLst>
+        </a:effectStyle>
+        <a:effectStyle>
+          <a:effectLst>
+            <a:outerShdw blurRad="40000" dist="23000" dir="5400000" rotWithShape="0">
+              <a:srgbClr val="000000">
+                <a:alpha val="35000"/>
+              </a:srgbClr>
+            </a:outerShdw>
+          </a:effectLst>
+          <a:scene3d>
+            <a:camera prst="orthographicFront">
+              <a:rot lat="0" lon="0" rev="0"/>
+            </a:camera>
+            <a:lightRig rig="threePt" dir="t">
+              <a:rot lat="0" lon="0" rev="1200000"/>
+            </a:lightRig>
+          </a:scene3d>
+          <a:sp3d>
+            <a:bevelT w="63500" h="25400"/>
+          </a:sp3d>
+        </a:effectStyle>
+      </a:effectStyleLst>
+      <a:bgFillStyleLst>
+        <a:solidFill>
+          <a:schemeClr val="phClr"/>
+        </a:solidFill>
+        <a:gradFill rotWithShape="1">
+          <a:gsLst>
+            <a:gs pos="0">
+              <a:schemeClr val="phClr">
+                <a:tint val="40000"/>
+                <a:satMod val="350000"/>
+              </a:schemeClr>
+            </a:gs>
+            <a:gs pos="40000">
+              <a:schemeClr val="phClr">
+                <a:tint val="45000"/>
+                <a:shade val="99000"/>
+                <a:satMod val="350000"/>
+              </a:schemeClr>
+            </a:gs>
+            <a:gs pos="100000">
+              <a:schemeClr val="phClr">
+                <a:shade val="20000"/>
+                <a:satMod val="255000"/>
+              </a:schemeClr>
+            </a:gs>
+          </a:gsLst>
+          <a:path path="circle">
+            <a:fillToRect l="50000" t="-80000" r="50000" b="180000"/>
+          </a:path>
+        </a:gradFill>
+        <a:gradFill rotWithShape="1">
+          <a:gsLst>
+            <a:gs pos="0">
+              <a:schemeClr val="phClr">
+                <a:tint val="80000"/>
+                <a:satMod val="300000"/>
+              </a:schemeClr>
+            </a:gs>
+            <a:gs pos="100000">
+              <a:schemeClr val="phClr">
+                <a:shade val="30000"/>
+                <a:satMod val="200000"/>
+              </a:schemeClr>
+            </a:gs>
+          </a:gsLst>
+          <a:path path="circle">
+            <a:fillToRect l="50000" t="50000" r="50000" b="50000"/>
+          </a:path>
+        </a:gradFill>
+      </a:bgFillStyleLst>
+    </a:fmtScheme>
+  </a:themeElements>
+  <a:objectDefaults/>
+  <a:extraClrSchemeLst/>
+</a:theme>
+</file>
+
+<file path=ppt/theme/theme2.xml><?xml version="1.0" encoding="utf-8"?>
+<a:theme xmlns:a="http://schemas.openxmlformats.org/drawingml/2006/main">
   <a:themeElements>
     <a:clrScheme name="Default">
       <a:dk1>
@@ -7667,284 +8089,7 @@
       </a:bgFillStyleLst>
     </a:fmtScheme>
   </a:themeElements>
-</a:theme>
-</file>
-
-<file path=ppt/theme/theme2.xml><?xml version="1.0" encoding="utf-8"?>
-<a:theme xmlns:a="http://schemas.openxmlformats.org/drawingml/2006/main" xmlns:r="http://schemas.openxmlformats.org/officeDocument/2006/relationships" name="Slate">
-  <a:themeElements>
-    <a:clrScheme name="Slate">
-      <a:dk1>
-        <a:srgbClr val="FFFFFF"/>
-      </a:dk1>
-      <a:lt1>
-        <a:srgbClr val="37474F"/>
-      </a:lt1>
-      <a:dk2>
-        <a:srgbClr val="9E9E9E"/>
-      </a:dk2>
-      <a:lt2>
-        <a:srgbClr val="E0E0E0"/>
-      </a:lt2>
-      <a:accent1>
-        <a:srgbClr val="616161"/>
-      </a:accent1>
-      <a:accent2>
-        <a:srgbClr val="78909C"/>
-      </a:accent2>
-      <a:accent3>
-        <a:srgbClr val="CACACA"/>
-      </a:accent3>
-      <a:accent4>
-        <a:srgbClr val="64FFDA"/>
-      </a:accent4>
-      <a:accent5>
-        <a:srgbClr val="FFD966"/>
-      </a:accent5>
-      <a:accent6>
-        <a:srgbClr val="F5F5F5"/>
-      </a:accent6>
-      <a:hlink>
-        <a:srgbClr val="FFD966"/>
-      </a:hlink>
-      <a:folHlink>
-        <a:srgbClr val="FFD966"/>
-      </a:folHlink>
-    </a:clrScheme>
-    <a:fontScheme name="Office">
-      <a:majorFont>
-        <a:latin typeface="Arial"/>
-        <a:ea typeface=""/>
-        <a:cs typeface=""/>
-        <a:font script="Jpan" typeface="ＭＳ Ｐゴシック"/>
-        <a:font script="Hang" typeface="맑은 고딕"/>
-        <a:font script="Hans" typeface="宋体"/>
-        <a:font script="Hant" typeface="新細明體"/>
-        <a:font script="Arab" typeface="Times New Roman"/>
-        <a:font script="Hebr" typeface="Times New Roman"/>
-        <a:font script="Thai" typeface="Angsana New"/>
-        <a:font script="Ethi" typeface="Nyala"/>
-        <a:font script="Beng" typeface="Vrinda"/>
-        <a:font script="Gujr" typeface="Shruti"/>
-        <a:font script="Khmr" typeface="MoolBoran"/>
-        <a:font script="Knda" typeface="Tunga"/>
-        <a:font script="Guru" typeface="Raavi"/>
-        <a:font script="Cans" typeface="Euphemia"/>
-        <a:font script="Cher" typeface="Plantagenet Cherokee"/>
-        <a:font script="Yiii" typeface="Microsoft Yi Baiti"/>
-        <a:font script="Tibt" typeface="Microsoft Himalaya"/>
-        <a:font script="Thaa" typeface="MV Boli"/>
-        <a:font script="Deva" typeface="Mangal"/>
-        <a:font script="Telu" typeface="Gautami"/>
-        <a:font script="Taml" typeface="Latha"/>
-        <a:font script="Syrc" typeface="Estrangelo Edessa"/>
-        <a:font script="Orya" typeface="Kalinga"/>
-        <a:font script="Mlym" typeface="Kartika"/>
-        <a:font script="Laoo" typeface="DokChampa"/>
-        <a:font script="Sinh" typeface="Iskoola Pota"/>
-        <a:font script="Mong" typeface="Mongolian Baiti"/>
-        <a:font script="Viet" typeface="Times New Roman"/>
-        <a:font script="Uigh" typeface="Microsoft Uighur"/>
-        <a:font script="Geor" typeface="Sylfaen"/>
-      </a:majorFont>
-      <a:minorFont>
-        <a:latin typeface="Arial"/>
-        <a:ea typeface=""/>
-        <a:cs typeface=""/>
-        <a:font script="Jpan" typeface="ＭＳ Ｐゴシック"/>
-        <a:font script="Hang" typeface="맑은 고딕"/>
-        <a:font script="Hans" typeface="宋体"/>
-        <a:font script="Hant" typeface="新細明體"/>
-        <a:font script="Arab" typeface="Arial"/>
-        <a:font script="Hebr" typeface="Arial"/>
-        <a:font script="Thai" typeface="Cordia New"/>
-        <a:font script="Ethi" typeface="Nyala"/>
-        <a:font script="Beng" typeface="Vrinda"/>
-        <a:font script="Gujr" typeface="Shruti"/>
-        <a:font script="Khmr" typeface="DaunPenh"/>
-        <a:font script="Knda" typeface="Tunga"/>
-        <a:font script="Guru" typeface="Raavi"/>
-        <a:font script="Cans" typeface="Euphemia"/>
-        <a:font script="Cher" typeface="Plantagenet Cherokee"/>
-        <a:font script="Yiii" typeface="Microsoft Yi Baiti"/>
-        <a:font script="Tibt" typeface="Microsoft Himalaya"/>
-        <a:font script="Thaa" typeface="MV Boli"/>
-        <a:font script="Deva" typeface="Mangal"/>
-        <a:font script="Telu" typeface="Gautami"/>
-        <a:font script="Taml" typeface="Latha"/>
-        <a:font script="Syrc" typeface="Estrangelo Edessa"/>
-        <a:font script="Orya" typeface="Kalinga"/>
-        <a:font script="Mlym" typeface="Kartika"/>
-        <a:font script="Laoo" typeface="DokChampa"/>
-        <a:font script="Sinh" typeface="Iskoola Pota"/>
-        <a:font script="Mong" typeface="Mongolian Baiti"/>
-        <a:font script="Viet" typeface="Arial"/>
-        <a:font script="Uigh" typeface="Microsoft Uighur"/>
-        <a:font script="Geor" typeface="Sylfaen"/>
-      </a:minorFont>
-    </a:fontScheme>
-    <a:fmtScheme name="Office">
-      <a:fillStyleLst>
-        <a:solidFill>
-          <a:schemeClr val="phClr"/>
-        </a:solidFill>
-        <a:gradFill rotWithShape="1">
-          <a:gsLst>
-            <a:gs pos="0">
-              <a:schemeClr val="phClr">
-                <a:tint val="50000"/>
-                <a:satMod val="300000"/>
-              </a:schemeClr>
-            </a:gs>
-            <a:gs pos="35000">
-              <a:schemeClr val="phClr">
-                <a:tint val="37000"/>
-                <a:satMod val="300000"/>
-              </a:schemeClr>
-            </a:gs>
-            <a:gs pos="100000">
-              <a:schemeClr val="phClr">
-                <a:tint val="15000"/>
-                <a:satMod val="350000"/>
-              </a:schemeClr>
-            </a:gs>
-          </a:gsLst>
-          <a:lin ang="16200000" scaled="1"/>
-        </a:gradFill>
-        <a:gradFill rotWithShape="1">
-          <a:gsLst>
-            <a:gs pos="0">
-              <a:schemeClr val="phClr">
-                <a:tint val="100000"/>
-                <a:shade val="100000"/>
-                <a:satMod val="130000"/>
-              </a:schemeClr>
-            </a:gs>
-            <a:gs pos="100000">
-              <a:schemeClr val="phClr">
-                <a:tint val="50000"/>
-                <a:shade val="100000"/>
-                <a:satMod val="350000"/>
-              </a:schemeClr>
-            </a:gs>
-          </a:gsLst>
-          <a:lin ang="16200000" scaled="0"/>
-        </a:gradFill>
-      </a:fillStyleLst>
-      <a:lnStyleLst>
-        <a:ln w="9525" cap="flat" cmpd="sng" algn="ctr">
-          <a:solidFill>
-            <a:schemeClr val="phClr">
-              <a:shade val="95000"/>
-              <a:satMod val="105000"/>
-            </a:schemeClr>
-          </a:solidFill>
-          <a:prstDash val="solid"/>
-        </a:ln>
-        <a:ln w="25400" cap="flat" cmpd="sng" algn="ctr">
-          <a:solidFill>
-            <a:schemeClr val="phClr"/>
-          </a:solidFill>
-          <a:prstDash val="solid"/>
-        </a:ln>
-        <a:ln w="38100" cap="flat" cmpd="sng" algn="ctr">
-          <a:solidFill>
-            <a:schemeClr val="phClr"/>
-          </a:solidFill>
-          <a:prstDash val="solid"/>
-        </a:ln>
-      </a:lnStyleLst>
-      <a:effectStyleLst>
-        <a:effectStyle>
-          <a:effectLst>
-            <a:outerShdw blurRad="40000" dist="20000" dir="5400000" rotWithShape="0">
-              <a:srgbClr val="000000">
-                <a:alpha val="38000"/>
-              </a:srgbClr>
-            </a:outerShdw>
-          </a:effectLst>
-        </a:effectStyle>
-        <a:effectStyle>
-          <a:effectLst>
-            <a:outerShdw blurRad="40000" dist="23000" dir="5400000" rotWithShape="0">
-              <a:srgbClr val="000000">
-                <a:alpha val="35000"/>
-              </a:srgbClr>
-            </a:outerShdw>
-          </a:effectLst>
-        </a:effectStyle>
-        <a:effectStyle>
-          <a:effectLst>
-            <a:outerShdw blurRad="40000" dist="23000" dir="5400000" rotWithShape="0">
-              <a:srgbClr val="000000">
-                <a:alpha val="35000"/>
-              </a:srgbClr>
-            </a:outerShdw>
-          </a:effectLst>
-          <a:scene3d>
-            <a:camera prst="orthographicFront">
-              <a:rot lat="0" lon="0" rev="0"/>
-            </a:camera>
-            <a:lightRig rig="threePt" dir="t">
-              <a:rot lat="0" lon="0" rev="1200000"/>
-            </a:lightRig>
-          </a:scene3d>
-          <a:sp3d>
-            <a:bevelT w="63500" h="25400"/>
-          </a:sp3d>
-        </a:effectStyle>
-      </a:effectStyleLst>
-      <a:bgFillStyleLst>
-        <a:solidFill>
-          <a:schemeClr val="phClr"/>
-        </a:solidFill>
-        <a:gradFill rotWithShape="1">
-          <a:gsLst>
-            <a:gs pos="0">
-              <a:schemeClr val="phClr">
-                <a:tint val="40000"/>
-                <a:satMod val="350000"/>
-              </a:schemeClr>
-            </a:gs>
-            <a:gs pos="40000">
-              <a:schemeClr val="phClr">
-                <a:tint val="45000"/>
-                <a:shade val="99000"/>
-                <a:satMod val="350000"/>
-              </a:schemeClr>
-            </a:gs>
-            <a:gs pos="100000">
-              <a:schemeClr val="phClr">
-                <a:shade val="20000"/>
-                <a:satMod val="255000"/>
-              </a:schemeClr>
-            </a:gs>
-          </a:gsLst>
-          <a:path path="circle">
-            <a:fillToRect l="50000" t="-80000" r="50000" b="180000"/>
-          </a:path>
-        </a:gradFill>
-        <a:gradFill rotWithShape="1">
-          <a:gsLst>
-            <a:gs pos="0">
-              <a:schemeClr val="phClr">
-                <a:tint val="80000"/>
-                <a:satMod val="300000"/>
-              </a:schemeClr>
-            </a:gs>
-            <a:gs pos="100000">
-              <a:schemeClr val="phClr">
-                <a:shade val="30000"/>
-                <a:satMod val="200000"/>
-              </a:schemeClr>
-            </a:gs>
-          </a:gsLst>
-          <a:path path="circle">
-            <a:fillToRect l="50000" t="50000" r="50000" b="50000"/>
-          </a:path>
-        </a:gradFill>
-      </a:bgFillStyleLst>
-    </a:fmtScheme>
-  </a:themeElements>
+  <a:objectDefaults/>
+  <a:extraClrSchemeLst/>
 </a:theme>
 </file>
</xml_diff>